<commit_message>
Initial_Pitch.pptx - Commit after the Initial Pitch Preparation Meeting
</commit_message>
<xml_diff>
--- a/Initial_Pitch.pptx
+++ b/Initial_Pitch.pptx
@@ -5,18 +5,19 @@
     <p:sldMasterId id="2147483648" r:id="rId1"/>
   </p:sldMasterIdLst>
   <p:notesMasterIdLst>
-    <p:notesMasterId r:id="rId11"/>
+    <p:notesMasterId r:id="rId12"/>
   </p:notesMasterIdLst>
   <p:sldIdLst>
     <p:sldId id="266" r:id="rId2"/>
     <p:sldId id="257" r:id="rId3"/>
     <p:sldId id="260" r:id="rId4"/>
-    <p:sldId id="258" r:id="rId5"/>
-    <p:sldId id="259" r:id="rId6"/>
-    <p:sldId id="265" r:id="rId7"/>
-    <p:sldId id="263" r:id="rId8"/>
-    <p:sldId id="261" r:id="rId9"/>
-    <p:sldId id="264" r:id="rId10"/>
+    <p:sldId id="267" r:id="rId5"/>
+    <p:sldId id="258" r:id="rId6"/>
+    <p:sldId id="259" r:id="rId7"/>
+    <p:sldId id="265" r:id="rId8"/>
+    <p:sldId id="263" r:id="rId9"/>
+    <p:sldId id="261" r:id="rId10"/>
+    <p:sldId id="264" r:id="rId11"/>
   </p:sldIdLst>
   <p:sldSz cx="12192000" cy="6858000"/>
   <p:notesSz cx="6858000" cy="9144000"/>
@@ -127,6 +128,7 @@
         </p14:section>
         <p14:section name="Context" id="{EF6790E6-6A58-5446-9652-3813510B0572}">
           <p14:sldIdLst>
+            <p14:sldId id="267"/>
             <p14:sldId id="258"/>
             <p14:sldId id="259"/>
             <p14:sldId id="265"/>
@@ -229,7 +231,7 @@
           <a:p>
             <a:fld id="{C42DD129-2FF9-A046-B45F-39E82DE472D3}" type="datetimeFigureOut">
               <a:rPr lang="en-US" smtClean="0"/>
-              <a:t>9/30/19</a:t>
+              <a:t>10/1/19</a:t>
             </a:fld>
             <a:endParaRPr lang="en-US"/>
           </a:p>
@@ -730,7 +732,7 @@
           <a:p>
             <a:fld id="{BCB85714-5672-1A40-88C6-9D4BBA44017D}" type="slidenum">
               <a:rPr lang="en-US" smtClean="0"/>
-              <a:t>5</a:t>
+              <a:t>6</a:t>
             </a:fld>
             <a:endParaRPr lang="en-US"/>
           </a:p>
@@ -814,7 +816,7 @@
           <a:p>
             <a:fld id="{BCB85714-5672-1A40-88C6-9D4BBA44017D}" type="slidenum">
               <a:rPr lang="en-US" smtClean="0"/>
-              <a:t>6</a:t>
+              <a:t>7</a:t>
             </a:fld>
             <a:endParaRPr lang="en-US"/>
           </a:p>
@@ -898,7 +900,7 @@
           <a:p>
             <a:fld id="{BCB85714-5672-1A40-88C6-9D4BBA44017D}" type="slidenum">
               <a:rPr lang="en-US" smtClean="0"/>
-              <a:t>8</a:t>
+              <a:t>9</a:t>
             </a:fld>
             <a:endParaRPr lang="en-US"/>
           </a:p>
@@ -982,7 +984,7 @@
           <a:p>
             <a:fld id="{BCB85714-5672-1A40-88C6-9D4BBA44017D}" type="slidenum">
               <a:rPr lang="en-US" smtClean="0"/>
-              <a:t>9</a:t>
+              <a:t>10</a:t>
             </a:fld>
             <a:endParaRPr lang="en-US"/>
           </a:p>
@@ -1150,7 +1152,7 @@
           <a:p>
             <a:fld id="{25E64343-14F1-0849-9365-0127323517CF}" type="datetime1">
               <a:rPr lang="en-US" smtClean="0"/>
-              <a:t>9/30/19</a:t>
+              <a:t>10/1/19</a:t>
             </a:fld>
             <a:endParaRPr lang="en-US"/>
           </a:p>
@@ -1350,7 +1352,7 @@
           <a:p>
             <a:fld id="{7A3245D0-50AE-4E48-A819-54493610A566}" type="datetime1">
               <a:rPr lang="en-US" smtClean="0"/>
-              <a:t>9/30/19</a:t>
+              <a:t>10/1/19</a:t>
             </a:fld>
             <a:endParaRPr lang="en-US"/>
           </a:p>
@@ -1560,7 +1562,7 @@
           <a:p>
             <a:fld id="{0C7C23FF-748B-4842-80C5-56D2EBDE336E}" type="datetime1">
               <a:rPr lang="en-US" smtClean="0"/>
-              <a:t>9/30/19</a:t>
+              <a:t>10/1/19</a:t>
             </a:fld>
             <a:endParaRPr lang="en-US"/>
           </a:p>
@@ -1760,7 +1762,7 @@
           <a:p>
             <a:fld id="{A555C980-071E-1A4E-9EAC-12B930034E6A}" type="datetime1">
               <a:rPr lang="en-US" smtClean="0"/>
-              <a:t>9/30/19</a:t>
+              <a:t>10/1/19</a:t>
             </a:fld>
             <a:endParaRPr lang="en-US"/>
           </a:p>
@@ -2036,7 +2038,7 @@
           <a:p>
             <a:fld id="{F288DA12-226B-EE4D-B48D-FDD665D57190}" type="datetime1">
               <a:rPr lang="en-US" smtClean="0"/>
-              <a:t>9/30/19</a:t>
+              <a:t>10/1/19</a:t>
             </a:fld>
             <a:endParaRPr lang="en-US"/>
           </a:p>
@@ -2304,7 +2306,7 @@
           <a:p>
             <a:fld id="{86E294C4-7CC9-054D-8CBC-0B705AD1662E}" type="datetime1">
               <a:rPr lang="en-US" smtClean="0"/>
-              <a:t>9/30/19</a:t>
+              <a:t>10/1/19</a:t>
             </a:fld>
             <a:endParaRPr lang="en-US"/>
           </a:p>
@@ -2719,7 +2721,7 @@
           <a:p>
             <a:fld id="{E0BBC08A-683B-2C4F-9179-89ED3CF80E6B}" type="datetime1">
               <a:rPr lang="en-US" smtClean="0"/>
-              <a:t>9/30/19</a:t>
+              <a:t>10/1/19</a:t>
             </a:fld>
             <a:endParaRPr lang="en-US"/>
           </a:p>
@@ -2861,7 +2863,7 @@
           <a:p>
             <a:fld id="{7076B4AE-5F98-D848-A1AC-3871015197B3}" type="datetime1">
               <a:rPr lang="en-US" smtClean="0"/>
-              <a:t>9/30/19</a:t>
+              <a:t>10/1/19</a:t>
             </a:fld>
             <a:endParaRPr lang="en-US"/>
           </a:p>
@@ -2974,7 +2976,7 @@
           <a:p>
             <a:fld id="{4BF4FF16-26BC-C642-826A-679D1A4897A3}" type="datetime1">
               <a:rPr lang="en-US" smtClean="0"/>
-              <a:t>9/30/19</a:t>
+              <a:t>10/1/19</a:t>
             </a:fld>
             <a:endParaRPr lang="en-US"/>
           </a:p>
@@ -3287,7 +3289,7 @@
           <a:p>
             <a:fld id="{79F78B35-4F27-E748-B0B3-0263757F6F12}" type="datetime1">
               <a:rPr lang="en-US" smtClean="0"/>
-              <a:t>9/30/19</a:t>
+              <a:t>10/1/19</a:t>
             </a:fld>
             <a:endParaRPr lang="en-US"/>
           </a:p>
@@ -3576,7 +3578,7 @@
           <a:p>
             <a:fld id="{B40812EA-29AA-DD44-A11F-B05850B2B441}" type="datetime1">
               <a:rPr lang="en-US" smtClean="0"/>
-              <a:t>9/30/19</a:t>
+              <a:t>10/1/19</a:t>
             </a:fld>
             <a:endParaRPr lang="en-US"/>
           </a:p>
@@ -3819,7 +3821,7 @@
           <a:p>
             <a:fld id="{8A1324F1-C46E-094B-ACA6-E74C304AF854}" type="datetime1">
               <a:rPr lang="en-US" smtClean="0"/>
-              <a:t>9/30/19</a:t>
+              <a:t>10/1/19</a:t>
             </a:fld>
             <a:endParaRPr lang="en-US"/>
           </a:p>
@@ -4258,6 +4260,200 @@
 </p:sld>
 </file>
 
+<file path=ppt/slides/slide10.xml><?xml version="1.0" encoding="utf-8"?>
+<p:sld xmlns:a="http://schemas.openxmlformats.org/drawingml/2006/main" xmlns:r="http://schemas.openxmlformats.org/officeDocument/2006/relationships" xmlns:p="http://schemas.openxmlformats.org/presentationml/2006/main">
+  <p:cSld>
+    <p:spTree>
+      <p:nvGrpSpPr>
+        <p:cNvPr id="1" name=""/>
+        <p:cNvGrpSpPr/>
+        <p:nvPr/>
+      </p:nvGrpSpPr>
+      <p:grpSpPr>
+        <a:xfrm>
+          <a:off x="0" y="0"/>
+          <a:ext cx="0" cy="0"/>
+          <a:chOff x="0" y="0"/>
+          <a:chExt cx="0" cy="0"/>
+        </a:xfrm>
+      </p:grpSpPr>
+      <p:sp>
+        <p:nvSpPr>
+          <p:cNvPr id="7" name="Rectangle 6">
+            <a:extLst>
+              <a:ext uri="{FF2B5EF4-FFF2-40B4-BE49-F238E27FC236}">
+                <a16:creationId xmlns:a16="http://schemas.microsoft.com/office/drawing/2014/main" id="{B32872A6-286D-C644-8DBC-D6F3A98FE1B5}"/>
+              </a:ext>
+            </a:extLst>
+          </p:cNvPr>
+          <p:cNvSpPr/>
+          <p:nvPr/>
+        </p:nvSpPr>
+        <p:spPr>
+          <a:xfrm>
+            <a:off x="0" y="0"/>
+            <a:ext cx="12192000" cy="6858000"/>
+          </a:xfrm>
+          <a:prstGeom prst="rect">
+            <a:avLst/>
+          </a:prstGeom>
+          <a:solidFill>
+            <a:srgbClr val="FF6B6B"/>
+          </a:solidFill>
+        </p:spPr>
+        <p:style>
+          <a:lnRef idx="2">
+            <a:schemeClr val="accent1">
+              <a:shade val="50000"/>
+            </a:schemeClr>
+          </a:lnRef>
+          <a:fillRef idx="1">
+            <a:schemeClr val="accent1"/>
+          </a:fillRef>
+          <a:effectRef idx="0">
+            <a:schemeClr val="accent1"/>
+          </a:effectRef>
+          <a:fontRef idx="minor">
+            <a:schemeClr val="lt1"/>
+          </a:fontRef>
+        </p:style>
+        <p:txBody>
+          <a:bodyPr rtlCol="0" anchor="ctr"/>
+          <a:lstStyle/>
+          <a:p>
+            <a:pPr algn="ctr"/>
+            <a:endParaRPr lang="en-US"/>
+          </a:p>
+        </p:txBody>
+      </p:sp>
+      <p:sp>
+        <p:nvSpPr>
+          <p:cNvPr id="8" name="Oval 7">
+            <a:extLst>
+              <a:ext uri="{FF2B5EF4-FFF2-40B4-BE49-F238E27FC236}">
+                <a16:creationId xmlns:a16="http://schemas.microsoft.com/office/drawing/2014/main" id="{8D790786-99E4-B24C-848A-435B11B96EBE}"/>
+              </a:ext>
+            </a:extLst>
+          </p:cNvPr>
+          <p:cNvSpPr/>
+          <p:nvPr/>
+        </p:nvSpPr>
+        <p:spPr>
+          <a:xfrm>
+            <a:off x="1907822" y="1546578"/>
+            <a:ext cx="8534400" cy="3849511"/>
+          </a:xfrm>
+          <a:prstGeom prst="ellipse">
+            <a:avLst/>
+          </a:prstGeom>
+          <a:solidFill>
+            <a:schemeClr val="bg1">
+              <a:alpha val="0"/>
+            </a:schemeClr>
+          </a:solidFill>
+          <a:ln>
+            <a:noFill/>
+          </a:ln>
+          <a:effectLst>
+            <a:glow rad="1905000">
+              <a:schemeClr val="bg1">
+                <a:alpha val="16000"/>
+              </a:schemeClr>
+            </a:glow>
+          </a:effectLst>
+        </p:spPr>
+        <p:style>
+          <a:lnRef idx="2">
+            <a:schemeClr val="accent1">
+              <a:shade val="50000"/>
+            </a:schemeClr>
+          </a:lnRef>
+          <a:fillRef idx="1">
+            <a:schemeClr val="accent1"/>
+          </a:fillRef>
+          <a:effectRef idx="0">
+            <a:schemeClr val="accent1"/>
+          </a:effectRef>
+          <a:fontRef idx="minor">
+            <a:schemeClr val="lt1"/>
+          </a:fontRef>
+        </p:style>
+        <p:txBody>
+          <a:bodyPr rtlCol="0" anchor="ctr"/>
+          <a:lstStyle/>
+          <a:p>
+            <a:pPr algn="ctr"/>
+            <a:endParaRPr lang="en-US"/>
+          </a:p>
+        </p:txBody>
+      </p:sp>
+      <p:sp>
+        <p:nvSpPr>
+          <p:cNvPr id="5" name="Rectangle 4">
+            <a:extLst>
+              <a:ext uri="{FF2B5EF4-FFF2-40B4-BE49-F238E27FC236}">
+                <a16:creationId xmlns:a16="http://schemas.microsoft.com/office/drawing/2014/main" id="{3BEB164D-1A47-9247-8C0A-E4915C296D76}"/>
+              </a:ext>
+            </a:extLst>
+          </p:cNvPr>
+          <p:cNvSpPr/>
+          <p:nvPr/>
+        </p:nvSpPr>
+        <p:spPr>
+          <a:xfrm>
+            <a:off x="4924012" y="3209723"/>
+            <a:ext cx="2343976" cy="523220"/>
+          </a:xfrm>
+          <a:prstGeom prst="rect">
+            <a:avLst/>
+          </a:prstGeom>
+        </p:spPr>
+        <p:txBody>
+          <a:bodyPr wrap="none" anchor="b">
+            <a:spAutoFit/>
+          </a:bodyPr>
+          <a:lstStyle/>
+          <a:p>
+            <a:pPr algn="r"/>
+            <a:r>
+              <a:rPr lang="en-US" sz="2800" i="0" dirty="0">
+                <a:solidFill>
+                  <a:schemeClr val="bg1"/>
+                </a:solidFill>
+                <a:effectLst/>
+                <a:latin typeface="Arial Rounded MT Bold" panose="020F0704030504030204" pitchFamily="34" charset="77"/>
+                <a:ea typeface="STHupo" panose="02010800040101010101" pitchFamily="2" charset="-122"/>
+                <a:cs typeface="Aharoni" panose="02010803020104030203" pitchFamily="2" charset="-79"/>
+              </a:rPr>
+              <a:t>THANK YOU</a:t>
+            </a:r>
+            <a:endParaRPr lang="en-US" sz="2800" dirty="0">
+              <a:solidFill>
+                <a:schemeClr val="bg1"/>
+              </a:solidFill>
+              <a:latin typeface="Arial Rounded MT Bold" panose="020F0704030504030204" pitchFamily="34" charset="77"/>
+              <a:ea typeface="STHupo" panose="02010800040101010101" pitchFamily="2" charset="-122"/>
+              <a:cs typeface="Aharoni" panose="02010803020104030203" pitchFamily="2" charset="-79"/>
+            </a:endParaRPr>
+          </a:p>
+        </p:txBody>
+      </p:sp>
+    </p:spTree>
+    <p:extLst>
+      <p:ext uri="{BB962C8B-B14F-4D97-AF65-F5344CB8AC3E}">
+        <p14:creationId xmlns:p14="http://schemas.microsoft.com/office/powerpoint/2010/main" val="4189793258"/>
+      </p:ext>
+    </p:extLst>
+  </p:cSld>
+  <p:clrMapOvr>
+    <a:masterClrMapping/>
+  </p:clrMapOvr>
+  <p:transition spd="slow">
+    <p:cover dir="d"/>
+  </p:transition>
+</p:sld>
+</file>
+
 <file path=ppt/slides/slide2.xml><?xml version="1.0" encoding="utf-8"?>
 <p:sld xmlns:a="http://schemas.openxmlformats.org/drawingml/2006/main" xmlns:r="http://schemas.openxmlformats.org/officeDocument/2006/relationships" xmlns:p="http://schemas.openxmlformats.org/presentationml/2006/main">
   <p:cSld>
@@ -5377,148 +5573,14 @@
               </a:buClr>
               <a:buNone/>
             </a:pPr>
-            <a:r>
-              <a:rPr lang="en-US" dirty="0">
-                <a:solidFill>
-                  <a:schemeClr val="bg1"/>
-                </a:solidFill>
-                <a:latin typeface="Arial Rounded MT Bold" panose="020F0704030504030204" pitchFamily="34" charset="77"/>
-                <a:ea typeface="STHupo" panose="02010800040101010101" pitchFamily="2" charset="-122"/>
-                <a:cs typeface="Aharoni" panose="02010803020104030203" pitchFamily="2" charset="-79"/>
-              </a:rPr>
-              <a:t>We assume that</a:t>
-            </a:r>
-            <a:r>
-              <a:rPr lang="en-US" dirty="0">
-                <a:solidFill>
-                  <a:srgbClr val="5E2828"/>
-                </a:solidFill>
-                <a:latin typeface="Arial Rounded MT Bold" panose="020F0704030504030204" pitchFamily="34" charset="77"/>
-                <a:ea typeface="STHupo" panose="02010800040101010101" pitchFamily="2" charset="-122"/>
-                <a:cs typeface="Aharoni" panose="02010803020104030203" pitchFamily="2" charset="-79"/>
-              </a:rPr>
-              <a:t>:</a:t>
-            </a:r>
-          </a:p>
-          <a:p>
-            <a:pPr marL="0" indent="0">
-              <a:buClr>
-                <a:schemeClr val="bg1"/>
-              </a:buClr>
-              <a:buNone/>
-            </a:pPr>
             <a:endParaRPr lang="en-US" dirty="0">
               <a:solidFill>
-                <a:srgbClr val="5E2828"/>
+                <a:schemeClr val="bg1"/>
               </a:solidFill>
               <a:latin typeface="Arial Rounded MT Bold" panose="020F0704030504030204" pitchFamily="34" charset="77"/>
               <a:ea typeface="STHupo" panose="02010800040101010101" pitchFamily="2" charset="-122"/>
               <a:cs typeface="Aharoni" panose="02010803020104030203" pitchFamily="2" charset="-79"/>
             </a:endParaRPr>
-          </a:p>
-          <a:p>
-            <a:pPr>
-              <a:buClr>
-                <a:schemeClr val="bg1"/>
-              </a:buClr>
-            </a:pPr>
-            <a:r>
-              <a:rPr lang="en-US" dirty="0">
-                <a:solidFill>
-                  <a:srgbClr val="5E2828"/>
-                </a:solidFill>
-                <a:latin typeface="Arial Rounded MT Bold" panose="020F0704030504030204" pitchFamily="34" charset="77"/>
-                <a:ea typeface="STHupo" panose="02010800040101010101" pitchFamily="2" charset="-122"/>
-                <a:cs typeface="Aharoni" panose="02010803020104030203" pitchFamily="2" charset="-79"/>
-              </a:rPr>
-              <a:t>Affordable Daycare</a:t>
-            </a:r>
-          </a:p>
-          <a:p>
-            <a:pPr>
-              <a:buClr>
-                <a:schemeClr val="bg1"/>
-              </a:buClr>
-            </a:pPr>
-            <a:r>
-              <a:rPr lang="en-US" dirty="0">
-                <a:solidFill>
-                  <a:srgbClr val="5E2828"/>
-                </a:solidFill>
-                <a:latin typeface="Arial Rounded MT Bold" panose="020F0704030504030204" pitchFamily="34" charset="77"/>
-                <a:ea typeface="STHupo" panose="02010800040101010101" pitchFamily="2" charset="-122"/>
-                <a:cs typeface="Aharoni" panose="02010803020104030203" pitchFamily="2" charset="-79"/>
-              </a:rPr>
-              <a:t>Flexible Daycare</a:t>
-            </a:r>
-          </a:p>
-          <a:p>
-            <a:pPr marL="0" indent="0">
-              <a:buClr>
-                <a:schemeClr val="bg1"/>
-              </a:buClr>
-              <a:buNone/>
-            </a:pPr>
-            <a:endParaRPr lang="en-US" dirty="0">
-              <a:solidFill>
-                <a:srgbClr val="5E2828"/>
-              </a:solidFill>
-              <a:latin typeface="Arial Rounded MT Bold" panose="020F0704030504030204" pitchFamily="34" charset="77"/>
-              <a:ea typeface="STHupo" panose="02010800040101010101" pitchFamily="2" charset="-122"/>
-              <a:cs typeface="Aharoni" panose="02010803020104030203" pitchFamily="2" charset="-79"/>
-            </a:endParaRPr>
-          </a:p>
-          <a:p>
-            <a:pPr marL="0" indent="0">
-              <a:buClr>
-                <a:schemeClr val="bg1"/>
-              </a:buClr>
-              <a:buNone/>
-            </a:pPr>
-            <a:r>
-              <a:rPr lang="en-US" dirty="0">
-                <a:solidFill>
-                  <a:srgbClr val="5E2828"/>
-                </a:solidFill>
-                <a:latin typeface="Arial Rounded MT Bold" panose="020F0704030504030204" pitchFamily="34" charset="77"/>
-                <a:ea typeface="STHupo" panose="02010800040101010101" pitchFamily="2" charset="-122"/>
-                <a:cs typeface="Aharoni" panose="02010803020104030203" pitchFamily="2" charset="-79"/>
-              </a:rPr>
-              <a:t>The rest </a:t>
-            </a:r>
-            <a:r>
-              <a:rPr lang="en-US" dirty="0">
-                <a:solidFill>
-                  <a:schemeClr val="bg1"/>
-                </a:solidFill>
-                <a:latin typeface="Arial Rounded MT Bold" panose="020F0704030504030204" pitchFamily="34" charset="77"/>
-                <a:ea typeface="STHupo" panose="02010800040101010101" pitchFamily="2" charset="-122"/>
-                <a:cs typeface="Aharoni" panose="02010803020104030203" pitchFamily="2" charset="-79"/>
-              </a:rPr>
-              <a:t>we’ll have to figure out </a:t>
-            </a:r>
-            <a:r>
-              <a:rPr lang="en-US" dirty="0">
-                <a:solidFill>
-                  <a:srgbClr val="5E2828"/>
-                </a:solidFill>
-                <a:latin typeface="Arial Rounded MT Bold" panose="020F0704030504030204" pitchFamily="34" charset="77"/>
-                <a:ea typeface="STHupo" panose="02010800040101010101" pitchFamily="2" charset="-122"/>
-                <a:cs typeface="Aharoni" panose="02010803020104030203" pitchFamily="2" charset="-79"/>
-              </a:rPr>
-              <a:t>later</a:t>
-            </a:r>
-            <a:r>
-              <a:rPr lang="en-US" dirty="0">
-                <a:solidFill>
-                  <a:schemeClr val="bg1"/>
-                </a:solidFill>
-                <a:latin typeface="Arial Rounded MT Bold" panose="020F0704030504030204" pitchFamily="34" charset="77"/>
-                <a:ea typeface="STHupo" panose="02010800040101010101" pitchFamily="2" charset="-122"/>
-                <a:cs typeface="Aharoni" panose="02010803020104030203" pitchFamily="2" charset="-79"/>
-              </a:rPr>
-              <a:t>!</a:t>
-            </a:r>
           </a:p>
         </p:txBody>
       </p:sp>
@@ -5694,6 +5756,442 @@
                 <a:ea typeface="STHupo" panose="02010800040101010101" pitchFamily="2" charset="-122"/>
                 <a:cs typeface="Aharoni" panose="02010803020104030203" pitchFamily="2" charset="-79"/>
               </a:rPr>
+              <a:t>Problem</a:t>
+            </a:r>
+            <a:endParaRPr lang="en-US" dirty="0">
+              <a:solidFill>
+                <a:schemeClr val="bg1"/>
+              </a:solidFill>
+            </a:endParaRPr>
+          </a:p>
+        </p:txBody>
+      </p:sp>
+    </p:spTree>
+    <p:extLst>
+      <p:ext uri="{BB962C8B-B14F-4D97-AF65-F5344CB8AC3E}">
+        <p14:creationId xmlns:p14="http://schemas.microsoft.com/office/powerpoint/2010/main" val="1905208246"/>
+      </p:ext>
+    </p:extLst>
+  </p:cSld>
+  <p:clrMapOvr>
+    <a:masterClrMapping/>
+  </p:clrMapOvr>
+  <p:transition spd="slow">
+    <p:push dir="d"/>
+  </p:transition>
+</p:sld>
+</file>
+
+<file path=ppt/slides/slide5.xml><?xml version="1.0" encoding="utf-8"?>
+<p:sld xmlns:a="http://schemas.openxmlformats.org/drawingml/2006/main" xmlns:r="http://schemas.openxmlformats.org/officeDocument/2006/relationships" xmlns:p="http://schemas.openxmlformats.org/presentationml/2006/main">
+  <p:cSld>
+    <p:spTree>
+      <p:nvGrpSpPr>
+        <p:cNvPr id="1" name=""/>
+        <p:cNvGrpSpPr/>
+        <p:nvPr/>
+      </p:nvGrpSpPr>
+      <p:grpSpPr>
+        <a:xfrm>
+          <a:off x="0" y="0"/>
+          <a:ext cx="0" cy="0"/>
+          <a:chOff x="0" y="0"/>
+          <a:chExt cx="0" cy="0"/>
+        </a:xfrm>
+      </p:grpSpPr>
+      <p:sp>
+        <p:nvSpPr>
+          <p:cNvPr id="4" name="Rectangle 3">
+            <a:extLst>
+              <a:ext uri="{FF2B5EF4-FFF2-40B4-BE49-F238E27FC236}">
+                <a16:creationId xmlns:a16="http://schemas.microsoft.com/office/drawing/2014/main" id="{2F81B1B0-61EE-654F-A9DA-36E186FA968C}"/>
+              </a:ext>
+            </a:extLst>
+          </p:cNvPr>
+          <p:cNvSpPr/>
+          <p:nvPr/>
+        </p:nvSpPr>
+        <p:spPr>
+          <a:xfrm>
+            <a:off x="0" y="0"/>
+            <a:ext cx="12192000" cy="6858000"/>
+          </a:xfrm>
+          <a:prstGeom prst="rect">
+            <a:avLst/>
+          </a:prstGeom>
+          <a:solidFill>
+            <a:srgbClr val="FF6B6B"/>
+          </a:solidFill>
+        </p:spPr>
+        <p:style>
+          <a:lnRef idx="2">
+            <a:schemeClr val="accent1">
+              <a:shade val="50000"/>
+            </a:schemeClr>
+          </a:lnRef>
+          <a:fillRef idx="1">
+            <a:schemeClr val="accent1"/>
+          </a:fillRef>
+          <a:effectRef idx="0">
+            <a:schemeClr val="accent1"/>
+          </a:effectRef>
+          <a:fontRef idx="minor">
+            <a:schemeClr val="lt1"/>
+          </a:fontRef>
+        </p:style>
+        <p:txBody>
+          <a:bodyPr rtlCol="0" anchor="ctr"/>
+          <a:lstStyle/>
+          <a:p>
+            <a:pPr algn="ctr"/>
+            <a:endParaRPr lang="en-US"/>
+          </a:p>
+        </p:txBody>
+      </p:sp>
+      <p:sp>
+        <p:nvSpPr>
+          <p:cNvPr id="3" name="Content Placeholder 2">
+            <a:extLst>
+              <a:ext uri="{FF2B5EF4-FFF2-40B4-BE49-F238E27FC236}">
+                <a16:creationId xmlns:a16="http://schemas.microsoft.com/office/drawing/2014/main" id="{9B76DAF4-1829-A544-BA03-FB6DB10C12C8}"/>
+              </a:ext>
+            </a:extLst>
+          </p:cNvPr>
+          <p:cNvSpPr>
+            <a:spLocks noGrp="1"/>
+          </p:cNvSpPr>
+          <p:nvPr>
+            <p:ph idx="1"/>
+          </p:nvPr>
+        </p:nvSpPr>
+        <p:spPr/>
+        <p:txBody>
+          <a:bodyPr/>
+          <a:lstStyle/>
+          <a:p>
+            <a:pPr marL="0" indent="0">
+              <a:buClr>
+                <a:schemeClr val="bg1"/>
+              </a:buClr>
+              <a:buNone/>
+            </a:pPr>
+            <a:r>
+              <a:rPr lang="en-US" dirty="0">
+                <a:solidFill>
+                  <a:schemeClr val="bg1"/>
+                </a:solidFill>
+                <a:latin typeface="Arial Rounded MT Bold" panose="020F0704030504030204" pitchFamily="34" charset="77"/>
+                <a:ea typeface="STHupo" panose="02010800040101010101" pitchFamily="2" charset="-122"/>
+                <a:cs typeface="Aharoni" panose="02010803020104030203" pitchFamily="2" charset="-79"/>
+              </a:rPr>
+              <a:t>We assume that</a:t>
+            </a:r>
+            <a:r>
+              <a:rPr lang="en-US" dirty="0">
+                <a:solidFill>
+                  <a:srgbClr val="5E2828"/>
+                </a:solidFill>
+                <a:latin typeface="Arial Rounded MT Bold" panose="020F0704030504030204" pitchFamily="34" charset="77"/>
+                <a:ea typeface="STHupo" panose="02010800040101010101" pitchFamily="2" charset="-122"/>
+                <a:cs typeface="Aharoni" panose="02010803020104030203" pitchFamily="2" charset="-79"/>
+              </a:rPr>
+              <a:t>:</a:t>
+            </a:r>
+          </a:p>
+          <a:p>
+            <a:pPr marL="0" indent="0">
+              <a:buClr>
+                <a:schemeClr val="bg1"/>
+              </a:buClr>
+              <a:buNone/>
+            </a:pPr>
+            <a:endParaRPr lang="en-US" dirty="0">
+              <a:solidFill>
+                <a:srgbClr val="5E2828"/>
+              </a:solidFill>
+              <a:latin typeface="Arial Rounded MT Bold" panose="020F0704030504030204" pitchFamily="34" charset="77"/>
+              <a:ea typeface="STHupo" panose="02010800040101010101" pitchFamily="2" charset="-122"/>
+              <a:cs typeface="Aharoni" panose="02010803020104030203" pitchFamily="2" charset="-79"/>
+            </a:endParaRPr>
+          </a:p>
+          <a:p>
+            <a:pPr>
+              <a:buClr>
+                <a:schemeClr val="bg1"/>
+              </a:buClr>
+            </a:pPr>
+            <a:r>
+              <a:rPr lang="en-US" dirty="0">
+                <a:solidFill>
+                  <a:srgbClr val="5E2828"/>
+                </a:solidFill>
+                <a:latin typeface="Arial Rounded MT Bold" panose="020F0704030504030204" pitchFamily="34" charset="77"/>
+                <a:ea typeface="STHupo" panose="02010800040101010101" pitchFamily="2" charset="-122"/>
+                <a:cs typeface="Aharoni" panose="02010803020104030203" pitchFamily="2" charset="-79"/>
+              </a:rPr>
+              <a:t>Affordable Daycare</a:t>
+            </a:r>
+          </a:p>
+          <a:p>
+            <a:pPr>
+              <a:buClr>
+                <a:schemeClr val="bg1"/>
+              </a:buClr>
+            </a:pPr>
+            <a:r>
+              <a:rPr lang="en-US" dirty="0">
+                <a:solidFill>
+                  <a:srgbClr val="5E2828"/>
+                </a:solidFill>
+                <a:latin typeface="Arial Rounded MT Bold" panose="020F0704030504030204" pitchFamily="34" charset="77"/>
+                <a:ea typeface="STHupo" panose="02010800040101010101" pitchFamily="2" charset="-122"/>
+                <a:cs typeface="Aharoni" panose="02010803020104030203" pitchFamily="2" charset="-79"/>
+              </a:rPr>
+              <a:t>Flexible Daycare</a:t>
+            </a:r>
+          </a:p>
+          <a:p>
+            <a:pPr marL="0" indent="0">
+              <a:buClr>
+                <a:schemeClr val="bg1"/>
+              </a:buClr>
+              <a:buNone/>
+            </a:pPr>
+            <a:endParaRPr lang="en-US" dirty="0">
+              <a:solidFill>
+                <a:srgbClr val="5E2828"/>
+              </a:solidFill>
+              <a:latin typeface="Arial Rounded MT Bold" panose="020F0704030504030204" pitchFamily="34" charset="77"/>
+              <a:ea typeface="STHupo" panose="02010800040101010101" pitchFamily="2" charset="-122"/>
+              <a:cs typeface="Aharoni" panose="02010803020104030203" pitchFamily="2" charset="-79"/>
+            </a:endParaRPr>
+          </a:p>
+          <a:p>
+            <a:pPr marL="0" indent="0">
+              <a:buClr>
+                <a:schemeClr val="bg1"/>
+              </a:buClr>
+              <a:buNone/>
+            </a:pPr>
+            <a:r>
+              <a:rPr lang="en-US" dirty="0">
+                <a:solidFill>
+                  <a:srgbClr val="5E2828"/>
+                </a:solidFill>
+                <a:latin typeface="Arial Rounded MT Bold" panose="020F0704030504030204" pitchFamily="34" charset="77"/>
+                <a:ea typeface="STHupo" panose="02010800040101010101" pitchFamily="2" charset="-122"/>
+                <a:cs typeface="Aharoni" panose="02010803020104030203" pitchFamily="2" charset="-79"/>
+              </a:rPr>
+              <a:t>The rest </a:t>
+            </a:r>
+            <a:r>
+              <a:rPr lang="en-US" dirty="0">
+                <a:solidFill>
+                  <a:schemeClr val="bg1"/>
+                </a:solidFill>
+                <a:latin typeface="Arial Rounded MT Bold" panose="020F0704030504030204" pitchFamily="34" charset="77"/>
+                <a:ea typeface="STHupo" panose="02010800040101010101" pitchFamily="2" charset="-122"/>
+                <a:cs typeface="Aharoni" panose="02010803020104030203" pitchFamily="2" charset="-79"/>
+              </a:rPr>
+              <a:t>we’ll have to figure out </a:t>
+            </a:r>
+            <a:r>
+              <a:rPr lang="en-US" dirty="0">
+                <a:solidFill>
+                  <a:srgbClr val="5E2828"/>
+                </a:solidFill>
+                <a:latin typeface="Arial Rounded MT Bold" panose="020F0704030504030204" pitchFamily="34" charset="77"/>
+                <a:ea typeface="STHupo" panose="02010800040101010101" pitchFamily="2" charset="-122"/>
+                <a:cs typeface="Aharoni" panose="02010803020104030203" pitchFamily="2" charset="-79"/>
+              </a:rPr>
+              <a:t>later</a:t>
+            </a:r>
+            <a:r>
+              <a:rPr lang="en-US" dirty="0">
+                <a:solidFill>
+                  <a:schemeClr val="bg1"/>
+                </a:solidFill>
+                <a:latin typeface="Arial Rounded MT Bold" panose="020F0704030504030204" pitchFamily="34" charset="77"/>
+                <a:ea typeface="STHupo" panose="02010800040101010101" pitchFamily="2" charset="-122"/>
+                <a:cs typeface="Aharoni" panose="02010803020104030203" pitchFamily="2" charset="-79"/>
+              </a:rPr>
+              <a:t>!</a:t>
+            </a:r>
+          </a:p>
+        </p:txBody>
+      </p:sp>
+      <p:sp>
+        <p:nvSpPr>
+          <p:cNvPr id="6" name="Pie 5">
+            <a:extLst>
+              <a:ext uri="{FF2B5EF4-FFF2-40B4-BE49-F238E27FC236}">
+                <a16:creationId xmlns:a16="http://schemas.microsoft.com/office/drawing/2014/main" id="{4DE4BC92-D240-704C-A90C-AAEB4EF0AB9B}"/>
+              </a:ext>
+            </a:extLst>
+          </p:cNvPr>
+          <p:cNvSpPr/>
+          <p:nvPr/>
+        </p:nvSpPr>
+        <p:spPr>
+          <a:xfrm>
+            <a:off x="9570697" y="4226064"/>
+            <a:ext cx="5263871" cy="5263871"/>
+          </a:xfrm>
+          <a:prstGeom prst="pie">
+            <a:avLst>
+              <a:gd name="adj1" fmla="val 10781590"/>
+              <a:gd name="adj2" fmla="val 16200000"/>
+            </a:avLst>
+          </a:prstGeom>
+          <a:solidFill>
+            <a:schemeClr val="bg1"/>
+          </a:solidFill>
+          <a:ln>
+            <a:noFill/>
+          </a:ln>
+        </p:spPr>
+        <p:style>
+          <a:lnRef idx="2">
+            <a:schemeClr val="accent1">
+              <a:shade val="50000"/>
+            </a:schemeClr>
+          </a:lnRef>
+          <a:fillRef idx="1">
+            <a:schemeClr val="accent1"/>
+          </a:fillRef>
+          <a:effectRef idx="0">
+            <a:schemeClr val="accent1"/>
+          </a:effectRef>
+          <a:fontRef idx="minor">
+            <a:schemeClr val="lt1"/>
+          </a:fontRef>
+        </p:style>
+        <p:txBody>
+          <a:bodyPr rtlCol="0" anchor="ctr"/>
+          <a:lstStyle/>
+          <a:p>
+            <a:pPr algn="ctr"/>
+            <a:endParaRPr lang="en-US" dirty="0">
+              <a:solidFill>
+                <a:schemeClr val="tx1"/>
+              </a:solidFill>
+            </a:endParaRPr>
+          </a:p>
+        </p:txBody>
+      </p:sp>
+      <p:sp>
+        <p:nvSpPr>
+          <p:cNvPr id="7" name="Slide Number Placeholder 6">
+            <a:extLst>
+              <a:ext uri="{FF2B5EF4-FFF2-40B4-BE49-F238E27FC236}">
+                <a16:creationId xmlns:a16="http://schemas.microsoft.com/office/drawing/2014/main" id="{ACFDEBC2-BC20-1D49-B8A7-9C94F48BE1E4}"/>
+              </a:ext>
+            </a:extLst>
+          </p:cNvPr>
+          <p:cNvSpPr>
+            <a:spLocks noGrp="1"/>
+          </p:cNvSpPr>
+          <p:nvPr>
+            <p:ph type="sldNum" sz="quarter" idx="12"/>
+          </p:nvPr>
+        </p:nvSpPr>
+        <p:spPr>
+          <a:xfrm>
+            <a:off x="9001478" y="3667478"/>
+            <a:ext cx="2949517" cy="3190522"/>
+          </a:xfrm>
+        </p:spPr>
+        <p:txBody>
+          <a:bodyPr anchor="b"/>
+          <a:lstStyle/>
+          <a:p>
+            <a:r>
+              <a:rPr lang="en-US" sz="9600" dirty="0">
+                <a:solidFill>
+                  <a:srgbClr val="5E2828"/>
+                </a:solidFill>
+                <a:latin typeface="Arial Rounded MT Bold" panose="020F0704030504030204" pitchFamily="34" charset="77"/>
+                <a:ea typeface="STHupo" panose="02010800040101010101" pitchFamily="2" charset="-122"/>
+                <a:cs typeface="Aharoni" panose="02010803020104030203" pitchFamily="2" charset="-79"/>
+              </a:rPr>
+              <a:t>2</a:t>
+            </a:r>
+          </a:p>
+        </p:txBody>
+      </p:sp>
+      <p:cxnSp>
+        <p:nvCxnSpPr>
+          <p:cNvPr id="9" name="Straight Connector 8">
+            <a:extLst>
+              <a:ext uri="{FF2B5EF4-FFF2-40B4-BE49-F238E27FC236}">
+                <a16:creationId xmlns:a16="http://schemas.microsoft.com/office/drawing/2014/main" id="{24235FEA-2336-8C40-A5E6-3A6B920160EF}"/>
+              </a:ext>
+            </a:extLst>
+          </p:cNvPr>
+          <p:cNvCxnSpPr/>
+          <p:nvPr/>
+        </p:nvCxnSpPr>
+        <p:spPr>
+          <a:xfrm>
+            <a:off x="829340" y="1254639"/>
+            <a:ext cx="10526232" cy="0"/>
+          </a:xfrm>
+          <a:prstGeom prst="line">
+            <a:avLst/>
+          </a:prstGeom>
+          <a:ln w="25400">
+            <a:solidFill>
+              <a:srgbClr val="5E2828"/>
+            </a:solidFill>
+          </a:ln>
+        </p:spPr>
+        <p:style>
+          <a:lnRef idx="1">
+            <a:schemeClr val="accent1"/>
+          </a:lnRef>
+          <a:fillRef idx="0">
+            <a:schemeClr val="accent1"/>
+          </a:fillRef>
+          <a:effectRef idx="0">
+            <a:schemeClr val="accent1"/>
+          </a:effectRef>
+          <a:fontRef idx="minor">
+            <a:schemeClr val="tx1"/>
+          </a:fontRef>
+        </p:style>
+      </p:cxnSp>
+      <p:sp>
+        <p:nvSpPr>
+          <p:cNvPr id="2" name="Title 1">
+            <a:extLst>
+              <a:ext uri="{FF2B5EF4-FFF2-40B4-BE49-F238E27FC236}">
+                <a16:creationId xmlns:a16="http://schemas.microsoft.com/office/drawing/2014/main" id="{ED95F1F0-9F8F-8C4B-A474-3896F352A498}"/>
+              </a:ext>
+            </a:extLst>
+          </p:cNvPr>
+          <p:cNvSpPr>
+            <a:spLocks noGrp="1"/>
+          </p:cNvSpPr>
+          <p:nvPr>
+            <p:ph type="title"/>
+          </p:nvPr>
+        </p:nvSpPr>
+        <p:spPr/>
+        <p:txBody>
+          <a:bodyPr>
+            <a:normAutofit/>
+          </a:bodyPr>
+          <a:lstStyle/>
+          <a:p>
+            <a:r>
+              <a:rPr lang="en-US" dirty="0">
+                <a:solidFill>
+                  <a:schemeClr val="bg1"/>
+                </a:solidFill>
+                <a:latin typeface="Arial Rounded MT Bold" panose="020F0704030504030204" pitchFamily="34" charset="77"/>
+                <a:ea typeface="STHupo" panose="02010800040101010101" pitchFamily="2" charset="-122"/>
+                <a:cs typeface="Aharoni" panose="02010803020104030203" pitchFamily="2" charset="-79"/>
+              </a:rPr>
               <a:t>Requirements of a Modern Family</a:t>
             </a:r>
             <a:endParaRPr lang="en-US" dirty="0">
@@ -5720,7 +6218,7 @@
 </p:sld>
 </file>
 
-<file path=ppt/slides/slide5.xml><?xml version="1.0" encoding="utf-8"?>
+<file path=ppt/slides/slide6.xml><?xml version="1.0" encoding="utf-8"?>
 <p:sld xmlns:a="http://schemas.openxmlformats.org/drawingml/2006/main" xmlns:r="http://schemas.openxmlformats.org/officeDocument/2006/relationships" xmlns:p="http://schemas.openxmlformats.org/presentationml/2006/main">
   <p:cSld>
     <p:spTree>
@@ -6350,7 +6848,7 @@
 </p:sld>
 </file>
 
-<file path=ppt/slides/slide6.xml><?xml version="1.0" encoding="utf-8"?>
+<file path=ppt/slides/slide7.xml><?xml version="1.0" encoding="utf-8"?>
 <p:sld xmlns:a="http://schemas.openxmlformats.org/drawingml/2006/main" xmlns:r="http://schemas.openxmlformats.org/officeDocument/2006/relationships" xmlns:p="http://schemas.openxmlformats.org/presentationml/2006/main">
   <p:cSld>
     <p:spTree>
@@ -6381,7 +6879,7 @@
         </p:nvSpPr>
         <p:spPr>
           <a:xfrm>
-            <a:off x="0" y="0"/>
+            <a:off x="0" y="14748"/>
             <a:ext cx="12192000" cy="6858000"/>
           </a:xfrm>
           <a:prstGeom prst="rect">
@@ -6621,7 +7119,7 @@
                 </a:solidFill>
                 <a:latin typeface="Arial Rounded MT Bold" panose="020F0704030504030204" pitchFamily="34" charset="77"/>
               </a:rPr>
-              <a:t> We work in accordance to the principles we embrace, thus validating and verifying our approach throughout our own actions, everyday</a:t>
+              <a:t> We work in accordance to the principles we embrace, thus validating and verifying our approach throughout our own actions</a:t>
             </a:r>
             <a:r>
               <a:rPr lang="en-US" dirty="0">
@@ -6797,7 +7295,7 @@
 </p:sld>
 </file>
 
-<file path=ppt/slides/slide7.xml><?xml version="1.0" encoding="utf-8"?>
+<file path=ppt/slides/slide8.xml><?xml version="1.0" encoding="utf-8"?>
 <p:sld xmlns:a="http://schemas.openxmlformats.org/drawingml/2006/main" xmlns:r="http://schemas.openxmlformats.org/officeDocument/2006/relationships" xmlns:p="http://schemas.openxmlformats.org/presentationml/2006/main">
   <p:cSld>
     <p:spTree>
@@ -6828,7 +7326,7 @@
         </p:nvSpPr>
         <p:spPr>
           <a:xfrm>
-            <a:off x="-3544" y="-1"/>
+            <a:off x="-3544" y="7373"/>
             <a:ext cx="12192000" cy="6858000"/>
           </a:xfrm>
           <a:prstGeom prst="rect">
@@ -7433,6 +7931,22 @@
               <a:t>Team Members</a:t>
             </a:r>
           </a:p>
+          <a:p>
+            <a:pPr>
+              <a:buClr>
+                <a:schemeClr val="bg1"/>
+              </a:buClr>
+            </a:pPr>
+            <a:r>
+              <a:rPr lang="en-US" dirty="0">
+                <a:solidFill>
+                  <a:srgbClr val="5E2828"/>
+                </a:solidFill>
+                <a:latin typeface="Arial Rounded MT Bold" panose="020F0704030504030204" pitchFamily="34" charset="77"/>
+              </a:rPr>
+              <a:t>…</a:t>
+            </a:r>
+          </a:p>
         </p:txBody>
       </p:sp>
     </p:spTree>
@@ -7451,7 +7965,7 @@
 </p:sld>
 </file>
 
-<file path=ppt/slides/slide8.xml><?xml version="1.0" encoding="utf-8"?>
+<file path=ppt/slides/slide9.xml><?xml version="1.0" encoding="utf-8"?>
 <p:sld xmlns:a="http://schemas.openxmlformats.org/drawingml/2006/main" xmlns:r="http://schemas.openxmlformats.org/officeDocument/2006/relationships" xmlns:p="http://schemas.openxmlformats.org/presentationml/2006/main">
   <p:cSld>
     <p:spTree>
@@ -7536,7 +8050,7 @@
         <p:spPr/>
         <p:txBody>
           <a:bodyPr>
-            <a:normAutofit fontScale="92500" lnSpcReduction="10000"/>
+            <a:normAutofit fontScale="85000" lnSpcReduction="20000"/>
           </a:bodyPr>
           <a:lstStyle/>
           <a:p>
@@ -7639,7 +8153,7 @@
                 <a:ea typeface="STHupo" panose="02010800040101010101" pitchFamily="2" charset="-122"/>
                 <a:cs typeface="Aharoni" panose="02010803020104030203" pitchFamily="2" charset="-79"/>
               </a:rPr>
-              <a:t>			</a:t>
+              <a:t>    24</a:t>
             </a:r>
             <a:r>
               <a:rPr lang="en-US" sz="2400" dirty="0">
@@ -7650,7 +8164,7 @@
                 <a:ea typeface="STHupo" panose="02010800040101010101" pitchFamily="2" charset="-122"/>
                 <a:cs typeface="Aharoni" panose="02010803020104030203" pitchFamily="2" charset="-79"/>
               </a:rPr>
-              <a:t>Meetings (</a:t>
+              <a:t>.</a:t>
             </a:r>
             <a:r>
               <a:rPr lang="en-US" sz="2400" dirty="0">
@@ -7661,7 +8175,29 @@
                 <a:ea typeface="STHupo" panose="02010800040101010101" pitchFamily="2" charset="-122"/>
                 <a:cs typeface="Aharoni" panose="02010803020104030203" pitchFamily="2" charset="-79"/>
               </a:rPr>
-              <a:t>Initial Organization</a:t>
+              <a:t>10		</a:t>
+            </a:r>
+            <a:r>
+              <a:rPr lang="en-US" sz="2400" dirty="0">
+                <a:solidFill>
+                  <a:schemeClr val="bg1"/>
+                </a:solidFill>
+                <a:latin typeface="Arial Rounded MT Bold" panose="020F0704030504030204" pitchFamily="34" charset="77"/>
+                <a:ea typeface="STHupo" panose="02010800040101010101" pitchFamily="2" charset="-122"/>
+                <a:cs typeface="Aharoni" panose="02010803020104030203" pitchFamily="2" charset="-79"/>
+              </a:rPr>
+              <a:t>Stakeholder Meetings (</a:t>
+            </a:r>
+            <a:r>
+              <a:rPr lang="en-US" sz="2400" dirty="0">
+                <a:solidFill>
+                  <a:srgbClr val="5E2828"/>
+                </a:solidFill>
+                <a:latin typeface="Arial Rounded MT Bold" panose="020F0704030504030204" pitchFamily="34" charset="77"/>
+                <a:ea typeface="STHupo" panose="02010800040101010101" pitchFamily="2" charset="-122"/>
+                <a:cs typeface="Aharoni" panose="02010803020104030203" pitchFamily="2" charset="-79"/>
+              </a:rPr>
+              <a:t>Organization</a:t>
             </a:r>
             <a:r>
               <a:rPr lang="en-US" sz="2400" dirty="0">
@@ -7691,7 +8227,7 @@
                 <a:ea typeface="STHupo" panose="02010800040101010101" pitchFamily="2" charset="-122"/>
                 <a:cs typeface="Aharoni" panose="02010803020104030203" pitchFamily="2" charset="-79"/>
               </a:rPr>
-              <a:t> 			➜ </a:t>
+              <a:t>			</a:t>
             </a:r>
             <a:r>
               <a:rPr lang="en-US" sz="2400" dirty="0">
@@ -7702,7 +8238,7 @@
                 <a:ea typeface="STHupo" panose="02010800040101010101" pitchFamily="2" charset="-122"/>
                 <a:cs typeface="Aharoni" panose="02010803020104030203" pitchFamily="2" charset="-79"/>
               </a:rPr>
-              <a:t>Approach</a:t>
+              <a:t>Analysis (</a:t>
             </a:r>
             <a:r>
               <a:rPr lang="en-US" sz="2400" dirty="0">
@@ -7713,7 +8249,7 @@
                 <a:ea typeface="STHupo" panose="02010800040101010101" pitchFamily="2" charset="-122"/>
                 <a:cs typeface="Aharoni" panose="02010803020104030203" pitchFamily="2" charset="-79"/>
               </a:rPr>
-              <a:t> +</a:t>
+              <a:t>Requirements Gathering</a:t>
             </a:r>
             <a:r>
               <a:rPr lang="en-US" sz="2400" dirty="0">
@@ -7724,7 +8260,81 @@
                 <a:ea typeface="STHupo" panose="02010800040101010101" pitchFamily="2" charset="-122"/>
                 <a:cs typeface="Aharoni" panose="02010803020104030203" pitchFamily="2" charset="-79"/>
               </a:rPr>
+              <a:t>)</a:t>
+            </a:r>
+          </a:p>
+          <a:p>
+            <a:pPr marL="0" indent="0">
+              <a:buClr>
+                <a:srgbClr val="5E2828"/>
+              </a:buClr>
+              <a:buNone/>
+            </a:pPr>
+            <a:r>
+              <a:rPr lang="en-US" sz="2400" dirty="0">
+                <a:solidFill>
+                  <a:srgbClr val="5E2828"/>
+                </a:solidFill>
+                <a:latin typeface="Arial Rounded MT Bold" panose="020F0704030504030204" pitchFamily="34" charset="77"/>
+                <a:ea typeface="STHupo" panose="02010800040101010101" pitchFamily="2" charset="-122"/>
+                <a:cs typeface="Aharoni" panose="02010803020104030203" pitchFamily="2" charset="-79"/>
+              </a:rPr>
+              <a:t> 			➜ </a:t>
+            </a:r>
+            <a:r>
+              <a:rPr lang="en-US" sz="2400" dirty="0">
+                <a:solidFill>
+                  <a:schemeClr val="bg1"/>
+                </a:solidFill>
+                <a:latin typeface="Arial Rounded MT Bold" panose="020F0704030504030204" pitchFamily="34" charset="77"/>
+                <a:ea typeface="STHupo" panose="02010800040101010101" pitchFamily="2" charset="-122"/>
+                <a:cs typeface="Aharoni" panose="02010803020104030203" pitchFamily="2" charset="-79"/>
+              </a:rPr>
+              <a:t>Approach</a:t>
+            </a:r>
+            <a:r>
+              <a:rPr lang="en-US" sz="2400" dirty="0">
+                <a:solidFill>
+                  <a:srgbClr val="5E2828"/>
+                </a:solidFill>
+                <a:latin typeface="Arial Rounded MT Bold" panose="020F0704030504030204" pitchFamily="34" charset="77"/>
+                <a:ea typeface="STHupo" panose="02010800040101010101" pitchFamily="2" charset="-122"/>
+                <a:cs typeface="Aharoni" panose="02010803020104030203" pitchFamily="2" charset="-79"/>
+              </a:rPr>
+              <a:t> +</a:t>
+            </a:r>
+            <a:r>
+              <a:rPr lang="en-US" sz="2400" dirty="0">
+                <a:solidFill>
+                  <a:schemeClr val="bg1"/>
+                </a:solidFill>
+                <a:latin typeface="Arial Rounded MT Bold" panose="020F0704030504030204" pitchFamily="34" charset="77"/>
+                <a:ea typeface="STHupo" panose="02010800040101010101" pitchFamily="2" charset="-122"/>
+                <a:cs typeface="Aharoni" panose="02010803020104030203" pitchFamily="2" charset="-79"/>
+              </a:rPr>
               <a:t> Timetable</a:t>
+            </a:r>
+            <a:r>
+              <a:rPr lang="en-US" sz="2400" dirty="0">
+                <a:solidFill>
+                  <a:srgbClr val="5E2828"/>
+                </a:solidFill>
+                <a:latin typeface="Arial Rounded MT Bold" panose="020F0704030504030204" pitchFamily="34" charset="77"/>
+                <a:ea typeface="STHupo" panose="02010800040101010101" pitchFamily="2" charset="-122"/>
+                <a:cs typeface="Aharoni" panose="02010803020104030203" pitchFamily="2" charset="-79"/>
+              </a:rPr>
+              <a:t> + </a:t>
+            </a:r>
+            <a:r>
+              <a:rPr lang="en-US" sz="2400" dirty="0">
+                <a:solidFill>
+                  <a:schemeClr val="bg1"/>
+                </a:solidFill>
+                <a:latin typeface="Arial Rounded MT Bold" panose="020F0704030504030204" pitchFamily="34" charset="77"/>
+                <a:ea typeface="STHupo" panose="02010800040101010101" pitchFamily="2" charset="-122"/>
+                <a:cs typeface="Aharoni" panose="02010803020104030203" pitchFamily="2" charset="-79"/>
+              </a:rPr>
+              <a:t>Requirements</a:t>
             </a:r>
           </a:p>
           <a:p>
@@ -7813,7 +8423,7 @@
                 <a:ea typeface="STHupo" panose="02010800040101010101" pitchFamily="2" charset="-122"/>
                 <a:cs typeface="Aharoni" panose="02010803020104030203" pitchFamily="2" charset="-79"/>
               </a:rPr>
-              <a:t>Requirements Gathering</a:t>
+              <a:t>Process Definition</a:t>
             </a:r>
             <a:r>
               <a:rPr lang="en-US" sz="2400" dirty="0">
@@ -7843,7 +8453,29 @@
                 <a:ea typeface="STHupo" panose="02010800040101010101" pitchFamily="2" charset="-122"/>
                 <a:cs typeface="Aharoni" panose="02010803020104030203" pitchFamily="2" charset="-79"/>
               </a:rPr>
-              <a:t>			</a:t>
+              <a:t>    20</a:t>
+            </a:r>
+            <a:r>
+              <a:rPr lang="en-US" sz="2400" dirty="0">
+                <a:solidFill>
+                  <a:schemeClr val="bg1"/>
+                </a:solidFill>
+                <a:latin typeface="Arial Rounded MT Bold" panose="020F0704030504030204" pitchFamily="34" charset="77"/>
+                <a:ea typeface="STHupo" panose="02010800040101010101" pitchFamily="2" charset="-122"/>
+                <a:cs typeface="Aharoni" panose="02010803020104030203" pitchFamily="2" charset="-79"/>
+              </a:rPr>
+              <a:t>.</a:t>
+            </a:r>
+            <a:r>
+              <a:rPr lang="en-US" sz="2400" dirty="0">
+                <a:solidFill>
+                  <a:srgbClr val="5E2828"/>
+                </a:solidFill>
+                <a:latin typeface="Arial Rounded MT Bold" panose="020F0704030504030204" pitchFamily="34" charset="77"/>
+                <a:ea typeface="STHupo" panose="02010800040101010101" pitchFamily="2" charset="-122"/>
+                <a:cs typeface="Aharoni" panose="02010803020104030203" pitchFamily="2" charset="-79"/>
+              </a:rPr>
+              <a:t>11		</a:t>
             </a:r>
             <a:r>
               <a:rPr lang="en-US" sz="2400" dirty="0">
@@ -7939,7 +8571,29 @@
                 <a:ea typeface="STHupo" panose="02010800040101010101" pitchFamily="2" charset="-122"/>
                 <a:cs typeface="Aharoni" panose="02010803020104030203" pitchFamily="2" charset="-79"/>
               </a:rPr>
-              <a:t> Sprint Planning</a:t>
+              <a:t> </a:t>
+            </a:r>
+            <a:r>
+              <a:rPr lang="en-US" sz="2400" dirty="0">
+                <a:solidFill>
+                  <a:srgbClr val="5E2828"/>
+                </a:solidFill>
+                <a:latin typeface="Arial Rounded MT Bold" panose="020F0704030504030204" pitchFamily="34" charset="77"/>
+                <a:ea typeface="STHupo" panose="02010800040101010101" pitchFamily="2" charset="-122"/>
+                <a:cs typeface="Aharoni" panose="02010803020104030203" pitchFamily="2" charset="-79"/>
+              </a:rPr>
+              <a:t>#</a:t>
+            </a:r>
+            <a:r>
+              <a:rPr lang="en-US" sz="2400" dirty="0">
+                <a:solidFill>
+                  <a:schemeClr val="bg1"/>
+                </a:solidFill>
+                <a:latin typeface="Arial Rounded MT Bold" panose="020F0704030504030204" pitchFamily="34" charset="77"/>
+                <a:ea typeface="STHupo" panose="02010800040101010101" pitchFamily="2" charset="-122"/>
+                <a:cs typeface="Aharoni" panose="02010803020104030203" pitchFamily="2" charset="-79"/>
+              </a:rPr>
+              <a:t>3 Sprint Planning</a:t>
             </a:r>
           </a:p>
           <a:p>
@@ -8058,7 +8712,29 @@
                 <a:ea typeface="STHupo" panose="02010800040101010101" pitchFamily="2" charset="-122"/>
                 <a:cs typeface="Aharoni" panose="02010803020104030203" pitchFamily="2" charset="-79"/>
               </a:rPr>
-              <a:t>			</a:t>
+              <a:t>    19</a:t>
+            </a:r>
+            <a:r>
+              <a:rPr lang="en-US" sz="2400" dirty="0">
+                <a:solidFill>
+                  <a:schemeClr val="bg1"/>
+                </a:solidFill>
+                <a:latin typeface="Arial Rounded MT Bold" panose="020F0704030504030204" pitchFamily="34" charset="77"/>
+                <a:ea typeface="STHupo" panose="02010800040101010101" pitchFamily="2" charset="-122"/>
+                <a:cs typeface="Aharoni" panose="02010803020104030203" pitchFamily="2" charset="-79"/>
+              </a:rPr>
+              <a:t>.</a:t>
+            </a:r>
+            <a:r>
+              <a:rPr lang="en-US" sz="2400" dirty="0">
+                <a:solidFill>
+                  <a:srgbClr val="5E2828"/>
+                </a:solidFill>
+                <a:latin typeface="Arial Rounded MT Bold" panose="020F0704030504030204" pitchFamily="34" charset="77"/>
+                <a:ea typeface="STHupo" panose="02010800040101010101" pitchFamily="2" charset="-122"/>
+                <a:cs typeface="Aharoni" panose="02010803020104030203" pitchFamily="2" charset="-79"/>
+              </a:rPr>
+              <a:t>12		</a:t>
             </a:r>
             <a:r>
               <a:rPr lang="en-US" sz="2400" dirty="0">
@@ -8149,7 +8825,7 @@
           <a:p>
             <a:fld id="{E869FCD6-9CD9-BC4A-B46E-5D0910D7B1A4}" type="slidenum">
               <a:rPr lang="en-US" smtClean="0"/>
-              <a:t>8</a:t>
+              <a:t>9</a:t>
             </a:fld>
             <a:endParaRPr lang="en-US"/>
           </a:p>
@@ -8460,200 +9136,6 @@
     <p:extLst>
       <p:ext uri="{BB962C8B-B14F-4D97-AF65-F5344CB8AC3E}">
         <p14:creationId xmlns:p14="http://schemas.microsoft.com/office/powerpoint/2010/main" val="2776289329"/>
-      </p:ext>
-    </p:extLst>
-  </p:cSld>
-  <p:clrMapOvr>
-    <a:masterClrMapping/>
-  </p:clrMapOvr>
-  <p:transition spd="slow">
-    <p:cover dir="d"/>
-  </p:transition>
-</p:sld>
-</file>
-
-<file path=ppt/slides/slide9.xml><?xml version="1.0" encoding="utf-8"?>
-<p:sld xmlns:a="http://schemas.openxmlformats.org/drawingml/2006/main" xmlns:r="http://schemas.openxmlformats.org/officeDocument/2006/relationships" xmlns:p="http://schemas.openxmlformats.org/presentationml/2006/main">
-  <p:cSld>
-    <p:spTree>
-      <p:nvGrpSpPr>
-        <p:cNvPr id="1" name=""/>
-        <p:cNvGrpSpPr/>
-        <p:nvPr/>
-      </p:nvGrpSpPr>
-      <p:grpSpPr>
-        <a:xfrm>
-          <a:off x="0" y="0"/>
-          <a:ext cx="0" cy="0"/>
-          <a:chOff x="0" y="0"/>
-          <a:chExt cx="0" cy="0"/>
-        </a:xfrm>
-      </p:grpSpPr>
-      <p:sp>
-        <p:nvSpPr>
-          <p:cNvPr id="7" name="Rectangle 6">
-            <a:extLst>
-              <a:ext uri="{FF2B5EF4-FFF2-40B4-BE49-F238E27FC236}">
-                <a16:creationId xmlns:a16="http://schemas.microsoft.com/office/drawing/2014/main" id="{B32872A6-286D-C644-8DBC-D6F3A98FE1B5}"/>
-              </a:ext>
-            </a:extLst>
-          </p:cNvPr>
-          <p:cNvSpPr/>
-          <p:nvPr/>
-        </p:nvSpPr>
-        <p:spPr>
-          <a:xfrm>
-            <a:off x="0" y="0"/>
-            <a:ext cx="12192000" cy="6858000"/>
-          </a:xfrm>
-          <a:prstGeom prst="rect">
-            <a:avLst/>
-          </a:prstGeom>
-          <a:solidFill>
-            <a:srgbClr val="FF6B6B"/>
-          </a:solidFill>
-        </p:spPr>
-        <p:style>
-          <a:lnRef idx="2">
-            <a:schemeClr val="accent1">
-              <a:shade val="50000"/>
-            </a:schemeClr>
-          </a:lnRef>
-          <a:fillRef idx="1">
-            <a:schemeClr val="accent1"/>
-          </a:fillRef>
-          <a:effectRef idx="0">
-            <a:schemeClr val="accent1"/>
-          </a:effectRef>
-          <a:fontRef idx="minor">
-            <a:schemeClr val="lt1"/>
-          </a:fontRef>
-        </p:style>
-        <p:txBody>
-          <a:bodyPr rtlCol="0" anchor="ctr"/>
-          <a:lstStyle/>
-          <a:p>
-            <a:pPr algn="ctr"/>
-            <a:endParaRPr lang="en-US"/>
-          </a:p>
-        </p:txBody>
-      </p:sp>
-      <p:sp>
-        <p:nvSpPr>
-          <p:cNvPr id="8" name="Oval 7">
-            <a:extLst>
-              <a:ext uri="{FF2B5EF4-FFF2-40B4-BE49-F238E27FC236}">
-                <a16:creationId xmlns:a16="http://schemas.microsoft.com/office/drawing/2014/main" id="{8D790786-99E4-B24C-848A-435B11B96EBE}"/>
-              </a:ext>
-            </a:extLst>
-          </p:cNvPr>
-          <p:cNvSpPr/>
-          <p:nvPr/>
-        </p:nvSpPr>
-        <p:spPr>
-          <a:xfrm>
-            <a:off x="1907822" y="1546578"/>
-            <a:ext cx="8534400" cy="3849511"/>
-          </a:xfrm>
-          <a:prstGeom prst="ellipse">
-            <a:avLst/>
-          </a:prstGeom>
-          <a:solidFill>
-            <a:schemeClr val="bg1">
-              <a:alpha val="0"/>
-            </a:schemeClr>
-          </a:solidFill>
-          <a:ln>
-            <a:noFill/>
-          </a:ln>
-          <a:effectLst>
-            <a:glow rad="1905000">
-              <a:schemeClr val="bg1">
-                <a:alpha val="16000"/>
-              </a:schemeClr>
-            </a:glow>
-          </a:effectLst>
-        </p:spPr>
-        <p:style>
-          <a:lnRef idx="2">
-            <a:schemeClr val="accent1">
-              <a:shade val="50000"/>
-            </a:schemeClr>
-          </a:lnRef>
-          <a:fillRef idx="1">
-            <a:schemeClr val="accent1"/>
-          </a:fillRef>
-          <a:effectRef idx="0">
-            <a:schemeClr val="accent1"/>
-          </a:effectRef>
-          <a:fontRef idx="minor">
-            <a:schemeClr val="lt1"/>
-          </a:fontRef>
-        </p:style>
-        <p:txBody>
-          <a:bodyPr rtlCol="0" anchor="ctr"/>
-          <a:lstStyle/>
-          <a:p>
-            <a:pPr algn="ctr"/>
-            <a:endParaRPr lang="en-US"/>
-          </a:p>
-        </p:txBody>
-      </p:sp>
-      <p:sp>
-        <p:nvSpPr>
-          <p:cNvPr id="5" name="Rectangle 4">
-            <a:extLst>
-              <a:ext uri="{FF2B5EF4-FFF2-40B4-BE49-F238E27FC236}">
-                <a16:creationId xmlns:a16="http://schemas.microsoft.com/office/drawing/2014/main" id="{3BEB164D-1A47-9247-8C0A-E4915C296D76}"/>
-              </a:ext>
-            </a:extLst>
-          </p:cNvPr>
-          <p:cNvSpPr/>
-          <p:nvPr/>
-        </p:nvSpPr>
-        <p:spPr>
-          <a:xfrm>
-            <a:off x="4924012" y="3209723"/>
-            <a:ext cx="2343976" cy="523220"/>
-          </a:xfrm>
-          <a:prstGeom prst="rect">
-            <a:avLst/>
-          </a:prstGeom>
-        </p:spPr>
-        <p:txBody>
-          <a:bodyPr wrap="none" anchor="b">
-            <a:spAutoFit/>
-          </a:bodyPr>
-          <a:lstStyle/>
-          <a:p>
-            <a:pPr algn="r"/>
-            <a:r>
-              <a:rPr lang="en-US" sz="2800" i="0" dirty="0">
-                <a:solidFill>
-                  <a:schemeClr val="bg1"/>
-                </a:solidFill>
-                <a:effectLst/>
-                <a:latin typeface="Arial Rounded MT Bold" panose="020F0704030504030204" pitchFamily="34" charset="77"/>
-                <a:ea typeface="STHupo" panose="02010800040101010101" pitchFamily="2" charset="-122"/>
-                <a:cs typeface="Aharoni" panose="02010803020104030203" pitchFamily="2" charset="-79"/>
-              </a:rPr>
-              <a:t>THANK YOU</a:t>
-            </a:r>
-            <a:endParaRPr lang="en-US" sz="2800" dirty="0">
-              <a:solidFill>
-                <a:schemeClr val="bg1"/>
-              </a:solidFill>
-              <a:latin typeface="Arial Rounded MT Bold" panose="020F0704030504030204" pitchFamily="34" charset="77"/>
-              <a:ea typeface="STHupo" panose="02010800040101010101" pitchFamily="2" charset="-122"/>
-              <a:cs typeface="Aharoni" panose="02010803020104030203" pitchFamily="2" charset="-79"/>
-            </a:endParaRPr>
-          </a:p>
-        </p:txBody>
-      </p:sp>
-    </p:spTree>
-    <p:extLst>
-      <p:ext uri="{BB962C8B-B14F-4D97-AF65-F5344CB8AC3E}">
-        <p14:creationId xmlns:p14="http://schemas.microsoft.com/office/powerpoint/2010/main" val="4189793258"/>
       </p:ext>
     </p:extLst>
   </p:cSld>

</xml_diff>

<commit_message>
Initial_Pitch.pptx - Focus statement added (Slide #4)
</commit_message>
<xml_diff>
--- a/Initial_Pitch.pptx
+++ b/Initial_Pitch.pptx
@@ -231,7 +231,7 @@
           <a:p>
             <a:fld id="{C42DD129-2FF9-A046-B45F-39E82DE472D3}" type="datetimeFigureOut">
               <a:rPr lang="en-US" smtClean="0"/>
-              <a:t>10/1/19</a:t>
+              <a:t>10/2/19</a:t>
             </a:fld>
             <a:endParaRPr lang="en-US"/>
           </a:p>
@@ -1152,7 +1152,7 @@
           <a:p>
             <a:fld id="{25E64343-14F1-0849-9365-0127323517CF}" type="datetime1">
               <a:rPr lang="en-US" smtClean="0"/>
-              <a:t>10/1/19</a:t>
+              <a:t>10/2/19</a:t>
             </a:fld>
             <a:endParaRPr lang="en-US"/>
           </a:p>
@@ -1352,7 +1352,7 @@
           <a:p>
             <a:fld id="{7A3245D0-50AE-4E48-A819-54493610A566}" type="datetime1">
               <a:rPr lang="en-US" smtClean="0"/>
-              <a:t>10/1/19</a:t>
+              <a:t>10/2/19</a:t>
             </a:fld>
             <a:endParaRPr lang="en-US"/>
           </a:p>
@@ -1562,7 +1562,7 @@
           <a:p>
             <a:fld id="{0C7C23FF-748B-4842-80C5-56D2EBDE336E}" type="datetime1">
               <a:rPr lang="en-US" smtClean="0"/>
-              <a:t>10/1/19</a:t>
+              <a:t>10/2/19</a:t>
             </a:fld>
             <a:endParaRPr lang="en-US"/>
           </a:p>
@@ -1762,7 +1762,7 @@
           <a:p>
             <a:fld id="{A555C980-071E-1A4E-9EAC-12B930034E6A}" type="datetime1">
               <a:rPr lang="en-US" smtClean="0"/>
-              <a:t>10/1/19</a:t>
+              <a:t>10/2/19</a:t>
             </a:fld>
             <a:endParaRPr lang="en-US"/>
           </a:p>
@@ -2038,7 +2038,7 @@
           <a:p>
             <a:fld id="{F288DA12-226B-EE4D-B48D-FDD665D57190}" type="datetime1">
               <a:rPr lang="en-US" smtClean="0"/>
-              <a:t>10/1/19</a:t>
+              <a:t>10/2/19</a:t>
             </a:fld>
             <a:endParaRPr lang="en-US"/>
           </a:p>
@@ -2306,7 +2306,7 @@
           <a:p>
             <a:fld id="{86E294C4-7CC9-054D-8CBC-0B705AD1662E}" type="datetime1">
               <a:rPr lang="en-US" smtClean="0"/>
-              <a:t>10/1/19</a:t>
+              <a:t>10/2/19</a:t>
             </a:fld>
             <a:endParaRPr lang="en-US"/>
           </a:p>
@@ -2721,7 +2721,7 @@
           <a:p>
             <a:fld id="{E0BBC08A-683B-2C4F-9179-89ED3CF80E6B}" type="datetime1">
               <a:rPr lang="en-US" smtClean="0"/>
-              <a:t>10/1/19</a:t>
+              <a:t>10/2/19</a:t>
             </a:fld>
             <a:endParaRPr lang="en-US"/>
           </a:p>
@@ -2863,7 +2863,7 @@
           <a:p>
             <a:fld id="{7076B4AE-5F98-D848-A1AC-3871015197B3}" type="datetime1">
               <a:rPr lang="en-US" smtClean="0"/>
-              <a:t>10/1/19</a:t>
+              <a:t>10/2/19</a:t>
             </a:fld>
             <a:endParaRPr lang="en-US"/>
           </a:p>
@@ -2976,7 +2976,7 @@
           <a:p>
             <a:fld id="{4BF4FF16-26BC-C642-826A-679D1A4897A3}" type="datetime1">
               <a:rPr lang="en-US" smtClean="0"/>
-              <a:t>10/1/19</a:t>
+              <a:t>10/2/19</a:t>
             </a:fld>
             <a:endParaRPr lang="en-US"/>
           </a:p>
@@ -3289,7 +3289,7 @@
           <a:p>
             <a:fld id="{79F78B35-4F27-E748-B0B3-0263757F6F12}" type="datetime1">
               <a:rPr lang="en-US" smtClean="0"/>
-              <a:t>10/1/19</a:t>
+              <a:t>10/2/19</a:t>
             </a:fld>
             <a:endParaRPr lang="en-US"/>
           </a:p>
@@ -3578,7 +3578,7 @@
           <a:p>
             <a:fld id="{B40812EA-29AA-DD44-A11F-B05850B2B441}" type="datetime1">
               <a:rPr lang="en-US" smtClean="0"/>
-              <a:t>10/1/19</a:t>
+              <a:t>10/2/19</a:t>
             </a:fld>
             <a:endParaRPr lang="en-US"/>
           </a:p>
@@ -3821,7 +3821,7 @@
           <a:p>
             <a:fld id="{8A1324F1-C46E-094B-ACA6-E74C304AF854}" type="datetime1">
               <a:rPr lang="en-US" smtClean="0"/>
-              <a:t>10/1/19</a:t>
+              <a:t>10/2/19</a:t>
             </a:fld>
             <a:endParaRPr lang="en-US"/>
           </a:p>
@@ -7357,7 +7357,7 @@
           <a:lstStyle/>
           <a:p>
             <a:pPr algn="ctr"/>
-            <a:endParaRPr lang="en-US"/>
+            <a:endParaRPr lang="en-US" dirty="0"/>
           </a:p>
         </p:txBody>
       </p:sp>
@@ -7945,6 +7945,118 @@
                 <a:latin typeface="Arial Rounded MT Bold" panose="020F0704030504030204" pitchFamily="34" charset="77"/>
               </a:rPr>
               <a:t>…</a:t>
+            </a:r>
+          </a:p>
+        </p:txBody>
+      </p:sp>
+      <p:sp>
+        <p:nvSpPr>
+          <p:cNvPr id="5" name="TextBox 4">
+            <a:extLst>
+              <a:ext uri="{FF2B5EF4-FFF2-40B4-BE49-F238E27FC236}">
+                <a16:creationId xmlns:a16="http://schemas.microsoft.com/office/drawing/2014/main" id="{BE311484-493E-E34B-A1FD-A121F0668938}"/>
+              </a:ext>
+            </a:extLst>
+          </p:cNvPr>
+          <p:cNvSpPr txBox="1"/>
+          <p:nvPr/>
+        </p:nvSpPr>
+        <p:spPr>
+          <a:xfrm>
+            <a:off x="935421" y="4771697"/>
+            <a:ext cx="8635276" cy="1815882"/>
+          </a:xfrm>
+          <a:prstGeom prst="rect">
+            <a:avLst/>
+          </a:prstGeom>
+          <a:noFill/>
+        </p:spPr>
+        <p:txBody>
+          <a:bodyPr wrap="square" rtlCol="0">
+            <a:spAutoFit/>
+          </a:bodyPr>
+          <a:lstStyle/>
+          <a:p>
+            <a:pPr>
+              <a:buClr>
+                <a:schemeClr val="bg1"/>
+              </a:buClr>
+            </a:pPr>
+            <a:r>
+              <a:rPr lang="en-US" sz="2800" dirty="0">
+                <a:solidFill>
+                  <a:schemeClr val="bg1"/>
+                </a:solidFill>
+                <a:latin typeface="Arial Rounded MT Bold" panose="020F0704030504030204" pitchFamily="34" charset="77"/>
+              </a:rPr>
+              <a:t>Focus</a:t>
+            </a:r>
+            <a:endParaRPr lang="en-US" dirty="0">
+              <a:solidFill>
+                <a:schemeClr val="bg1"/>
+              </a:solidFill>
+              <a:latin typeface="Arial Rounded MT Bold" panose="020F0704030504030204" pitchFamily="34" charset="77"/>
+            </a:endParaRPr>
+          </a:p>
+          <a:p>
+            <a:pPr>
+              <a:buClr>
+                <a:schemeClr val="bg1"/>
+              </a:buClr>
+            </a:pPr>
+            <a:r>
+              <a:rPr lang="en-US" sz="2800" dirty="0">
+                <a:solidFill>
+                  <a:srgbClr val="5E2828"/>
+                </a:solidFill>
+                <a:latin typeface="Arial Rounded MT Bold" panose="020F0704030504030204" pitchFamily="34" charset="77"/>
+              </a:rPr>
+              <a:t>We introduce </a:t>
+            </a:r>
+            <a:r>
+              <a:rPr lang="en-US" sz="2800" dirty="0">
+                <a:solidFill>
+                  <a:schemeClr val="bg1"/>
+                </a:solidFill>
+                <a:latin typeface="Arial Rounded MT Bold" panose="020F0704030504030204" pitchFamily="34" charset="77"/>
+              </a:rPr>
+              <a:t>a strategic initiative </a:t>
+            </a:r>
+            <a:r>
+              <a:rPr lang="en-US" sz="2800" dirty="0">
+                <a:solidFill>
+                  <a:srgbClr val="5E2828"/>
+                </a:solidFill>
+                <a:latin typeface="Arial Rounded MT Bold" panose="020F0704030504030204" pitchFamily="34" charset="77"/>
+              </a:rPr>
+              <a:t>but in our analysis we focus on </a:t>
+            </a:r>
+            <a:r>
+              <a:rPr lang="en-US" sz="2800" dirty="0">
+                <a:solidFill>
+                  <a:schemeClr val="bg1"/>
+                </a:solidFill>
+                <a:latin typeface="Arial Rounded MT Bold" panose="020F0704030504030204" pitchFamily="34" charset="77"/>
+              </a:rPr>
+              <a:t>business process management </a:t>
+            </a:r>
+            <a:r>
+              <a:rPr lang="en-US" sz="2800" dirty="0">
+                <a:solidFill>
+                  <a:srgbClr val="5E2828"/>
+                </a:solidFill>
+                <a:latin typeface="Arial Rounded MT Bold" panose="020F0704030504030204" pitchFamily="34" charset="77"/>
+              </a:rPr>
+              <a:t>and </a:t>
+            </a:r>
+            <a:r>
+              <a:rPr lang="en-US" sz="2800" dirty="0">
+                <a:solidFill>
+                  <a:schemeClr val="bg1"/>
+                </a:solidFill>
+                <a:latin typeface="Arial Rounded MT Bold" panose="020F0704030504030204" pitchFamily="34" charset="77"/>
+              </a:rPr>
+              <a:t>operational decision making.</a:t>
             </a:r>
           </a:p>
         </p:txBody>

</xml_diff>

<commit_message>
Added Problem, Added Requirement and smaller change to approach
</commit_message>
<xml_diff>
--- a/Initial_Pitch.pptx
+++ b/Initial_Pitch.pptx
@@ -5,19 +5,18 @@
     <p:sldMasterId id="2147483648" r:id="rId1"/>
   </p:sldMasterIdLst>
   <p:notesMasterIdLst>
-    <p:notesMasterId r:id="rId12"/>
+    <p:notesMasterId r:id="rId11"/>
   </p:notesMasterIdLst>
   <p:sldIdLst>
     <p:sldId id="266" r:id="rId2"/>
     <p:sldId id="257" r:id="rId3"/>
     <p:sldId id="260" r:id="rId4"/>
-    <p:sldId id="267" r:id="rId5"/>
-    <p:sldId id="258" r:id="rId6"/>
-    <p:sldId id="259" r:id="rId7"/>
-    <p:sldId id="265" r:id="rId8"/>
-    <p:sldId id="263" r:id="rId9"/>
-    <p:sldId id="261" r:id="rId10"/>
-    <p:sldId id="264" r:id="rId11"/>
+    <p:sldId id="258" r:id="rId5"/>
+    <p:sldId id="259" r:id="rId6"/>
+    <p:sldId id="265" r:id="rId7"/>
+    <p:sldId id="263" r:id="rId8"/>
+    <p:sldId id="261" r:id="rId9"/>
+    <p:sldId id="264" r:id="rId10"/>
   </p:sldIdLst>
   <p:sldSz cx="12192000" cy="6858000"/>
   <p:notesSz cx="6858000" cy="9144000"/>
@@ -128,7 +127,6 @@
         </p14:section>
         <p14:section name="Context" id="{EF6790E6-6A58-5446-9652-3813510B0572}">
           <p14:sldIdLst>
-            <p14:sldId id="267"/>
             <p14:sldId id="258"/>
             <p14:sldId id="259"/>
             <p14:sldId id="265"/>
@@ -231,7 +229,7 @@
           <a:p>
             <a:fld id="{C42DD129-2FF9-A046-B45F-39E82DE472D3}" type="datetimeFigureOut">
               <a:rPr lang="en-US" smtClean="0"/>
-              <a:t>10/2/19</a:t>
+              <a:t>9/30/19</a:t>
             </a:fld>
             <a:endParaRPr lang="en-US"/>
           </a:p>
@@ -732,7 +730,7 @@
           <a:p>
             <a:fld id="{BCB85714-5672-1A40-88C6-9D4BBA44017D}" type="slidenum">
               <a:rPr lang="en-US" smtClean="0"/>
-              <a:t>6</a:t>
+              <a:t>5</a:t>
             </a:fld>
             <a:endParaRPr lang="en-US"/>
           </a:p>
@@ -816,7 +814,7 @@
           <a:p>
             <a:fld id="{BCB85714-5672-1A40-88C6-9D4BBA44017D}" type="slidenum">
               <a:rPr lang="en-US" smtClean="0"/>
-              <a:t>7</a:t>
+              <a:t>6</a:t>
             </a:fld>
             <a:endParaRPr lang="en-US"/>
           </a:p>
@@ -900,7 +898,7 @@
           <a:p>
             <a:fld id="{BCB85714-5672-1A40-88C6-9D4BBA44017D}" type="slidenum">
               <a:rPr lang="en-US" smtClean="0"/>
-              <a:t>9</a:t>
+              <a:t>8</a:t>
             </a:fld>
             <a:endParaRPr lang="en-US"/>
           </a:p>
@@ -984,7 +982,7 @@
           <a:p>
             <a:fld id="{BCB85714-5672-1A40-88C6-9D4BBA44017D}" type="slidenum">
               <a:rPr lang="en-US" smtClean="0"/>
-              <a:t>10</a:t>
+              <a:t>9</a:t>
             </a:fld>
             <a:endParaRPr lang="en-US"/>
           </a:p>
@@ -1152,7 +1150,7 @@
           <a:p>
             <a:fld id="{25E64343-14F1-0849-9365-0127323517CF}" type="datetime1">
               <a:rPr lang="en-US" smtClean="0"/>
-              <a:t>10/2/19</a:t>
+              <a:t>9/30/19</a:t>
             </a:fld>
             <a:endParaRPr lang="en-US"/>
           </a:p>
@@ -1352,7 +1350,7 @@
           <a:p>
             <a:fld id="{7A3245D0-50AE-4E48-A819-54493610A566}" type="datetime1">
               <a:rPr lang="en-US" smtClean="0"/>
-              <a:t>10/2/19</a:t>
+              <a:t>9/30/19</a:t>
             </a:fld>
             <a:endParaRPr lang="en-US"/>
           </a:p>
@@ -1562,7 +1560,7 @@
           <a:p>
             <a:fld id="{0C7C23FF-748B-4842-80C5-56D2EBDE336E}" type="datetime1">
               <a:rPr lang="en-US" smtClean="0"/>
-              <a:t>10/2/19</a:t>
+              <a:t>9/30/19</a:t>
             </a:fld>
             <a:endParaRPr lang="en-US"/>
           </a:p>
@@ -1762,7 +1760,7 @@
           <a:p>
             <a:fld id="{A555C980-071E-1A4E-9EAC-12B930034E6A}" type="datetime1">
               <a:rPr lang="en-US" smtClean="0"/>
-              <a:t>10/2/19</a:t>
+              <a:t>9/30/19</a:t>
             </a:fld>
             <a:endParaRPr lang="en-US"/>
           </a:p>
@@ -2038,7 +2036,7 @@
           <a:p>
             <a:fld id="{F288DA12-226B-EE4D-B48D-FDD665D57190}" type="datetime1">
               <a:rPr lang="en-US" smtClean="0"/>
-              <a:t>10/2/19</a:t>
+              <a:t>9/30/19</a:t>
             </a:fld>
             <a:endParaRPr lang="en-US"/>
           </a:p>
@@ -2306,7 +2304,7 @@
           <a:p>
             <a:fld id="{86E294C4-7CC9-054D-8CBC-0B705AD1662E}" type="datetime1">
               <a:rPr lang="en-US" smtClean="0"/>
-              <a:t>10/2/19</a:t>
+              <a:t>9/30/19</a:t>
             </a:fld>
             <a:endParaRPr lang="en-US"/>
           </a:p>
@@ -2721,7 +2719,7 @@
           <a:p>
             <a:fld id="{E0BBC08A-683B-2C4F-9179-89ED3CF80E6B}" type="datetime1">
               <a:rPr lang="en-US" smtClean="0"/>
-              <a:t>10/2/19</a:t>
+              <a:t>9/30/19</a:t>
             </a:fld>
             <a:endParaRPr lang="en-US"/>
           </a:p>
@@ -2863,7 +2861,7 @@
           <a:p>
             <a:fld id="{7076B4AE-5F98-D848-A1AC-3871015197B3}" type="datetime1">
               <a:rPr lang="en-US" smtClean="0"/>
-              <a:t>10/2/19</a:t>
+              <a:t>9/30/19</a:t>
             </a:fld>
             <a:endParaRPr lang="en-US"/>
           </a:p>
@@ -2976,7 +2974,7 @@
           <a:p>
             <a:fld id="{4BF4FF16-26BC-C642-826A-679D1A4897A3}" type="datetime1">
               <a:rPr lang="en-US" smtClean="0"/>
-              <a:t>10/2/19</a:t>
+              <a:t>9/30/19</a:t>
             </a:fld>
             <a:endParaRPr lang="en-US"/>
           </a:p>
@@ -3289,7 +3287,7 @@
           <a:p>
             <a:fld id="{79F78B35-4F27-E748-B0B3-0263757F6F12}" type="datetime1">
               <a:rPr lang="en-US" smtClean="0"/>
-              <a:t>10/2/19</a:t>
+              <a:t>9/30/19</a:t>
             </a:fld>
             <a:endParaRPr lang="en-US"/>
           </a:p>
@@ -3578,7 +3576,7 @@
           <a:p>
             <a:fld id="{B40812EA-29AA-DD44-A11F-B05850B2B441}" type="datetime1">
               <a:rPr lang="en-US" smtClean="0"/>
-              <a:t>10/2/19</a:t>
+              <a:t>9/30/19</a:t>
             </a:fld>
             <a:endParaRPr lang="en-US"/>
           </a:p>
@@ -3821,7 +3819,7 @@
           <a:p>
             <a:fld id="{8A1324F1-C46E-094B-ACA6-E74C304AF854}" type="datetime1">
               <a:rPr lang="en-US" smtClean="0"/>
-              <a:t>10/2/19</a:t>
+              <a:t>9/30/19</a:t>
             </a:fld>
             <a:endParaRPr lang="en-US"/>
           </a:p>
@@ -4260,200 +4258,6 @@
 </p:sld>
 </file>
 
-<file path=ppt/slides/slide10.xml><?xml version="1.0" encoding="utf-8"?>
-<p:sld xmlns:a="http://schemas.openxmlformats.org/drawingml/2006/main" xmlns:r="http://schemas.openxmlformats.org/officeDocument/2006/relationships" xmlns:p="http://schemas.openxmlformats.org/presentationml/2006/main">
-  <p:cSld>
-    <p:spTree>
-      <p:nvGrpSpPr>
-        <p:cNvPr id="1" name=""/>
-        <p:cNvGrpSpPr/>
-        <p:nvPr/>
-      </p:nvGrpSpPr>
-      <p:grpSpPr>
-        <a:xfrm>
-          <a:off x="0" y="0"/>
-          <a:ext cx="0" cy="0"/>
-          <a:chOff x="0" y="0"/>
-          <a:chExt cx="0" cy="0"/>
-        </a:xfrm>
-      </p:grpSpPr>
-      <p:sp>
-        <p:nvSpPr>
-          <p:cNvPr id="7" name="Rectangle 6">
-            <a:extLst>
-              <a:ext uri="{FF2B5EF4-FFF2-40B4-BE49-F238E27FC236}">
-                <a16:creationId xmlns:a16="http://schemas.microsoft.com/office/drawing/2014/main" id="{B32872A6-286D-C644-8DBC-D6F3A98FE1B5}"/>
-              </a:ext>
-            </a:extLst>
-          </p:cNvPr>
-          <p:cNvSpPr/>
-          <p:nvPr/>
-        </p:nvSpPr>
-        <p:spPr>
-          <a:xfrm>
-            <a:off x="0" y="0"/>
-            <a:ext cx="12192000" cy="6858000"/>
-          </a:xfrm>
-          <a:prstGeom prst="rect">
-            <a:avLst/>
-          </a:prstGeom>
-          <a:solidFill>
-            <a:srgbClr val="FF6B6B"/>
-          </a:solidFill>
-        </p:spPr>
-        <p:style>
-          <a:lnRef idx="2">
-            <a:schemeClr val="accent1">
-              <a:shade val="50000"/>
-            </a:schemeClr>
-          </a:lnRef>
-          <a:fillRef idx="1">
-            <a:schemeClr val="accent1"/>
-          </a:fillRef>
-          <a:effectRef idx="0">
-            <a:schemeClr val="accent1"/>
-          </a:effectRef>
-          <a:fontRef idx="minor">
-            <a:schemeClr val="lt1"/>
-          </a:fontRef>
-        </p:style>
-        <p:txBody>
-          <a:bodyPr rtlCol="0" anchor="ctr"/>
-          <a:lstStyle/>
-          <a:p>
-            <a:pPr algn="ctr"/>
-            <a:endParaRPr lang="en-US"/>
-          </a:p>
-        </p:txBody>
-      </p:sp>
-      <p:sp>
-        <p:nvSpPr>
-          <p:cNvPr id="8" name="Oval 7">
-            <a:extLst>
-              <a:ext uri="{FF2B5EF4-FFF2-40B4-BE49-F238E27FC236}">
-                <a16:creationId xmlns:a16="http://schemas.microsoft.com/office/drawing/2014/main" id="{8D790786-99E4-B24C-848A-435B11B96EBE}"/>
-              </a:ext>
-            </a:extLst>
-          </p:cNvPr>
-          <p:cNvSpPr/>
-          <p:nvPr/>
-        </p:nvSpPr>
-        <p:spPr>
-          <a:xfrm>
-            <a:off x="1907822" y="1546578"/>
-            <a:ext cx="8534400" cy="3849511"/>
-          </a:xfrm>
-          <a:prstGeom prst="ellipse">
-            <a:avLst/>
-          </a:prstGeom>
-          <a:solidFill>
-            <a:schemeClr val="bg1">
-              <a:alpha val="0"/>
-            </a:schemeClr>
-          </a:solidFill>
-          <a:ln>
-            <a:noFill/>
-          </a:ln>
-          <a:effectLst>
-            <a:glow rad="1905000">
-              <a:schemeClr val="bg1">
-                <a:alpha val="16000"/>
-              </a:schemeClr>
-            </a:glow>
-          </a:effectLst>
-        </p:spPr>
-        <p:style>
-          <a:lnRef idx="2">
-            <a:schemeClr val="accent1">
-              <a:shade val="50000"/>
-            </a:schemeClr>
-          </a:lnRef>
-          <a:fillRef idx="1">
-            <a:schemeClr val="accent1"/>
-          </a:fillRef>
-          <a:effectRef idx="0">
-            <a:schemeClr val="accent1"/>
-          </a:effectRef>
-          <a:fontRef idx="minor">
-            <a:schemeClr val="lt1"/>
-          </a:fontRef>
-        </p:style>
-        <p:txBody>
-          <a:bodyPr rtlCol="0" anchor="ctr"/>
-          <a:lstStyle/>
-          <a:p>
-            <a:pPr algn="ctr"/>
-            <a:endParaRPr lang="en-US"/>
-          </a:p>
-        </p:txBody>
-      </p:sp>
-      <p:sp>
-        <p:nvSpPr>
-          <p:cNvPr id="5" name="Rectangle 4">
-            <a:extLst>
-              <a:ext uri="{FF2B5EF4-FFF2-40B4-BE49-F238E27FC236}">
-                <a16:creationId xmlns:a16="http://schemas.microsoft.com/office/drawing/2014/main" id="{3BEB164D-1A47-9247-8C0A-E4915C296D76}"/>
-              </a:ext>
-            </a:extLst>
-          </p:cNvPr>
-          <p:cNvSpPr/>
-          <p:nvPr/>
-        </p:nvSpPr>
-        <p:spPr>
-          <a:xfrm>
-            <a:off x="4924012" y="3209723"/>
-            <a:ext cx="2343976" cy="523220"/>
-          </a:xfrm>
-          <a:prstGeom prst="rect">
-            <a:avLst/>
-          </a:prstGeom>
-        </p:spPr>
-        <p:txBody>
-          <a:bodyPr wrap="none" anchor="b">
-            <a:spAutoFit/>
-          </a:bodyPr>
-          <a:lstStyle/>
-          <a:p>
-            <a:pPr algn="r"/>
-            <a:r>
-              <a:rPr lang="en-US" sz="2800" i="0" dirty="0">
-                <a:solidFill>
-                  <a:schemeClr val="bg1"/>
-                </a:solidFill>
-                <a:effectLst/>
-                <a:latin typeface="Arial Rounded MT Bold" panose="020F0704030504030204" pitchFamily="34" charset="77"/>
-                <a:ea typeface="STHupo" panose="02010800040101010101" pitchFamily="2" charset="-122"/>
-                <a:cs typeface="Aharoni" panose="02010803020104030203" pitchFamily="2" charset="-79"/>
-              </a:rPr>
-              <a:t>THANK YOU</a:t>
-            </a:r>
-            <a:endParaRPr lang="en-US" sz="2800" dirty="0">
-              <a:solidFill>
-                <a:schemeClr val="bg1"/>
-              </a:solidFill>
-              <a:latin typeface="Arial Rounded MT Bold" panose="020F0704030504030204" pitchFamily="34" charset="77"/>
-              <a:ea typeface="STHupo" panose="02010800040101010101" pitchFamily="2" charset="-122"/>
-              <a:cs typeface="Aharoni" panose="02010803020104030203" pitchFamily="2" charset="-79"/>
-            </a:endParaRPr>
-          </a:p>
-        </p:txBody>
-      </p:sp>
-    </p:spTree>
-    <p:extLst>
-      <p:ext uri="{BB962C8B-B14F-4D97-AF65-F5344CB8AC3E}">
-        <p14:creationId xmlns:p14="http://schemas.microsoft.com/office/powerpoint/2010/main" val="4189793258"/>
-      </p:ext>
-    </p:extLst>
-  </p:cSld>
-  <p:clrMapOvr>
-    <a:masterClrMapping/>
-  </p:clrMapOvr>
-  <p:transition spd="slow">
-    <p:cover dir="d"/>
-  </p:transition>
-</p:sld>
-</file>
-
 <file path=ppt/slides/slide2.xml><?xml version="1.0" encoding="utf-8"?>
 <p:sld xmlns:a="http://schemas.openxmlformats.org/drawingml/2006/main" xmlns:r="http://schemas.openxmlformats.org/officeDocument/2006/relationships" xmlns:p="http://schemas.openxmlformats.org/presentationml/2006/main">
   <p:cSld>
@@ -5573,14 +5377,148 @@
               </a:buClr>
               <a:buNone/>
             </a:pPr>
+            <a:r>
+              <a:rPr lang="en-US" dirty="0">
+                <a:solidFill>
+                  <a:schemeClr val="bg1"/>
+                </a:solidFill>
+                <a:latin typeface="Arial Rounded MT Bold" panose="020F0704030504030204" pitchFamily="34" charset="77"/>
+                <a:ea typeface="STHupo" panose="02010800040101010101" pitchFamily="2" charset="-122"/>
+                <a:cs typeface="Aharoni" panose="02010803020104030203" pitchFamily="2" charset="-79"/>
+              </a:rPr>
+              <a:t>We assume that</a:t>
+            </a:r>
+            <a:r>
+              <a:rPr lang="en-US" dirty="0">
+                <a:solidFill>
+                  <a:srgbClr val="5E2828"/>
+                </a:solidFill>
+                <a:latin typeface="Arial Rounded MT Bold" panose="020F0704030504030204" pitchFamily="34" charset="77"/>
+                <a:ea typeface="STHupo" panose="02010800040101010101" pitchFamily="2" charset="-122"/>
+                <a:cs typeface="Aharoni" panose="02010803020104030203" pitchFamily="2" charset="-79"/>
+              </a:rPr>
+              <a:t>:</a:t>
+            </a:r>
+          </a:p>
+          <a:p>
+            <a:pPr marL="0" indent="0">
+              <a:buClr>
+                <a:schemeClr val="bg1"/>
+              </a:buClr>
+              <a:buNone/>
+            </a:pPr>
             <a:endParaRPr lang="en-US" dirty="0">
               <a:solidFill>
-                <a:schemeClr val="bg1"/>
+                <a:srgbClr val="5E2828"/>
               </a:solidFill>
               <a:latin typeface="Arial Rounded MT Bold" panose="020F0704030504030204" pitchFamily="34" charset="77"/>
               <a:ea typeface="STHupo" panose="02010800040101010101" pitchFamily="2" charset="-122"/>
               <a:cs typeface="Aharoni" panose="02010803020104030203" pitchFamily="2" charset="-79"/>
             </a:endParaRPr>
+          </a:p>
+          <a:p>
+            <a:pPr>
+              <a:buClr>
+                <a:schemeClr val="bg1"/>
+              </a:buClr>
+            </a:pPr>
+            <a:r>
+              <a:rPr lang="en-US" dirty="0">
+                <a:solidFill>
+                  <a:srgbClr val="5E2828"/>
+                </a:solidFill>
+                <a:latin typeface="Arial Rounded MT Bold" panose="020F0704030504030204" pitchFamily="34" charset="77"/>
+                <a:ea typeface="STHupo" panose="02010800040101010101" pitchFamily="2" charset="-122"/>
+                <a:cs typeface="Aharoni" panose="02010803020104030203" pitchFamily="2" charset="-79"/>
+              </a:rPr>
+              <a:t>Affordable Daycare</a:t>
+            </a:r>
+          </a:p>
+          <a:p>
+            <a:pPr>
+              <a:buClr>
+                <a:schemeClr val="bg1"/>
+              </a:buClr>
+            </a:pPr>
+            <a:r>
+              <a:rPr lang="en-US" dirty="0">
+                <a:solidFill>
+                  <a:srgbClr val="5E2828"/>
+                </a:solidFill>
+                <a:latin typeface="Arial Rounded MT Bold" panose="020F0704030504030204" pitchFamily="34" charset="77"/>
+                <a:ea typeface="STHupo" panose="02010800040101010101" pitchFamily="2" charset="-122"/>
+                <a:cs typeface="Aharoni" panose="02010803020104030203" pitchFamily="2" charset="-79"/>
+              </a:rPr>
+              <a:t>Flexible Daycare</a:t>
+            </a:r>
+          </a:p>
+          <a:p>
+            <a:pPr marL="0" indent="0">
+              <a:buClr>
+                <a:schemeClr val="bg1"/>
+              </a:buClr>
+              <a:buNone/>
+            </a:pPr>
+            <a:endParaRPr lang="en-US" dirty="0">
+              <a:solidFill>
+                <a:srgbClr val="5E2828"/>
+              </a:solidFill>
+              <a:latin typeface="Arial Rounded MT Bold" panose="020F0704030504030204" pitchFamily="34" charset="77"/>
+              <a:ea typeface="STHupo" panose="02010800040101010101" pitchFamily="2" charset="-122"/>
+              <a:cs typeface="Aharoni" panose="02010803020104030203" pitchFamily="2" charset="-79"/>
+            </a:endParaRPr>
+          </a:p>
+          <a:p>
+            <a:pPr marL="0" indent="0">
+              <a:buClr>
+                <a:schemeClr val="bg1"/>
+              </a:buClr>
+              <a:buNone/>
+            </a:pPr>
+            <a:r>
+              <a:rPr lang="en-US" dirty="0">
+                <a:solidFill>
+                  <a:srgbClr val="5E2828"/>
+                </a:solidFill>
+                <a:latin typeface="Arial Rounded MT Bold" panose="020F0704030504030204" pitchFamily="34" charset="77"/>
+                <a:ea typeface="STHupo" panose="02010800040101010101" pitchFamily="2" charset="-122"/>
+                <a:cs typeface="Aharoni" panose="02010803020104030203" pitchFamily="2" charset="-79"/>
+              </a:rPr>
+              <a:t>The rest </a:t>
+            </a:r>
+            <a:r>
+              <a:rPr lang="en-US" dirty="0">
+                <a:solidFill>
+                  <a:schemeClr val="bg1"/>
+                </a:solidFill>
+                <a:latin typeface="Arial Rounded MT Bold" panose="020F0704030504030204" pitchFamily="34" charset="77"/>
+                <a:ea typeface="STHupo" panose="02010800040101010101" pitchFamily="2" charset="-122"/>
+                <a:cs typeface="Aharoni" panose="02010803020104030203" pitchFamily="2" charset="-79"/>
+              </a:rPr>
+              <a:t>we’ll have to figure out </a:t>
+            </a:r>
+            <a:r>
+              <a:rPr lang="en-US" dirty="0">
+                <a:solidFill>
+                  <a:srgbClr val="5E2828"/>
+                </a:solidFill>
+                <a:latin typeface="Arial Rounded MT Bold" panose="020F0704030504030204" pitchFamily="34" charset="77"/>
+                <a:ea typeface="STHupo" panose="02010800040101010101" pitchFamily="2" charset="-122"/>
+                <a:cs typeface="Aharoni" panose="02010803020104030203" pitchFamily="2" charset="-79"/>
+              </a:rPr>
+              <a:t>later</a:t>
+            </a:r>
+            <a:r>
+              <a:rPr lang="en-US" dirty="0">
+                <a:solidFill>
+                  <a:schemeClr val="bg1"/>
+                </a:solidFill>
+                <a:latin typeface="Arial Rounded MT Bold" panose="020F0704030504030204" pitchFamily="34" charset="77"/>
+                <a:ea typeface="STHupo" panose="02010800040101010101" pitchFamily="2" charset="-122"/>
+                <a:cs typeface="Aharoni" panose="02010803020104030203" pitchFamily="2" charset="-79"/>
+              </a:rPr>
+              <a:t>!</a:t>
+            </a:r>
           </a:p>
         </p:txBody>
       </p:sp>
@@ -5756,442 +5694,6 @@
                 <a:ea typeface="STHupo" panose="02010800040101010101" pitchFamily="2" charset="-122"/>
                 <a:cs typeface="Aharoni" panose="02010803020104030203" pitchFamily="2" charset="-79"/>
               </a:rPr>
-              <a:t>Problem</a:t>
-            </a:r>
-            <a:endParaRPr lang="en-US" dirty="0">
-              <a:solidFill>
-                <a:schemeClr val="bg1"/>
-              </a:solidFill>
-            </a:endParaRPr>
-          </a:p>
-        </p:txBody>
-      </p:sp>
-    </p:spTree>
-    <p:extLst>
-      <p:ext uri="{BB962C8B-B14F-4D97-AF65-F5344CB8AC3E}">
-        <p14:creationId xmlns:p14="http://schemas.microsoft.com/office/powerpoint/2010/main" val="1905208246"/>
-      </p:ext>
-    </p:extLst>
-  </p:cSld>
-  <p:clrMapOvr>
-    <a:masterClrMapping/>
-  </p:clrMapOvr>
-  <p:transition spd="slow">
-    <p:push dir="d"/>
-  </p:transition>
-</p:sld>
-</file>
-
-<file path=ppt/slides/slide5.xml><?xml version="1.0" encoding="utf-8"?>
-<p:sld xmlns:a="http://schemas.openxmlformats.org/drawingml/2006/main" xmlns:r="http://schemas.openxmlformats.org/officeDocument/2006/relationships" xmlns:p="http://schemas.openxmlformats.org/presentationml/2006/main">
-  <p:cSld>
-    <p:spTree>
-      <p:nvGrpSpPr>
-        <p:cNvPr id="1" name=""/>
-        <p:cNvGrpSpPr/>
-        <p:nvPr/>
-      </p:nvGrpSpPr>
-      <p:grpSpPr>
-        <a:xfrm>
-          <a:off x="0" y="0"/>
-          <a:ext cx="0" cy="0"/>
-          <a:chOff x="0" y="0"/>
-          <a:chExt cx="0" cy="0"/>
-        </a:xfrm>
-      </p:grpSpPr>
-      <p:sp>
-        <p:nvSpPr>
-          <p:cNvPr id="4" name="Rectangle 3">
-            <a:extLst>
-              <a:ext uri="{FF2B5EF4-FFF2-40B4-BE49-F238E27FC236}">
-                <a16:creationId xmlns:a16="http://schemas.microsoft.com/office/drawing/2014/main" id="{2F81B1B0-61EE-654F-A9DA-36E186FA968C}"/>
-              </a:ext>
-            </a:extLst>
-          </p:cNvPr>
-          <p:cNvSpPr/>
-          <p:nvPr/>
-        </p:nvSpPr>
-        <p:spPr>
-          <a:xfrm>
-            <a:off x="0" y="0"/>
-            <a:ext cx="12192000" cy="6858000"/>
-          </a:xfrm>
-          <a:prstGeom prst="rect">
-            <a:avLst/>
-          </a:prstGeom>
-          <a:solidFill>
-            <a:srgbClr val="FF6B6B"/>
-          </a:solidFill>
-        </p:spPr>
-        <p:style>
-          <a:lnRef idx="2">
-            <a:schemeClr val="accent1">
-              <a:shade val="50000"/>
-            </a:schemeClr>
-          </a:lnRef>
-          <a:fillRef idx="1">
-            <a:schemeClr val="accent1"/>
-          </a:fillRef>
-          <a:effectRef idx="0">
-            <a:schemeClr val="accent1"/>
-          </a:effectRef>
-          <a:fontRef idx="minor">
-            <a:schemeClr val="lt1"/>
-          </a:fontRef>
-        </p:style>
-        <p:txBody>
-          <a:bodyPr rtlCol="0" anchor="ctr"/>
-          <a:lstStyle/>
-          <a:p>
-            <a:pPr algn="ctr"/>
-            <a:endParaRPr lang="en-US"/>
-          </a:p>
-        </p:txBody>
-      </p:sp>
-      <p:sp>
-        <p:nvSpPr>
-          <p:cNvPr id="3" name="Content Placeholder 2">
-            <a:extLst>
-              <a:ext uri="{FF2B5EF4-FFF2-40B4-BE49-F238E27FC236}">
-                <a16:creationId xmlns:a16="http://schemas.microsoft.com/office/drawing/2014/main" id="{9B76DAF4-1829-A544-BA03-FB6DB10C12C8}"/>
-              </a:ext>
-            </a:extLst>
-          </p:cNvPr>
-          <p:cNvSpPr>
-            <a:spLocks noGrp="1"/>
-          </p:cNvSpPr>
-          <p:nvPr>
-            <p:ph idx="1"/>
-          </p:nvPr>
-        </p:nvSpPr>
-        <p:spPr/>
-        <p:txBody>
-          <a:bodyPr/>
-          <a:lstStyle/>
-          <a:p>
-            <a:pPr marL="0" indent="0">
-              <a:buClr>
-                <a:schemeClr val="bg1"/>
-              </a:buClr>
-              <a:buNone/>
-            </a:pPr>
-            <a:r>
-              <a:rPr lang="en-US" dirty="0">
-                <a:solidFill>
-                  <a:schemeClr val="bg1"/>
-                </a:solidFill>
-                <a:latin typeface="Arial Rounded MT Bold" panose="020F0704030504030204" pitchFamily="34" charset="77"/>
-                <a:ea typeface="STHupo" panose="02010800040101010101" pitchFamily="2" charset="-122"/>
-                <a:cs typeface="Aharoni" panose="02010803020104030203" pitchFamily="2" charset="-79"/>
-              </a:rPr>
-              <a:t>We assume that</a:t>
-            </a:r>
-            <a:r>
-              <a:rPr lang="en-US" dirty="0">
-                <a:solidFill>
-                  <a:srgbClr val="5E2828"/>
-                </a:solidFill>
-                <a:latin typeface="Arial Rounded MT Bold" panose="020F0704030504030204" pitchFamily="34" charset="77"/>
-                <a:ea typeface="STHupo" panose="02010800040101010101" pitchFamily="2" charset="-122"/>
-                <a:cs typeface="Aharoni" panose="02010803020104030203" pitchFamily="2" charset="-79"/>
-              </a:rPr>
-              <a:t>:</a:t>
-            </a:r>
-          </a:p>
-          <a:p>
-            <a:pPr marL="0" indent="0">
-              <a:buClr>
-                <a:schemeClr val="bg1"/>
-              </a:buClr>
-              <a:buNone/>
-            </a:pPr>
-            <a:endParaRPr lang="en-US" dirty="0">
-              <a:solidFill>
-                <a:srgbClr val="5E2828"/>
-              </a:solidFill>
-              <a:latin typeface="Arial Rounded MT Bold" panose="020F0704030504030204" pitchFamily="34" charset="77"/>
-              <a:ea typeface="STHupo" panose="02010800040101010101" pitchFamily="2" charset="-122"/>
-              <a:cs typeface="Aharoni" panose="02010803020104030203" pitchFamily="2" charset="-79"/>
-            </a:endParaRPr>
-          </a:p>
-          <a:p>
-            <a:pPr>
-              <a:buClr>
-                <a:schemeClr val="bg1"/>
-              </a:buClr>
-            </a:pPr>
-            <a:r>
-              <a:rPr lang="en-US" dirty="0">
-                <a:solidFill>
-                  <a:srgbClr val="5E2828"/>
-                </a:solidFill>
-                <a:latin typeface="Arial Rounded MT Bold" panose="020F0704030504030204" pitchFamily="34" charset="77"/>
-                <a:ea typeface="STHupo" panose="02010800040101010101" pitchFamily="2" charset="-122"/>
-                <a:cs typeface="Aharoni" panose="02010803020104030203" pitchFamily="2" charset="-79"/>
-              </a:rPr>
-              <a:t>Affordable Daycare</a:t>
-            </a:r>
-          </a:p>
-          <a:p>
-            <a:pPr>
-              <a:buClr>
-                <a:schemeClr val="bg1"/>
-              </a:buClr>
-            </a:pPr>
-            <a:r>
-              <a:rPr lang="en-US" dirty="0">
-                <a:solidFill>
-                  <a:srgbClr val="5E2828"/>
-                </a:solidFill>
-                <a:latin typeface="Arial Rounded MT Bold" panose="020F0704030504030204" pitchFamily="34" charset="77"/>
-                <a:ea typeface="STHupo" panose="02010800040101010101" pitchFamily="2" charset="-122"/>
-                <a:cs typeface="Aharoni" panose="02010803020104030203" pitchFamily="2" charset="-79"/>
-              </a:rPr>
-              <a:t>Flexible Daycare</a:t>
-            </a:r>
-          </a:p>
-          <a:p>
-            <a:pPr marL="0" indent="0">
-              <a:buClr>
-                <a:schemeClr val="bg1"/>
-              </a:buClr>
-              <a:buNone/>
-            </a:pPr>
-            <a:endParaRPr lang="en-US" dirty="0">
-              <a:solidFill>
-                <a:srgbClr val="5E2828"/>
-              </a:solidFill>
-              <a:latin typeface="Arial Rounded MT Bold" panose="020F0704030504030204" pitchFamily="34" charset="77"/>
-              <a:ea typeface="STHupo" panose="02010800040101010101" pitchFamily="2" charset="-122"/>
-              <a:cs typeface="Aharoni" panose="02010803020104030203" pitchFamily="2" charset="-79"/>
-            </a:endParaRPr>
-          </a:p>
-          <a:p>
-            <a:pPr marL="0" indent="0">
-              <a:buClr>
-                <a:schemeClr val="bg1"/>
-              </a:buClr>
-              <a:buNone/>
-            </a:pPr>
-            <a:r>
-              <a:rPr lang="en-US" dirty="0">
-                <a:solidFill>
-                  <a:srgbClr val="5E2828"/>
-                </a:solidFill>
-                <a:latin typeface="Arial Rounded MT Bold" panose="020F0704030504030204" pitchFamily="34" charset="77"/>
-                <a:ea typeface="STHupo" panose="02010800040101010101" pitchFamily="2" charset="-122"/>
-                <a:cs typeface="Aharoni" panose="02010803020104030203" pitchFamily="2" charset="-79"/>
-              </a:rPr>
-              <a:t>The rest </a:t>
-            </a:r>
-            <a:r>
-              <a:rPr lang="en-US" dirty="0">
-                <a:solidFill>
-                  <a:schemeClr val="bg1"/>
-                </a:solidFill>
-                <a:latin typeface="Arial Rounded MT Bold" panose="020F0704030504030204" pitchFamily="34" charset="77"/>
-                <a:ea typeface="STHupo" panose="02010800040101010101" pitchFamily="2" charset="-122"/>
-                <a:cs typeface="Aharoni" panose="02010803020104030203" pitchFamily="2" charset="-79"/>
-              </a:rPr>
-              <a:t>we’ll have to figure out </a:t>
-            </a:r>
-            <a:r>
-              <a:rPr lang="en-US" dirty="0">
-                <a:solidFill>
-                  <a:srgbClr val="5E2828"/>
-                </a:solidFill>
-                <a:latin typeface="Arial Rounded MT Bold" panose="020F0704030504030204" pitchFamily="34" charset="77"/>
-                <a:ea typeface="STHupo" panose="02010800040101010101" pitchFamily="2" charset="-122"/>
-                <a:cs typeface="Aharoni" panose="02010803020104030203" pitchFamily="2" charset="-79"/>
-              </a:rPr>
-              <a:t>later</a:t>
-            </a:r>
-            <a:r>
-              <a:rPr lang="en-US" dirty="0">
-                <a:solidFill>
-                  <a:schemeClr val="bg1"/>
-                </a:solidFill>
-                <a:latin typeface="Arial Rounded MT Bold" panose="020F0704030504030204" pitchFamily="34" charset="77"/>
-                <a:ea typeface="STHupo" panose="02010800040101010101" pitchFamily="2" charset="-122"/>
-                <a:cs typeface="Aharoni" panose="02010803020104030203" pitchFamily="2" charset="-79"/>
-              </a:rPr>
-              <a:t>!</a:t>
-            </a:r>
-          </a:p>
-        </p:txBody>
-      </p:sp>
-      <p:sp>
-        <p:nvSpPr>
-          <p:cNvPr id="6" name="Pie 5">
-            <a:extLst>
-              <a:ext uri="{FF2B5EF4-FFF2-40B4-BE49-F238E27FC236}">
-                <a16:creationId xmlns:a16="http://schemas.microsoft.com/office/drawing/2014/main" id="{4DE4BC92-D240-704C-A90C-AAEB4EF0AB9B}"/>
-              </a:ext>
-            </a:extLst>
-          </p:cNvPr>
-          <p:cNvSpPr/>
-          <p:nvPr/>
-        </p:nvSpPr>
-        <p:spPr>
-          <a:xfrm>
-            <a:off x="9570697" y="4226064"/>
-            <a:ext cx="5263871" cy="5263871"/>
-          </a:xfrm>
-          <a:prstGeom prst="pie">
-            <a:avLst>
-              <a:gd name="adj1" fmla="val 10781590"/>
-              <a:gd name="adj2" fmla="val 16200000"/>
-            </a:avLst>
-          </a:prstGeom>
-          <a:solidFill>
-            <a:schemeClr val="bg1"/>
-          </a:solidFill>
-          <a:ln>
-            <a:noFill/>
-          </a:ln>
-        </p:spPr>
-        <p:style>
-          <a:lnRef idx="2">
-            <a:schemeClr val="accent1">
-              <a:shade val="50000"/>
-            </a:schemeClr>
-          </a:lnRef>
-          <a:fillRef idx="1">
-            <a:schemeClr val="accent1"/>
-          </a:fillRef>
-          <a:effectRef idx="0">
-            <a:schemeClr val="accent1"/>
-          </a:effectRef>
-          <a:fontRef idx="minor">
-            <a:schemeClr val="lt1"/>
-          </a:fontRef>
-        </p:style>
-        <p:txBody>
-          <a:bodyPr rtlCol="0" anchor="ctr"/>
-          <a:lstStyle/>
-          <a:p>
-            <a:pPr algn="ctr"/>
-            <a:endParaRPr lang="en-US" dirty="0">
-              <a:solidFill>
-                <a:schemeClr val="tx1"/>
-              </a:solidFill>
-            </a:endParaRPr>
-          </a:p>
-        </p:txBody>
-      </p:sp>
-      <p:sp>
-        <p:nvSpPr>
-          <p:cNvPr id="7" name="Slide Number Placeholder 6">
-            <a:extLst>
-              <a:ext uri="{FF2B5EF4-FFF2-40B4-BE49-F238E27FC236}">
-                <a16:creationId xmlns:a16="http://schemas.microsoft.com/office/drawing/2014/main" id="{ACFDEBC2-BC20-1D49-B8A7-9C94F48BE1E4}"/>
-              </a:ext>
-            </a:extLst>
-          </p:cNvPr>
-          <p:cNvSpPr>
-            <a:spLocks noGrp="1"/>
-          </p:cNvSpPr>
-          <p:nvPr>
-            <p:ph type="sldNum" sz="quarter" idx="12"/>
-          </p:nvPr>
-        </p:nvSpPr>
-        <p:spPr>
-          <a:xfrm>
-            <a:off x="9001478" y="3667478"/>
-            <a:ext cx="2949517" cy="3190522"/>
-          </a:xfrm>
-        </p:spPr>
-        <p:txBody>
-          <a:bodyPr anchor="b"/>
-          <a:lstStyle/>
-          <a:p>
-            <a:r>
-              <a:rPr lang="en-US" sz="9600" dirty="0">
-                <a:solidFill>
-                  <a:srgbClr val="5E2828"/>
-                </a:solidFill>
-                <a:latin typeface="Arial Rounded MT Bold" panose="020F0704030504030204" pitchFamily="34" charset="77"/>
-                <a:ea typeface="STHupo" panose="02010800040101010101" pitchFamily="2" charset="-122"/>
-                <a:cs typeface="Aharoni" panose="02010803020104030203" pitchFamily="2" charset="-79"/>
-              </a:rPr>
-              <a:t>2</a:t>
-            </a:r>
-          </a:p>
-        </p:txBody>
-      </p:sp>
-      <p:cxnSp>
-        <p:nvCxnSpPr>
-          <p:cNvPr id="9" name="Straight Connector 8">
-            <a:extLst>
-              <a:ext uri="{FF2B5EF4-FFF2-40B4-BE49-F238E27FC236}">
-                <a16:creationId xmlns:a16="http://schemas.microsoft.com/office/drawing/2014/main" id="{24235FEA-2336-8C40-A5E6-3A6B920160EF}"/>
-              </a:ext>
-            </a:extLst>
-          </p:cNvPr>
-          <p:cNvCxnSpPr/>
-          <p:nvPr/>
-        </p:nvCxnSpPr>
-        <p:spPr>
-          <a:xfrm>
-            <a:off x="829340" y="1254639"/>
-            <a:ext cx="10526232" cy="0"/>
-          </a:xfrm>
-          <a:prstGeom prst="line">
-            <a:avLst/>
-          </a:prstGeom>
-          <a:ln w="25400">
-            <a:solidFill>
-              <a:srgbClr val="5E2828"/>
-            </a:solidFill>
-          </a:ln>
-        </p:spPr>
-        <p:style>
-          <a:lnRef idx="1">
-            <a:schemeClr val="accent1"/>
-          </a:lnRef>
-          <a:fillRef idx="0">
-            <a:schemeClr val="accent1"/>
-          </a:fillRef>
-          <a:effectRef idx="0">
-            <a:schemeClr val="accent1"/>
-          </a:effectRef>
-          <a:fontRef idx="minor">
-            <a:schemeClr val="tx1"/>
-          </a:fontRef>
-        </p:style>
-      </p:cxnSp>
-      <p:sp>
-        <p:nvSpPr>
-          <p:cNvPr id="2" name="Title 1">
-            <a:extLst>
-              <a:ext uri="{FF2B5EF4-FFF2-40B4-BE49-F238E27FC236}">
-                <a16:creationId xmlns:a16="http://schemas.microsoft.com/office/drawing/2014/main" id="{ED95F1F0-9F8F-8C4B-A474-3896F352A498}"/>
-              </a:ext>
-            </a:extLst>
-          </p:cNvPr>
-          <p:cNvSpPr>
-            <a:spLocks noGrp="1"/>
-          </p:cNvSpPr>
-          <p:nvPr>
-            <p:ph type="title"/>
-          </p:nvPr>
-        </p:nvSpPr>
-        <p:spPr/>
-        <p:txBody>
-          <a:bodyPr>
-            <a:normAutofit/>
-          </a:bodyPr>
-          <a:lstStyle/>
-          <a:p>
-            <a:r>
-              <a:rPr lang="en-US" dirty="0">
-                <a:solidFill>
-                  <a:schemeClr val="bg1"/>
-                </a:solidFill>
-                <a:latin typeface="Arial Rounded MT Bold" panose="020F0704030504030204" pitchFamily="34" charset="77"/>
-                <a:ea typeface="STHupo" panose="02010800040101010101" pitchFamily="2" charset="-122"/>
-                <a:cs typeface="Aharoni" panose="02010803020104030203" pitchFamily="2" charset="-79"/>
-              </a:rPr>
               <a:t>Requirements of a Modern Family</a:t>
             </a:r>
             <a:endParaRPr lang="en-US" dirty="0">
@@ -6218,7 +5720,7 @@
 </p:sld>
 </file>
 
-<file path=ppt/slides/slide6.xml><?xml version="1.0" encoding="utf-8"?>
+<file path=ppt/slides/slide5.xml><?xml version="1.0" encoding="utf-8"?>
 <p:sld xmlns:a="http://schemas.openxmlformats.org/drawingml/2006/main" xmlns:r="http://schemas.openxmlformats.org/officeDocument/2006/relationships" xmlns:p="http://schemas.openxmlformats.org/presentationml/2006/main">
   <p:cSld>
     <p:spTree>
@@ -6848,7 +6350,7 @@
 </p:sld>
 </file>
 
-<file path=ppt/slides/slide7.xml><?xml version="1.0" encoding="utf-8"?>
+<file path=ppt/slides/slide6.xml><?xml version="1.0" encoding="utf-8"?>
 <p:sld xmlns:a="http://schemas.openxmlformats.org/drawingml/2006/main" xmlns:r="http://schemas.openxmlformats.org/officeDocument/2006/relationships" xmlns:p="http://schemas.openxmlformats.org/presentationml/2006/main">
   <p:cSld>
     <p:spTree>
@@ -6879,7 +6381,7 @@
         </p:nvSpPr>
         <p:spPr>
           <a:xfrm>
-            <a:off x="0" y="14748"/>
+            <a:off x="0" y="0"/>
             <a:ext cx="12192000" cy="6858000"/>
           </a:xfrm>
           <a:prstGeom prst="rect">
@@ -7119,7 +6621,7 @@
                 </a:solidFill>
                 <a:latin typeface="Arial Rounded MT Bold" panose="020F0704030504030204" pitchFamily="34" charset="77"/>
               </a:rPr>
-              <a:t> We work in accordance to the principles we embrace, thus validating and verifying our approach throughout our own actions</a:t>
+              <a:t> We work in accordance to the principles we embrace, thus validating and verifying our approach throughout our own actions, everyday</a:t>
             </a:r>
             <a:r>
               <a:rPr lang="en-US" dirty="0">
@@ -7295,7 +6797,7 @@
 </p:sld>
 </file>
 
-<file path=ppt/slides/slide8.xml><?xml version="1.0" encoding="utf-8"?>
+<file path=ppt/slides/slide7.xml><?xml version="1.0" encoding="utf-8"?>
 <p:sld xmlns:a="http://schemas.openxmlformats.org/drawingml/2006/main" xmlns:r="http://schemas.openxmlformats.org/officeDocument/2006/relationships" xmlns:p="http://schemas.openxmlformats.org/presentationml/2006/main">
   <p:cSld>
     <p:spTree>
@@ -7326,7 +6828,7 @@
         </p:nvSpPr>
         <p:spPr>
           <a:xfrm>
-            <a:off x="-3544" y="7373"/>
+            <a:off x="-3544" y="-1"/>
             <a:ext cx="12192000" cy="6858000"/>
           </a:xfrm>
           <a:prstGeom prst="rect">
@@ -7357,7 +6859,7 @@
           <a:lstStyle/>
           <a:p>
             <a:pPr algn="ctr"/>
-            <a:endParaRPr lang="en-US" dirty="0"/>
+            <a:endParaRPr lang="en-US"/>
           </a:p>
         </p:txBody>
       </p:sp>
@@ -7931,134 +7433,6 @@
               <a:t>Team Members</a:t>
             </a:r>
           </a:p>
-          <a:p>
-            <a:pPr>
-              <a:buClr>
-                <a:schemeClr val="bg1"/>
-              </a:buClr>
-            </a:pPr>
-            <a:r>
-              <a:rPr lang="en-US" dirty="0">
-                <a:solidFill>
-                  <a:srgbClr val="5E2828"/>
-                </a:solidFill>
-                <a:latin typeface="Arial Rounded MT Bold" panose="020F0704030504030204" pitchFamily="34" charset="77"/>
-              </a:rPr>
-              <a:t>…</a:t>
-            </a:r>
-          </a:p>
-        </p:txBody>
-      </p:sp>
-      <p:sp>
-        <p:nvSpPr>
-          <p:cNvPr id="5" name="TextBox 4">
-            <a:extLst>
-              <a:ext uri="{FF2B5EF4-FFF2-40B4-BE49-F238E27FC236}">
-                <a16:creationId xmlns:a16="http://schemas.microsoft.com/office/drawing/2014/main" id="{BE311484-493E-E34B-A1FD-A121F0668938}"/>
-              </a:ext>
-            </a:extLst>
-          </p:cNvPr>
-          <p:cNvSpPr txBox="1"/>
-          <p:nvPr/>
-        </p:nvSpPr>
-        <p:spPr>
-          <a:xfrm>
-            <a:off x="935421" y="4771697"/>
-            <a:ext cx="8635276" cy="1815882"/>
-          </a:xfrm>
-          <a:prstGeom prst="rect">
-            <a:avLst/>
-          </a:prstGeom>
-          <a:noFill/>
-        </p:spPr>
-        <p:txBody>
-          <a:bodyPr wrap="square" rtlCol="0">
-            <a:spAutoFit/>
-          </a:bodyPr>
-          <a:lstStyle/>
-          <a:p>
-            <a:pPr>
-              <a:buClr>
-                <a:schemeClr val="bg1"/>
-              </a:buClr>
-            </a:pPr>
-            <a:r>
-              <a:rPr lang="en-US" sz="2800" dirty="0">
-                <a:solidFill>
-                  <a:schemeClr val="bg1"/>
-                </a:solidFill>
-                <a:latin typeface="Arial Rounded MT Bold" panose="020F0704030504030204" pitchFamily="34" charset="77"/>
-              </a:rPr>
-              <a:t>Focus</a:t>
-            </a:r>
-            <a:endParaRPr lang="en-US" dirty="0">
-              <a:solidFill>
-                <a:schemeClr val="bg1"/>
-              </a:solidFill>
-              <a:latin typeface="Arial Rounded MT Bold" panose="020F0704030504030204" pitchFamily="34" charset="77"/>
-            </a:endParaRPr>
-          </a:p>
-          <a:p>
-            <a:pPr>
-              <a:buClr>
-                <a:schemeClr val="bg1"/>
-              </a:buClr>
-            </a:pPr>
-            <a:r>
-              <a:rPr lang="en-US" sz="2800" dirty="0">
-                <a:solidFill>
-                  <a:srgbClr val="5E2828"/>
-                </a:solidFill>
-                <a:latin typeface="Arial Rounded MT Bold" panose="020F0704030504030204" pitchFamily="34" charset="77"/>
-              </a:rPr>
-              <a:t>We introduce </a:t>
-            </a:r>
-            <a:r>
-              <a:rPr lang="en-US" sz="2800" dirty="0">
-                <a:solidFill>
-                  <a:schemeClr val="bg1"/>
-                </a:solidFill>
-                <a:latin typeface="Arial Rounded MT Bold" panose="020F0704030504030204" pitchFamily="34" charset="77"/>
-              </a:rPr>
-              <a:t>a strategic initiative </a:t>
-            </a:r>
-            <a:r>
-              <a:rPr lang="en-US" sz="2800" dirty="0">
-                <a:solidFill>
-                  <a:srgbClr val="5E2828"/>
-                </a:solidFill>
-                <a:latin typeface="Arial Rounded MT Bold" panose="020F0704030504030204" pitchFamily="34" charset="77"/>
-              </a:rPr>
-              <a:t>but in our analysis we focus on </a:t>
-            </a:r>
-            <a:r>
-              <a:rPr lang="en-US" sz="2800" dirty="0">
-                <a:solidFill>
-                  <a:schemeClr val="bg1"/>
-                </a:solidFill>
-                <a:latin typeface="Arial Rounded MT Bold" panose="020F0704030504030204" pitchFamily="34" charset="77"/>
-              </a:rPr>
-              <a:t>business process management </a:t>
-            </a:r>
-            <a:r>
-              <a:rPr lang="en-US" sz="2800" dirty="0">
-                <a:solidFill>
-                  <a:srgbClr val="5E2828"/>
-                </a:solidFill>
-                <a:latin typeface="Arial Rounded MT Bold" panose="020F0704030504030204" pitchFamily="34" charset="77"/>
-              </a:rPr>
-              <a:t>and </a:t>
-            </a:r>
-            <a:r>
-              <a:rPr lang="en-US" sz="2800" dirty="0">
-                <a:solidFill>
-                  <a:schemeClr val="bg1"/>
-                </a:solidFill>
-                <a:latin typeface="Arial Rounded MT Bold" panose="020F0704030504030204" pitchFamily="34" charset="77"/>
-              </a:rPr>
-              <a:t>operational decision making.</a:t>
-            </a:r>
-          </a:p>
         </p:txBody>
       </p:sp>
     </p:spTree>
@@ -8077,7 +7451,7 @@
 </p:sld>
 </file>
 
-<file path=ppt/slides/slide9.xml><?xml version="1.0" encoding="utf-8"?>
+<file path=ppt/slides/slide8.xml><?xml version="1.0" encoding="utf-8"?>
 <p:sld xmlns:a="http://schemas.openxmlformats.org/drawingml/2006/main" xmlns:r="http://schemas.openxmlformats.org/officeDocument/2006/relationships" xmlns:p="http://schemas.openxmlformats.org/presentationml/2006/main">
   <p:cSld>
     <p:spTree>
@@ -8162,7 +7536,7 @@
         <p:spPr/>
         <p:txBody>
           <a:bodyPr>
-            <a:normAutofit fontScale="85000" lnSpcReduction="20000"/>
+            <a:normAutofit fontScale="92500" lnSpcReduction="10000"/>
           </a:bodyPr>
           <a:lstStyle/>
           <a:p>
@@ -8265,7 +7639,7 @@
                 <a:ea typeface="STHupo" panose="02010800040101010101" pitchFamily="2" charset="-122"/>
                 <a:cs typeface="Aharoni" panose="02010803020104030203" pitchFamily="2" charset="-79"/>
               </a:rPr>
-              <a:t>    24</a:t>
+              <a:t>			</a:t>
             </a:r>
             <a:r>
               <a:rPr lang="en-US" sz="2400" dirty="0">
@@ -8276,7 +7650,7 @@
                 <a:ea typeface="STHupo" panose="02010800040101010101" pitchFamily="2" charset="-122"/>
                 <a:cs typeface="Aharoni" panose="02010803020104030203" pitchFamily="2" charset="-79"/>
               </a:rPr>
-              <a:t>.</a:t>
+              <a:t>Meetings (</a:t>
             </a:r>
             <a:r>
               <a:rPr lang="en-US" sz="2400" dirty="0">
@@ -8287,29 +7661,7 @@
                 <a:ea typeface="STHupo" panose="02010800040101010101" pitchFamily="2" charset="-122"/>
                 <a:cs typeface="Aharoni" panose="02010803020104030203" pitchFamily="2" charset="-79"/>
               </a:rPr>
-              <a:t>10		</a:t>
-            </a:r>
-            <a:r>
-              <a:rPr lang="en-US" sz="2400" dirty="0">
-                <a:solidFill>
-                  <a:schemeClr val="bg1"/>
-                </a:solidFill>
-                <a:latin typeface="Arial Rounded MT Bold" panose="020F0704030504030204" pitchFamily="34" charset="77"/>
-                <a:ea typeface="STHupo" panose="02010800040101010101" pitchFamily="2" charset="-122"/>
-                <a:cs typeface="Aharoni" panose="02010803020104030203" pitchFamily="2" charset="-79"/>
-              </a:rPr>
-              <a:t>Stakeholder Meetings (</a:t>
-            </a:r>
-            <a:r>
-              <a:rPr lang="en-US" sz="2400" dirty="0">
-                <a:solidFill>
-                  <a:srgbClr val="5E2828"/>
-                </a:solidFill>
-                <a:latin typeface="Arial Rounded MT Bold" panose="020F0704030504030204" pitchFamily="34" charset="77"/>
-                <a:ea typeface="STHupo" panose="02010800040101010101" pitchFamily="2" charset="-122"/>
-                <a:cs typeface="Aharoni" panose="02010803020104030203" pitchFamily="2" charset="-79"/>
-              </a:rPr>
-              <a:t>Organization</a:t>
+              <a:t>Initial Organization</a:t>
             </a:r>
             <a:r>
               <a:rPr lang="en-US" sz="2400" dirty="0">
@@ -8339,58 +7691,6 @@
                 <a:ea typeface="STHupo" panose="02010800040101010101" pitchFamily="2" charset="-122"/>
                 <a:cs typeface="Aharoni" panose="02010803020104030203" pitchFamily="2" charset="-79"/>
               </a:rPr>
-              <a:t>			</a:t>
-            </a:r>
-            <a:r>
-              <a:rPr lang="en-US" sz="2400" dirty="0">
-                <a:solidFill>
-                  <a:schemeClr val="bg1"/>
-                </a:solidFill>
-                <a:latin typeface="Arial Rounded MT Bold" panose="020F0704030504030204" pitchFamily="34" charset="77"/>
-                <a:ea typeface="STHupo" panose="02010800040101010101" pitchFamily="2" charset="-122"/>
-                <a:cs typeface="Aharoni" panose="02010803020104030203" pitchFamily="2" charset="-79"/>
-              </a:rPr>
-              <a:t>Analysis (</a:t>
-            </a:r>
-            <a:r>
-              <a:rPr lang="en-US" sz="2400" dirty="0">
-                <a:solidFill>
-                  <a:srgbClr val="5E2828"/>
-                </a:solidFill>
-                <a:latin typeface="Arial Rounded MT Bold" panose="020F0704030504030204" pitchFamily="34" charset="77"/>
-                <a:ea typeface="STHupo" panose="02010800040101010101" pitchFamily="2" charset="-122"/>
-                <a:cs typeface="Aharoni" panose="02010803020104030203" pitchFamily="2" charset="-79"/>
-              </a:rPr>
-              <a:t>Requirements Gathering</a:t>
-            </a:r>
-            <a:r>
-              <a:rPr lang="en-US" sz="2400" dirty="0">
-                <a:solidFill>
-                  <a:schemeClr val="bg1"/>
-                </a:solidFill>
-                <a:latin typeface="Arial Rounded MT Bold" panose="020F0704030504030204" pitchFamily="34" charset="77"/>
-                <a:ea typeface="STHupo" panose="02010800040101010101" pitchFamily="2" charset="-122"/>
-                <a:cs typeface="Aharoni" panose="02010803020104030203" pitchFamily="2" charset="-79"/>
-              </a:rPr>
-              <a:t>)</a:t>
-            </a:r>
-          </a:p>
-          <a:p>
-            <a:pPr marL="0" indent="0">
-              <a:buClr>
-                <a:srgbClr val="5E2828"/>
-              </a:buClr>
-              <a:buNone/>
-            </a:pPr>
-            <a:r>
-              <a:rPr lang="en-US" sz="2400" dirty="0">
-                <a:solidFill>
-                  <a:srgbClr val="5E2828"/>
-                </a:solidFill>
-                <a:latin typeface="Arial Rounded MT Bold" panose="020F0704030504030204" pitchFamily="34" charset="77"/>
-                <a:ea typeface="STHupo" panose="02010800040101010101" pitchFamily="2" charset="-122"/>
-                <a:cs typeface="Aharoni" panose="02010803020104030203" pitchFamily="2" charset="-79"/>
-              </a:rPr>
               <a:t> 			➜ </a:t>
             </a:r>
             <a:r>
@@ -8425,28 +7725,6 @@
                 <a:cs typeface="Aharoni" panose="02010803020104030203" pitchFamily="2" charset="-79"/>
               </a:rPr>
               <a:t> Timetable</a:t>
-            </a:r>
-            <a:r>
-              <a:rPr lang="en-US" sz="2400" dirty="0">
-                <a:solidFill>
-                  <a:srgbClr val="5E2828"/>
-                </a:solidFill>
-                <a:latin typeface="Arial Rounded MT Bold" panose="020F0704030504030204" pitchFamily="34" charset="77"/>
-                <a:ea typeface="STHupo" panose="02010800040101010101" pitchFamily="2" charset="-122"/>
-                <a:cs typeface="Aharoni" panose="02010803020104030203" pitchFamily="2" charset="-79"/>
-              </a:rPr>
-              <a:t> + </a:t>
-            </a:r>
-            <a:r>
-              <a:rPr lang="en-US" sz="2400" dirty="0">
-                <a:solidFill>
-                  <a:schemeClr val="bg1"/>
-                </a:solidFill>
-                <a:latin typeface="Arial Rounded MT Bold" panose="020F0704030504030204" pitchFamily="34" charset="77"/>
-                <a:ea typeface="STHupo" panose="02010800040101010101" pitchFamily="2" charset="-122"/>
-                <a:cs typeface="Aharoni" panose="02010803020104030203" pitchFamily="2" charset="-79"/>
-              </a:rPr>
-              <a:t>Requirements</a:t>
             </a:r>
           </a:p>
           <a:p>
@@ -8535,7 +7813,7 @@
                 <a:ea typeface="STHupo" panose="02010800040101010101" pitchFamily="2" charset="-122"/>
                 <a:cs typeface="Aharoni" panose="02010803020104030203" pitchFamily="2" charset="-79"/>
               </a:rPr>
-              <a:t>Process Definition</a:t>
+              <a:t>Requirements Gathering</a:t>
             </a:r>
             <a:r>
               <a:rPr lang="en-US" sz="2400" dirty="0">
@@ -8565,29 +7843,7 @@
                 <a:ea typeface="STHupo" panose="02010800040101010101" pitchFamily="2" charset="-122"/>
                 <a:cs typeface="Aharoni" panose="02010803020104030203" pitchFamily="2" charset="-79"/>
               </a:rPr>
-              <a:t>    20</a:t>
-            </a:r>
-            <a:r>
-              <a:rPr lang="en-US" sz="2400" dirty="0">
-                <a:solidFill>
-                  <a:schemeClr val="bg1"/>
-                </a:solidFill>
-                <a:latin typeface="Arial Rounded MT Bold" panose="020F0704030504030204" pitchFamily="34" charset="77"/>
-                <a:ea typeface="STHupo" panose="02010800040101010101" pitchFamily="2" charset="-122"/>
-                <a:cs typeface="Aharoni" panose="02010803020104030203" pitchFamily="2" charset="-79"/>
-              </a:rPr>
-              <a:t>.</a:t>
-            </a:r>
-            <a:r>
-              <a:rPr lang="en-US" sz="2400" dirty="0">
-                <a:solidFill>
-                  <a:srgbClr val="5E2828"/>
-                </a:solidFill>
-                <a:latin typeface="Arial Rounded MT Bold" panose="020F0704030504030204" pitchFamily="34" charset="77"/>
-                <a:ea typeface="STHupo" panose="02010800040101010101" pitchFamily="2" charset="-122"/>
-                <a:cs typeface="Aharoni" panose="02010803020104030203" pitchFamily="2" charset="-79"/>
-              </a:rPr>
-              <a:t>11		</a:t>
+              <a:t>			</a:t>
             </a:r>
             <a:r>
               <a:rPr lang="en-US" sz="2400" dirty="0">
@@ -8683,29 +7939,7 @@
                 <a:ea typeface="STHupo" panose="02010800040101010101" pitchFamily="2" charset="-122"/>
                 <a:cs typeface="Aharoni" panose="02010803020104030203" pitchFamily="2" charset="-79"/>
               </a:rPr>
-              <a:t> </a:t>
-            </a:r>
-            <a:r>
-              <a:rPr lang="en-US" sz="2400" dirty="0">
-                <a:solidFill>
-                  <a:srgbClr val="5E2828"/>
-                </a:solidFill>
-                <a:latin typeface="Arial Rounded MT Bold" panose="020F0704030504030204" pitchFamily="34" charset="77"/>
-                <a:ea typeface="STHupo" panose="02010800040101010101" pitchFamily="2" charset="-122"/>
-                <a:cs typeface="Aharoni" panose="02010803020104030203" pitchFamily="2" charset="-79"/>
-              </a:rPr>
-              <a:t>#</a:t>
-            </a:r>
-            <a:r>
-              <a:rPr lang="en-US" sz="2400" dirty="0">
-                <a:solidFill>
-                  <a:schemeClr val="bg1"/>
-                </a:solidFill>
-                <a:latin typeface="Arial Rounded MT Bold" panose="020F0704030504030204" pitchFamily="34" charset="77"/>
-                <a:ea typeface="STHupo" panose="02010800040101010101" pitchFamily="2" charset="-122"/>
-                <a:cs typeface="Aharoni" panose="02010803020104030203" pitchFamily="2" charset="-79"/>
-              </a:rPr>
-              <a:t>3 Sprint Planning</a:t>
+              <a:t> Sprint Planning</a:t>
             </a:r>
           </a:p>
           <a:p>
@@ -8824,29 +8058,7 @@
                 <a:ea typeface="STHupo" panose="02010800040101010101" pitchFamily="2" charset="-122"/>
                 <a:cs typeface="Aharoni" panose="02010803020104030203" pitchFamily="2" charset="-79"/>
               </a:rPr>
-              <a:t>    19</a:t>
-            </a:r>
-            <a:r>
-              <a:rPr lang="en-US" sz="2400" dirty="0">
-                <a:solidFill>
-                  <a:schemeClr val="bg1"/>
-                </a:solidFill>
-                <a:latin typeface="Arial Rounded MT Bold" panose="020F0704030504030204" pitchFamily="34" charset="77"/>
-                <a:ea typeface="STHupo" panose="02010800040101010101" pitchFamily="2" charset="-122"/>
-                <a:cs typeface="Aharoni" panose="02010803020104030203" pitchFamily="2" charset="-79"/>
-              </a:rPr>
-              <a:t>.</a:t>
-            </a:r>
-            <a:r>
-              <a:rPr lang="en-US" sz="2400" dirty="0">
-                <a:solidFill>
-                  <a:srgbClr val="5E2828"/>
-                </a:solidFill>
-                <a:latin typeface="Arial Rounded MT Bold" panose="020F0704030504030204" pitchFamily="34" charset="77"/>
-                <a:ea typeface="STHupo" panose="02010800040101010101" pitchFamily="2" charset="-122"/>
-                <a:cs typeface="Aharoni" panose="02010803020104030203" pitchFamily="2" charset="-79"/>
-              </a:rPr>
-              <a:t>12		</a:t>
+              <a:t>			</a:t>
             </a:r>
             <a:r>
               <a:rPr lang="en-US" sz="2400" dirty="0">
@@ -8937,7 +8149,7 @@
           <a:p>
             <a:fld id="{E869FCD6-9CD9-BC4A-B46E-5D0910D7B1A4}" type="slidenum">
               <a:rPr lang="en-US" smtClean="0"/>
-              <a:t>9</a:t>
+              <a:t>8</a:t>
             </a:fld>
             <a:endParaRPr lang="en-US"/>
           </a:p>
@@ -9248,6 +8460,200 @@
     <p:extLst>
       <p:ext uri="{BB962C8B-B14F-4D97-AF65-F5344CB8AC3E}">
         <p14:creationId xmlns:p14="http://schemas.microsoft.com/office/powerpoint/2010/main" val="2776289329"/>
+      </p:ext>
+    </p:extLst>
+  </p:cSld>
+  <p:clrMapOvr>
+    <a:masterClrMapping/>
+  </p:clrMapOvr>
+  <p:transition spd="slow">
+    <p:cover dir="d"/>
+  </p:transition>
+</p:sld>
+</file>
+
+<file path=ppt/slides/slide9.xml><?xml version="1.0" encoding="utf-8"?>
+<p:sld xmlns:a="http://schemas.openxmlformats.org/drawingml/2006/main" xmlns:r="http://schemas.openxmlformats.org/officeDocument/2006/relationships" xmlns:p="http://schemas.openxmlformats.org/presentationml/2006/main">
+  <p:cSld>
+    <p:spTree>
+      <p:nvGrpSpPr>
+        <p:cNvPr id="1" name=""/>
+        <p:cNvGrpSpPr/>
+        <p:nvPr/>
+      </p:nvGrpSpPr>
+      <p:grpSpPr>
+        <a:xfrm>
+          <a:off x="0" y="0"/>
+          <a:ext cx="0" cy="0"/>
+          <a:chOff x="0" y="0"/>
+          <a:chExt cx="0" cy="0"/>
+        </a:xfrm>
+      </p:grpSpPr>
+      <p:sp>
+        <p:nvSpPr>
+          <p:cNvPr id="7" name="Rectangle 6">
+            <a:extLst>
+              <a:ext uri="{FF2B5EF4-FFF2-40B4-BE49-F238E27FC236}">
+                <a16:creationId xmlns:a16="http://schemas.microsoft.com/office/drawing/2014/main" id="{B32872A6-286D-C644-8DBC-D6F3A98FE1B5}"/>
+              </a:ext>
+            </a:extLst>
+          </p:cNvPr>
+          <p:cNvSpPr/>
+          <p:nvPr/>
+        </p:nvSpPr>
+        <p:spPr>
+          <a:xfrm>
+            <a:off x="0" y="0"/>
+            <a:ext cx="12192000" cy="6858000"/>
+          </a:xfrm>
+          <a:prstGeom prst="rect">
+            <a:avLst/>
+          </a:prstGeom>
+          <a:solidFill>
+            <a:srgbClr val="FF6B6B"/>
+          </a:solidFill>
+        </p:spPr>
+        <p:style>
+          <a:lnRef idx="2">
+            <a:schemeClr val="accent1">
+              <a:shade val="50000"/>
+            </a:schemeClr>
+          </a:lnRef>
+          <a:fillRef idx="1">
+            <a:schemeClr val="accent1"/>
+          </a:fillRef>
+          <a:effectRef idx="0">
+            <a:schemeClr val="accent1"/>
+          </a:effectRef>
+          <a:fontRef idx="minor">
+            <a:schemeClr val="lt1"/>
+          </a:fontRef>
+        </p:style>
+        <p:txBody>
+          <a:bodyPr rtlCol="0" anchor="ctr"/>
+          <a:lstStyle/>
+          <a:p>
+            <a:pPr algn="ctr"/>
+            <a:endParaRPr lang="en-US"/>
+          </a:p>
+        </p:txBody>
+      </p:sp>
+      <p:sp>
+        <p:nvSpPr>
+          <p:cNvPr id="8" name="Oval 7">
+            <a:extLst>
+              <a:ext uri="{FF2B5EF4-FFF2-40B4-BE49-F238E27FC236}">
+                <a16:creationId xmlns:a16="http://schemas.microsoft.com/office/drawing/2014/main" id="{8D790786-99E4-B24C-848A-435B11B96EBE}"/>
+              </a:ext>
+            </a:extLst>
+          </p:cNvPr>
+          <p:cNvSpPr/>
+          <p:nvPr/>
+        </p:nvSpPr>
+        <p:spPr>
+          <a:xfrm>
+            <a:off x="1907822" y="1546578"/>
+            <a:ext cx="8534400" cy="3849511"/>
+          </a:xfrm>
+          <a:prstGeom prst="ellipse">
+            <a:avLst/>
+          </a:prstGeom>
+          <a:solidFill>
+            <a:schemeClr val="bg1">
+              <a:alpha val="0"/>
+            </a:schemeClr>
+          </a:solidFill>
+          <a:ln>
+            <a:noFill/>
+          </a:ln>
+          <a:effectLst>
+            <a:glow rad="1905000">
+              <a:schemeClr val="bg1">
+                <a:alpha val="16000"/>
+              </a:schemeClr>
+            </a:glow>
+          </a:effectLst>
+        </p:spPr>
+        <p:style>
+          <a:lnRef idx="2">
+            <a:schemeClr val="accent1">
+              <a:shade val="50000"/>
+            </a:schemeClr>
+          </a:lnRef>
+          <a:fillRef idx="1">
+            <a:schemeClr val="accent1"/>
+          </a:fillRef>
+          <a:effectRef idx="0">
+            <a:schemeClr val="accent1"/>
+          </a:effectRef>
+          <a:fontRef idx="minor">
+            <a:schemeClr val="lt1"/>
+          </a:fontRef>
+        </p:style>
+        <p:txBody>
+          <a:bodyPr rtlCol="0" anchor="ctr"/>
+          <a:lstStyle/>
+          <a:p>
+            <a:pPr algn="ctr"/>
+            <a:endParaRPr lang="en-US"/>
+          </a:p>
+        </p:txBody>
+      </p:sp>
+      <p:sp>
+        <p:nvSpPr>
+          <p:cNvPr id="5" name="Rectangle 4">
+            <a:extLst>
+              <a:ext uri="{FF2B5EF4-FFF2-40B4-BE49-F238E27FC236}">
+                <a16:creationId xmlns:a16="http://schemas.microsoft.com/office/drawing/2014/main" id="{3BEB164D-1A47-9247-8C0A-E4915C296D76}"/>
+              </a:ext>
+            </a:extLst>
+          </p:cNvPr>
+          <p:cNvSpPr/>
+          <p:nvPr/>
+        </p:nvSpPr>
+        <p:spPr>
+          <a:xfrm>
+            <a:off x="4924012" y="3209723"/>
+            <a:ext cx="2343976" cy="523220"/>
+          </a:xfrm>
+          <a:prstGeom prst="rect">
+            <a:avLst/>
+          </a:prstGeom>
+        </p:spPr>
+        <p:txBody>
+          <a:bodyPr wrap="none" anchor="b">
+            <a:spAutoFit/>
+          </a:bodyPr>
+          <a:lstStyle/>
+          <a:p>
+            <a:pPr algn="r"/>
+            <a:r>
+              <a:rPr lang="en-US" sz="2800" i="0" dirty="0">
+                <a:solidFill>
+                  <a:schemeClr val="bg1"/>
+                </a:solidFill>
+                <a:effectLst/>
+                <a:latin typeface="Arial Rounded MT Bold" panose="020F0704030504030204" pitchFamily="34" charset="77"/>
+                <a:ea typeface="STHupo" panose="02010800040101010101" pitchFamily="2" charset="-122"/>
+                <a:cs typeface="Aharoni" panose="02010803020104030203" pitchFamily="2" charset="-79"/>
+              </a:rPr>
+              <a:t>THANK YOU</a:t>
+            </a:r>
+            <a:endParaRPr lang="en-US" sz="2800" dirty="0">
+              <a:solidFill>
+                <a:schemeClr val="bg1"/>
+              </a:solidFill>
+              <a:latin typeface="Arial Rounded MT Bold" panose="020F0704030504030204" pitchFamily="34" charset="77"/>
+              <a:ea typeface="STHupo" panose="02010800040101010101" pitchFamily="2" charset="-122"/>
+              <a:cs typeface="Aharoni" panose="02010803020104030203" pitchFamily="2" charset="-79"/>
+            </a:endParaRPr>
+          </a:p>
+        </p:txBody>
+      </p:sp>
+    </p:spTree>
+    <p:extLst>
+      <p:ext uri="{BB962C8B-B14F-4D97-AF65-F5344CB8AC3E}">
+        <p14:creationId xmlns:p14="http://schemas.microsoft.com/office/powerpoint/2010/main" val="4189793258"/>
       </p:ext>
     </p:extLst>
   </p:cSld>

</xml_diff>

<commit_message>
Added things that were mentioned during the course
</commit_message>
<xml_diff>
--- a/Initial_Pitch.pptx
+++ b/Initial_Pitch.pptx
@@ -5,18 +5,19 @@
     <p:sldMasterId id="2147483648" r:id="rId1"/>
   </p:sldMasterIdLst>
   <p:notesMasterIdLst>
-    <p:notesMasterId r:id="rId11"/>
+    <p:notesMasterId r:id="rId12"/>
   </p:notesMasterIdLst>
   <p:sldIdLst>
     <p:sldId id="266" r:id="rId2"/>
     <p:sldId id="257" r:id="rId3"/>
     <p:sldId id="260" r:id="rId4"/>
-    <p:sldId id="258" r:id="rId5"/>
-    <p:sldId id="259" r:id="rId6"/>
-    <p:sldId id="265" r:id="rId7"/>
-    <p:sldId id="263" r:id="rId8"/>
-    <p:sldId id="261" r:id="rId9"/>
-    <p:sldId id="264" r:id="rId10"/>
+    <p:sldId id="267" r:id="rId5"/>
+    <p:sldId id="258" r:id="rId6"/>
+    <p:sldId id="259" r:id="rId7"/>
+    <p:sldId id="265" r:id="rId8"/>
+    <p:sldId id="263" r:id="rId9"/>
+    <p:sldId id="261" r:id="rId10"/>
+    <p:sldId id="264" r:id="rId11"/>
   </p:sldIdLst>
   <p:sldSz cx="12192000" cy="6858000"/>
   <p:notesSz cx="6858000" cy="9144000"/>
@@ -127,6 +128,7 @@
         </p14:section>
         <p14:section name="Context" id="{EF6790E6-6A58-5446-9652-3813510B0572}">
           <p14:sldIdLst>
+            <p14:sldId id="267"/>
             <p14:sldId id="258"/>
             <p14:sldId id="259"/>
             <p14:sldId id="265"/>
@@ -229,7 +231,7 @@
           <a:p>
             <a:fld id="{C42DD129-2FF9-A046-B45F-39E82DE472D3}" type="datetimeFigureOut">
               <a:rPr lang="en-US" smtClean="0"/>
-              <a:t>9/30/19</a:t>
+              <a:t>10/3/19</a:t>
             </a:fld>
             <a:endParaRPr lang="en-US"/>
           </a:p>
@@ -388,7 +390,7 @@
           <a:p>
             <a:fld id="{BCB85714-5672-1A40-88C6-9D4BBA44017D}" type="slidenum">
               <a:rPr lang="en-US" smtClean="0"/>
-              <a:t>‹#›</a:t>
+              <a:t>‹Nr.›</a:t>
             </a:fld>
             <a:endParaRPr lang="en-US"/>
           </a:p>
@@ -684,7 +686,7 @@
       </p:grpSpPr>
       <p:sp>
         <p:nvSpPr>
-          <p:cNvPr id="2" name="Slide Image Placeholder 1"/>
+          <p:cNvPr id="2" name="Folienbildplatzhalter 1"/>
           <p:cNvSpPr>
             <a:spLocks noGrp="1" noRot="1" noChangeAspect="1"/>
           </p:cNvSpPr>
@@ -696,7 +698,7 @@
       </p:sp>
       <p:sp>
         <p:nvSpPr>
-          <p:cNvPr id="3" name="Notes Placeholder 2"/>
+          <p:cNvPr id="3" name="Notizenplatzhalter 2"/>
           <p:cNvSpPr>
             <a:spLocks noGrp="1"/>
           </p:cNvSpPr>
@@ -709,13 +711,17 @@
           <a:bodyPr/>
           <a:lstStyle/>
           <a:p>
-            <a:endParaRPr lang="en-US"/>
-          </a:p>
-        </p:txBody>
-      </p:sp>
-      <p:sp>
-        <p:nvSpPr>
-          <p:cNvPr id="4" name="Slide Number Placeholder 3"/>
+            <a:r>
+              <a:rPr lang="de-DE" dirty="0" err="1"/>
+              <a:t>Assumptions</a:t>
+            </a:r>
+            <a:endParaRPr lang="de-DE" dirty="0"/>
+          </a:p>
+        </p:txBody>
+      </p:sp>
+      <p:sp>
+        <p:nvSpPr>
+          <p:cNvPr id="4" name="Foliennummernplatzhalter 3"/>
           <p:cNvSpPr>
             <a:spLocks noGrp="1"/>
           </p:cNvSpPr>
@@ -739,7 +745,7 @@
     </p:spTree>
     <p:extLst>
       <p:ext uri="{BB962C8B-B14F-4D97-AF65-F5344CB8AC3E}">
-        <p14:creationId xmlns:p14="http://schemas.microsoft.com/office/powerpoint/2010/main" val="2838625400"/>
+        <p14:creationId xmlns:p14="http://schemas.microsoft.com/office/powerpoint/2010/main" val="48300631"/>
       </p:ext>
     </p:extLst>
   </p:cSld>
@@ -793,7 +799,7 @@
           <a:bodyPr/>
           <a:lstStyle/>
           <a:p>
-            <a:endParaRPr lang="en-US" dirty="0"/>
+            <a:endParaRPr lang="en-US"/>
           </a:p>
         </p:txBody>
       </p:sp>
@@ -823,7 +829,7 @@
     </p:spTree>
     <p:extLst>
       <p:ext uri="{BB962C8B-B14F-4D97-AF65-F5344CB8AC3E}">
-        <p14:creationId xmlns:p14="http://schemas.microsoft.com/office/powerpoint/2010/main" val="3494083189"/>
+        <p14:creationId xmlns:p14="http://schemas.microsoft.com/office/powerpoint/2010/main" val="2838625400"/>
       </p:ext>
     </p:extLst>
   </p:cSld>
@@ -877,7 +883,75 @@
           <a:bodyPr/>
           <a:lstStyle/>
           <a:p>
-            <a:endParaRPr lang="en-US"/>
+            <a:r>
+              <a:rPr lang="en-US" dirty="0"/>
+              <a:t>Agility</a:t>
+            </a:r>
+          </a:p>
+          <a:p>
+            <a:pPr marL="171450" indent="-171450">
+              <a:buFontTx/>
+              <a:buChar char="-"/>
+            </a:pPr>
+            <a:r>
+              <a:rPr lang="en-US" dirty="0"/>
+              <a:t>Stakeholder involvement</a:t>
+            </a:r>
+          </a:p>
+          <a:p>
+            <a:pPr marL="171450" indent="-171450">
+              <a:buFontTx/>
+              <a:buChar char="-"/>
+            </a:pPr>
+            <a:r>
+              <a:rPr lang="en-US" dirty="0"/>
+              <a:t>MVP</a:t>
+            </a:r>
+          </a:p>
+          <a:p>
+            <a:pPr marL="171450" indent="-171450">
+              <a:buFontTx/>
+              <a:buChar char="-"/>
+            </a:pPr>
+            <a:r>
+              <a:rPr lang="en-US" dirty="0"/>
+              <a:t>Less Time to market </a:t>
+            </a:r>
+          </a:p>
+          <a:p>
+            <a:pPr marL="171450" indent="-171450">
+              <a:buFontTx/>
+              <a:buChar char="-"/>
+            </a:pPr>
+            <a:r>
+              <a:rPr lang="en-US" dirty="0"/>
+              <a:t>Agility within </a:t>
+            </a:r>
+            <a:r>
+              <a:rPr lang="en-US" dirty="0" err="1"/>
+              <a:t>Orgaization</a:t>
+            </a:r>
+            <a:endParaRPr lang="en-US" dirty="0"/>
+          </a:p>
+          <a:p>
+            <a:pPr marL="628650" lvl="1" indent="-171450">
+              <a:buFontTx/>
+              <a:buChar char="-"/>
+            </a:pPr>
+            <a:r>
+              <a:rPr lang="en-US" dirty="0"/>
+              <a:t>Openness to change </a:t>
+            </a:r>
+          </a:p>
+          <a:p>
+            <a:pPr marL="628650" lvl="1" indent="-171450">
+              <a:buFontTx/>
+              <a:buChar char="-"/>
+            </a:pPr>
+            <a:r>
+              <a:rPr lang="en-US" dirty="0"/>
+              <a:t>Project agility leads to organizational agility</a:t>
+            </a:r>
           </a:p>
         </p:txBody>
       </p:sp>
@@ -898,7 +972,7 @@
           <a:p>
             <a:fld id="{BCB85714-5672-1A40-88C6-9D4BBA44017D}" type="slidenum">
               <a:rPr lang="en-US" smtClean="0"/>
-              <a:t>8</a:t>
+              <a:t>7</a:t>
             </a:fld>
             <a:endParaRPr lang="en-US"/>
           </a:p>
@@ -907,7 +981,7 @@
     </p:spTree>
     <p:extLst>
       <p:ext uri="{BB962C8B-B14F-4D97-AF65-F5344CB8AC3E}">
-        <p14:creationId xmlns:p14="http://schemas.microsoft.com/office/powerpoint/2010/main" val="2050069467"/>
+        <p14:creationId xmlns:p14="http://schemas.microsoft.com/office/powerpoint/2010/main" val="3494083189"/>
       </p:ext>
     </p:extLst>
   </p:cSld>
@@ -936,7 +1010,7 @@
       </p:grpSpPr>
       <p:sp>
         <p:nvSpPr>
-          <p:cNvPr id="2" name="Slide Image Placeholder 1"/>
+          <p:cNvPr id="2" name="Folienbildplatzhalter 1"/>
           <p:cNvSpPr>
             <a:spLocks noGrp="1" noRot="1" noChangeAspect="1"/>
           </p:cNvSpPr>
@@ -948,7 +1022,7 @@
       </p:sp>
       <p:sp>
         <p:nvSpPr>
-          <p:cNvPr id="3" name="Notes Placeholder 2"/>
+          <p:cNvPr id="3" name="Notizenplatzhalter 2"/>
           <p:cNvSpPr>
             <a:spLocks noGrp="1"/>
           </p:cNvSpPr>
@@ -961,7 +1035,114 @@
           <a:bodyPr/>
           <a:lstStyle/>
           <a:p>
-            <a:endParaRPr lang="en-US" dirty="0"/>
+            <a:endParaRPr lang="de-DE" dirty="0"/>
+          </a:p>
+        </p:txBody>
+      </p:sp>
+      <p:sp>
+        <p:nvSpPr>
+          <p:cNvPr id="4" name="Foliennummernplatzhalter 3"/>
+          <p:cNvSpPr>
+            <a:spLocks noGrp="1"/>
+          </p:cNvSpPr>
+          <p:nvPr>
+            <p:ph type="sldNum" sz="quarter" idx="5"/>
+          </p:nvPr>
+        </p:nvSpPr>
+        <p:spPr/>
+        <p:txBody>
+          <a:bodyPr/>
+          <a:lstStyle/>
+          <a:p>
+            <a:fld id="{BCB85714-5672-1A40-88C6-9D4BBA44017D}" type="slidenum">
+              <a:rPr lang="en-US" smtClean="0"/>
+              <a:t>8</a:t>
+            </a:fld>
+            <a:endParaRPr lang="en-US"/>
+          </a:p>
+        </p:txBody>
+      </p:sp>
+    </p:spTree>
+    <p:extLst>
+      <p:ext uri="{BB962C8B-B14F-4D97-AF65-F5344CB8AC3E}">
+        <p14:creationId xmlns:p14="http://schemas.microsoft.com/office/powerpoint/2010/main" val="967695307"/>
+      </p:ext>
+    </p:extLst>
+  </p:cSld>
+  <p:clrMapOvr>
+    <a:masterClrMapping/>
+  </p:clrMapOvr>
+</p:notes>
+</file>
+
+<file path=ppt/notesSlides/notesSlide7.xml><?xml version="1.0" encoding="utf-8"?>
+<p:notes xmlns:a="http://schemas.openxmlformats.org/drawingml/2006/main" xmlns:r="http://schemas.openxmlformats.org/officeDocument/2006/relationships" xmlns:p="http://schemas.openxmlformats.org/presentationml/2006/main">
+  <p:cSld>
+    <p:spTree>
+      <p:nvGrpSpPr>
+        <p:cNvPr id="1" name=""/>
+        <p:cNvGrpSpPr/>
+        <p:nvPr/>
+      </p:nvGrpSpPr>
+      <p:grpSpPr>
+        <a:xfrm>
+          <a:off x="0" y="0"/>
+          <a:ext cx="0" cy="0"/>
+          <a:chOff x="0" y="0"/>
+          <a:chExt cx="0" cy="0"/>
+        </a:xfrm>
+      </p:grpSpPr>
+      <p:sp>
+        <p:nvSpPr>
+          <p:cNvPr id="2" name="Slide Image Placeholder 1"/>
+          <p:cNvSpPr>
+            <a:spLocks noGrp="1" noRot="1" noChangeAspect="1"/>
+          </p:cNvSpPr>
+          <p:nvPr>
+            <p:ph type="sldImg"/>
+          </p:nvPr>
+        </p:nvSpPr>
+        <p:spPr/>
+      </p:sp>
+      <p:sp>
+        <p:nvSpPr>
+          <p:cNvPr id="3" name="Notes Placeholder 2"/>
+          <p:cNvSpPr>
+            <a:spLocks noGrp="1"/>
+          </p:cNvSpPr>
+          <p:nvPr>
+            <p:ph type="body" idx="1"/>
+          </p:nvPr>
+        </p:nvSpPr>
+        <p:spPr/>
+        <p:txBody>
+          <a:bodyPr/>
+          <a:lstStyle/>
+          <a:p>
+            <a:r>
+              <a:rPr lang="en-US" dirty="0"/>
+              <a:t>Emphasize that</a:t>
+            </a:r>
+          </a:p>
+          <a:p>
+            <a:pPr marL="171450" indent="-171450">
+              <a:buFontTx/>
+              <a:buChar char="-"/>
+            </a:pPr>
+            <a:r>
+              <a:rPr lang="en-US" dirty="0"/>
+              <a:t>These are not activities but the focus</a:t>
+            </a:r>
+          </a:p>
+          <a:p>
+            <a:pPr marL="171450" indent="-171450">
+              <a:buFontTx/>
+              <a:buChar char="-"/>
+            </a:pPr>
+            <a:r>
+              <a:rPr lang="en-US" dirty="0"/>
+              <a:t>Stakeholder interviews in sprint 1 and 3</a:t>
+            </a:r>
           </a:p>
         </p:txBody>
       </p:sp>
@@ -983,6 +1164,90 @@
             <a:fld id="{BCB85714-5672-1A40-88C6-9D4BBA44017D}" type="slidenum">
               <a:rPr lang="en-US" smtClean="0"/>
               <a:t>9</a:t>
+            </a:fld>
+            <a:endParaRPr lang="en-US"/>
+          </a:p>
+        </p:txBody>
+      </p:sp>
+    </p:spTree>
+    <p:extLst>
+      <p:ext uri="{BB962C8B-B14F-4D97-AF65-F5344CB8AC3E}">
+        <p14:creationId xmlns:p14="http://schemas.microsoft.com/office/powerpoint/2010/main" val="2050069467"/>
+      </p:ext>
+    </p:extLst>
+  </p:cSld>
+  <p:clrMapOvr>
+    <a:masterClrMapping/>
+  </p:clrMapOvr>
+</p:notes>
+</file>
+
+<file path=ppt/notesSlides/notesSlide8.xml><?xml version="1.0" encoding="utf-8"?>
+<p:notes xmlns:a="http://schemas.openxmlformats.org/drawingml/2006/main" xmlns:r="http://schemas.openxmlformats.org/officeDocument/2006/relationships" xmlns:p="http://schemas.openxmlformats.org/presentationml/2006/main">
+  <p:cSld>
+    <p:spTree>
+      <p:nvGrpSpPr>
+        <p:cNvPr id="1" name=""/>
+        <p:cNvGrpSpPr/>
+        <p:nvPr/>
+      </p:nvGrpSpPr>
+      <p:grpSpPr>
+        <a:xfrm>
+          <a:off x="0" y="0"/>
+          <a:ext cx="0" cy="0"/>
+          <a:chOff x="0" y="0"/>
+          <a:chExt cx="0" cy="0"/>
+        </a:xfrm>
+      </p:grpSpPr>
+      <p:sp>
+        <p:nvSpPr>
+          <p:cNvPr id="2" name="Slide Image Placeholder 1"/>
+          <p:cNvSpPr>
+            <a:spLocks noGrp="1" noRot="1" noChangeAspect="1"/>
+          </p:cNvSpPr>
+          <p:nvPr>
+            <p:ph type="sldImg"/>
+          </p:nvPr>
+        </p:nvSpPr>
+        <p:spPr/>
+      </p:sp>
+      <p:sp>
+        <p:nvSpPr>
+          <p:cNvPr id="3" name="Notes Placeholder 2"/>
+          <p:cNvSpPr>
+            <a:spLocks noGrp="1"/>
+          </p:cNvSpPr>
+          <p:nvPr>
+            <p:ph type="body" idx="1"/>
+          </p:nvPr>
+        </p:nvSpPr>
+        <p:spPr/>
+        <p:txBody>
+          <a:bodyPr/>
+          <a:lstStyle/>
+          <a:p>
+            <a:endParaRPr lang="en-US" dirty="0"/>
+          </a:p>
+        </p:txBody>
+      </p:sp>
+      <p:sp>
+        <p:nvSpPr>
+          <p:cNvPr id="4" name="Slide Number Placeholder 3"/>
+          <p:cNvSpPr>
+            <a:spLocks noGrp="1"/>
+          </p:cNvSpPr>
+          <p:nvPr>
+            <p:ph type="sldNum" sz="quarter" idx="5"/>
+          </p:nvPr>
+        </p:nvSpPr>
+        <p:spPr/>
+        <p:txBody>
+          <a:bodyPr/>
+          <a:lstStyle/>
+          <a:p>
+            <a:fld id="{BCB85714-5672-1A40-88C6-9D4BBA44017D}" type="slidenum">
+              <a:rPr lang="en-US" smtClean="0"/>
+              <a:t>10</a:t>
             </a:fld>
             <a:endParaRPr lang="en-US"/>
           </a:p>
@@ -1150,7 +1415,7 @@
           <a:p>
             <a:fld id="{25E64343-14F1-0849-9365-0127323517CF}" type="datetime1">
               <a:rPr lang="en-US" smtClean="0"/>
-              <a:t>9/30/19</a:t>
+              <a:t>10/3/19</a:t>
             </a:fld>
             <a:endParaRPr lang="en-US"/>
           </a:p>
@@ -1204,7 +1469,7 @@
           <a:p>
             <a:fld id="{E869FCD6-9CD9-BC4A-B46E-5D0910D7B1A4}" type="slidenum">
               <a:rPr lang="en-US" smtClean="0"/>
-              <a:t>‹#›</a:t>
+              <a:t>‹Nr.›</a:t>
             </a:fld>
             <a:endParaRPr lang="en-US"/>
           </a:p>
@@ -1350,7 +1615,7 @@
           <a:p>
             <a:fld id="{7A3245D0-50AE-4E48-A819-54493610A566}" type="datetime1">
               <a:rPr lang="en-US" smtClean="0"/>
-              <a:t>9/30/19</a:t>
+              <a:t>10/3/19</a:t>
             </a:fld>
             <a:endParaRPr lang="en-US"/>
           </a:p>
@@ -1404,7 +1669,7 @@
           <a:p>
             <a:fld id="{E869FCD6-9CD9-BC4A-B46E-5D0910D7B1A4}" type="slidenum">
               <a:rPr lang="en-US" smtClean="0"/>
-              <a:t>‹#›</a:t>
+              <a:t>‹Nr.›</a:t>
             </a:fld>
             <a:endParaRPr lang="en-US"/>
           </a:p>
@@ -1560,7 +1825,7 @@
           <a:p>
             <a:fld id="{0C7C23FF-748B-4842-80C5-56D2EBDE336E}" type="datetime1">
               <a:rPr lang="en-US" smtClean="0"/>
-              <a:t>9/30/19</a:t>
+              <a:t>10/3/19</a:t>
             </a:fld>
             <a:endParaRPr lang="en-US"/>
           </a:p>
@@ -1614,7 +1879,7 @@
           <a:p>
             <a:fld id="{E869FCD6-9CD9-BC4A-B46E-5D0910D7B1A4}" type="slidenum">
               <a:rPr lang="en-US" smtClean="0"/>
-              <a:t>‹#›</a:t>
+              <a:t>‹Nr.›</a:t>
             </a:fld>
             <a:endParaRPr lang="en-US"/>
           </a:p>
@@ -1760,7 +2025,7 @@
           <a:p>
             <a:fld id="{A555C980-071E-1A4E-9EAC-12B930034E6A}" type="datetime1">
               <a:rPr lang="en-US" smtClean="0"/>
-              <a:t>9/30/19</a:t>
+              <a:t>10/3/19</a:t>
             </a:fld>
             <a:endParaRPr lang="en-US"/>
           </a:p>
@@ -1814,7 +2079,7 @@
           <a:p>
             <a:fld id="{E869FCD6-9CD9-BC4A-B46E-5D0910D7B1A4}" type="slidenum">
               <a:rPr lang="en-US" smtClean="0"/>
-              <a:t>‹#›</a:t>
+              <a:t>‹Nr.›</a:t>
             </a:fld>
             <a:endParaRPr lang="en-US"/>
           </a:p>
@@ -2036,7 +2301,7 @@
           <a:p>
             <a:fld id="{F288DA12-226B-EE4D-B48D-FDD665D57190}" type="datetime1">
               <a:rPr lang="en-US" smtClean="0"/>
-              <a:t>9/30/19</a:t>
+              <a:t>10/3/19</a:t>
             </a:fld>
             <a:endParaRPr lang="en-US"/>
           </a:p>
@@ -2090,7 +2355,7 @@
           <a:p>
             <a:fld id="{E869FCD6-9CD9-BC4A-B46E-5D0910D7B1A4}" type="slidenum">
               <a:rPr lang="en-US" smtClean="0"/>
-              <a:t>‹#›</a:t>
+              <a:t>‹Nr.›</a:t>
             </a:fld>
             <a:endParaRPr lang="en-US"/>
           </a:p>
@@ -2304,7 +2569,7 @@
           <a:p>
             <a:fld id="{86E294C4-7CC9-054D-8CBC-0B705AD1662E}" type="datetime1">
               <a:rPr lang="en-US" smtClean="0"/>
-              <a:t>9/30/19</a:t>
+              <a:t>10/3/19</a:t>
             </a:fld>
             <a:endParaRPr lang="en-US"/>
           </a:p>
@@ -2358,7 +2623,7 @@
           <a:p>
             <a:fld id="{E869FCD6-9CD9-BC4A-B46E-5D0910D7B1A4}" type="slidenum">
               <a:rPr lang="en-US" smtClean="0"/>
-              <a:t>‹#›</a:t>
+              <a:t>‹Nr.›</a:t>
             </a:fld>
             <a:endParaRPr lang="en-US"/>
           </a:p>
@@ -2719,7 +2984,7 @@
           <a:p>
             <a:fld id="{E0BBC08A-683B-2C4F-9179-89ED3CF80E6B}" type="datetime1">
               <a:rPr lang="en-US" smtClean="0"/>
-              <a:t>9/30/19</a:t>
+              <a:t>10/3/19</a:t>
             </a:fld>
             <a:endParaRPr lang="en-US"/>
           </a:p>
@@ -2773,7 +3038,7 @@
           <a:p>
             <a:fld id="{E869FCD6-9CD9-BC4A-B46E-5D0910D7B1A4}" type="slidenum">
               <a:rPr lang="en-US" smtClean="0"/>
-              <a:t>‹#›</a:t>
+              <a:t>‹Nr.›</a:t>
             </a:fld>
             <a:endParaRPr lang="en-US"/>
           </a:p>
@@ -2861,7 +3126,7 @@
           <a:p>
             <a:fld id="{7076B4AE-5F98-D848-A1AC-3871015197B3}" type="datetime1">
               <a:rPr lang="en-US" smtClean="0"/>
-              <a:t>9/30/19</a:t>
+              <a:t>10/3/19</a:t>
             </a:fld>
             <a:endParaRPr lang="en-US"/>
           </a:p>
@@ -2915,7 +3180,7 @@
           <a:p>
             <a:fld id="{E869FCD6-9CD9-BC4A-B46E-5D0910D7B1A4}" type="slidenum">
               <a:rPr lang="en-US" smtClean="0"/>
-              <a:t>‹#›</a:t>
+              <a:t>‹Nr.›</a:t>
             </a:fld>
             <a:endParaRPr lang="en-US"/>
           </a:p>
@@ -2974,7 +3239,7 @@
           <a:p>
             <a:fld id="{4BF4FF16-26BC-C642-826A-679D1A4897A3}" type="datetime1">
               <a:rPr lang="en-US" smtClean="0"/>
-              <a:t>9/30/19</a:t>
+              <a:t>10/3/19</a:t>
             </a:fld>
             <a:endParaRPr lang="en-US"/>
           </a:p>
@@ -3028,7 +3293,7 @@
           <a:p>
             <a:fld id="{E869FCD6-9CD9-BC4A-B46E-5D0910D7B1A4}" type="slidenum">
               <a:rPr lang="en-US" smtClean="0"/>
-              <a:t>‹#›</a:t>
+              <a:t>‹Nr.›</a:t>
             </a:fld>
             <a:endParaRPr lang="en-US"/>
           </a:p>
@@ -3287,7 +3552,7 @@
           <a:p>
             <a:fld id="{79F78B35-4F27-E748-B0B3-0263757F6F12}" type="datetime1">
               <a:rPr lang="en-US" smtClean="0"/>
-              <a:t>9/30/19</a:t>
+              <a:t>10/3/19</a:t>
             </a:fld>
             <a:endParaRPr lang="en-US"/>
           </a:p>
@@ -3341,7 +3606,7 @@
           <a:p>
             <a:fld id="{E869FCD6-9CD9-BC4A-B46E-5D0910D7B1A4}" type="slidenum">
               <a:rPr lang="en-US" smtClean="0"/>
-              <a:t>‹#›</a:t>
+              <a:t>‹Nr.›</a:t>
             </a:fld>
             <a:endParaRPr lang="en-US"/>
           </a:p>
@@ -3576,7 +3841,7 @@
           <a:p>
             <a:fld id="{B40812EA-29AA-DD44-A11F-B05850B2B441}" type="datetime1">
               <a:rPr lang="en-US" smtClean="0"/>
-              <a:t>9/30/19</a:t>
+              <a:t>10/3/19</a:t>
             </a:fld>
             <a:endParaRPr lang="en-US"/>
           </a:p>
@@ -3630,7 +3895,7 @@
           <a:p>
             <a:fld id="{E869FCD6-9CD9-BC4A-B46E-5D0910D7B1A4}" type="slidenum">
               <a:rPr lang="en-US" smtClean="0"/>
-              <a:t>‹#›</a:t>
+              <a:t>‹Nr.›</a:t>
             </a:fld>
             <a:endParaRPr lang="en-US"/>
           </a:p>
@@ -3819,7 +4084,7 @@
           <a:p>
             <a:fld id="{8A1324F1-C46E-094B-ACA6-E74C304AF854}" type="datetime1">
               <a:rPr lang="en-US" smtClean="0"/>
-              <a:t>9/30/19</a:t>
+              <a:t>10/3/19</a:t>
             </a:fld>
             <a:endParaRPr lang="en-US"/>
           </a:p>
@@ -3909,7 +4174,7 @@
           <a:p>
             <a:fld id="{E869FCD6-9CD9-BC4A-B46E-5D0910D7B1A4}" type="slidenum">
               <a:rPr lang="en-US" smtClean="0"/>
-              <a:t>‹#›</a:t>
+              <a:t>‹Nr.›</a:t>
             </a:fld>
             <a:endParaRPr lang="en-US"/>
           </a:p>
@@ -4258,6 +4523,200 @@
 </p:sld>
 </file>
 
+<file path=ppt/slides/slide10.xml><?xml version="1.0" encoding="utf-8"?>
+<p:sld xmlns:a="http://schemas.openxmlformats.org/drawingml/2006/main" xmlns:r="http://schemas.openxmlformats.org/officeDocument/2006/relationships" xmlns:p="http://schemas.openxmlformats.org/presentationml/2006/main">
+  <p:cSld>
+    <p:spTree>
+      <p:nvGrpSpPr>
+        <p:cNvPr id="1" name=""/>
+        <p:cNvGrpSpPr/>
+        <p:nvPr/>
+      </p:nvGrpSpPr>
+      <p:grpSpPr>
+        <a:xfrm>
+          <a:off x="0" y="0"/>
+          <a:ext cx="0" cy="0"/>
+          <a:chOff x="0" y="0"/>
+          <a:chExt cx="0" cy="0"/>
+        </a:xfrm>
+      </p:grpSpPr>
+      <p:sp>
+        <p:nvSpPr>
+          <p:cNvPr id="7" name="Rectangle 6">
+            <a:extLst>
+              <a:ext uri="{FF2B5EF4-FFF2-40B4-BE49-F238E27FC236}">
+                <a16:creationId xmlns:a16="http://schemas.microsoft.com/office/drawing/2014/main" id="{B32872A6-286D-C644-8DBC-D6F3A98FE1B5}"/>
+              </a:ext>
+            </a:extLst>
+          </p:cNvPr>
+          <p:cNvSpPr/>
+          <p:nvPr/>
+        </p:nvSpPr>
+        <p:spPr>
+          <a:xfrm>
+            <a:off x="0" y="0"/>
+            <a:ext cx="12192000" cy="6858000"/>
+          </a:xfrm>
+          <a:prstGeom prst="rect">
+            <a:avLst/>
+          </a:prstGeom>
+          <a:solidFill>
+            <a:srgbClr val="FF6B6B"/>
+          </a:solidFill>
+        </p:spPr>
+        <p:style>
+          <a:lnRef idx="2">
+            <a:schemeClr val="accent1">
+              <a:shade val="50000"/>
+            </a:schemeClr>
+          </a:lnRef>
+          <a:fillRef idx="1">
+            <a:schemeClr val="accent1"/>
+          </a:fillRef>
+          <a:effectRef idx="0">
+            <a:schemeClr val="accent1"/>
+          </a:effectRef>
+          <a:fontRef idx="minor">
+            <a:schemeClr val="lt1"/>
+          </a:fontRef>
+        </p:style>
+        <p:txBody>
+          <a:bodyPr rtlCol="0" anchor="ctr"/>
+          <a:lstStyle/>
+          <a:p>
+            <a:pPr algn="ctr"/>
+            <a:endParaRPr lang="en-US"/>
+          </a:p>
+        </p:txBody>
+      </p:sp>
+      <p:sp>
+        <p:nvSpPr>
+          <p:cNvPr id="8" name="Oval 7">
+            <a:extLst>
+              <a:ext uri="{FF2B5EF4-FFF2-40B4-BE49-F238E27FC236}">
+                <a16:creationId xmlns:a16="http://schemas.microsoft.com/office/drawing/2014/main" id="{8D790786-99E4-B24C-848A-435B11B96EBE}"/>
+              </a:ext>
+            </a:extLst>
+          </p:cNvPr>
+          <p:cNvSpPr/>
+          <p:nvPr/>
+        </p:nvSpPr>
+        <p:spPr>
+          <a:xfrm>
+            <a:off x="1907822" y="1546578"/>
+            <a:ext cx="8534400" cy="3849511"/>
+          </a:xfrm>
+          <a:prstGeom prst="ellipse">
+            <a:avLst/>
+          </a:prstGeom>
+          <a:solidFill>
+            <a:schemeClr val="bg1">
+              <a:alpha val="0"/>
+            </a:schemeClr>
+          </a:solidFill>
+          <a:ln>
+            <a:noFill/>
+          </a:ln>
+          <a:effectLst>
+            <a:glow rad="1905000">
+              <a:schemeClr val="bg1">
+                <a:alpha val="16000"/>
+              </a:schemeClr>
+            </a:glow>
+          </a:effectLst>
+        </p:spPr>
+        <p:style>
+          <a:lnRef idx="2">
+            <a:schemeClr val="accent1">
+              <a:shade val="50000"/>
+            </a:schemeClr>
+          </a:lnRef>
+          <a:fillRef idx="1">
+            <a:schemeClr val="accent1"/>
+          </a:fillRef>
+          <a:effectRef idx="0">
+            <a:schemeClr val="accent1"/>
+          </a:effectRef>
+          <a:fontRef idx="minor">
+            <a:schemeClr val="lt1"/>
+          </a:fontRef>
+        </p:style>
+        <p:txBody>
+          <a:bodyPr rtlCol="0" anchor="ctr"/>
+          <a:lstStyle/>
+          <a:p>
+            <a:pPr algn="ctr"/>
+            <a:endParaRPr lang="en-US"/>
+          </a:p>
+        </p:txBody>
+      </p:sp>
+      <p:sp>
+        <p:nvSpPr>
+          <p:cNvPr id="5" name="Rectangle 4">
+            <a:extLst>
+              <a:ext uri="{FF2B5EF4-FFF2-40B4-BE49-F238E27FC236}">
+                <a16:creationId xmlns:a16="http://schemas.microsoft.com/office/drawing/2014/main" id="{3BEB164D-1A47-9247-8C0A-E4915C296D76}"/>
+              </a:ext>
+            </a:extLst>
+          </p:cNvPr>
+          <p:cNvSpPr/>
+          <p:nvPr/>
+        </p:nvSpPr>
+        <p:spPr>
+          <a:xfrm>
+            <a:off x="4924012" y="3209723"/>
+            <a:ext cx="2343976" cy="523220"/>
+          </a:xfrm>
+          <a:prstGeom prst="rect">
+            <a:avLst/>
+          </a:prstGeom>
+        </p:spPr>
+        <p:txBody>
+          <a:bodyPr wrap="none" anchor="b">
+            <a:spAutoFit/>
+          </a:bodyPr>
+          <a:lstStyle/>
+          <a:p>
+            <a:pPr algn="r"/>
+            <a:r>
+              <a:rPr lang="en-US" sz="2800" i="0" dirty="0">
+                <a:solidFill>
+                  <a:schemeClr val="bg1"/>
+                </a:solidFill>
+                <a:effectLst/>
+                <a:latin typeface="Arial Rounded MT Bold" panose="020F0704030504030204" pitchFamily="34" charset="77"/>
+                <a:ea typeface="STHupo" panose="02010800040101010101" pitchFamily="2" charset="-122"/>
+                <a:cs typeface="Aharoni" panose="02010803020104030203" pitchFamily="2" charset="-79"/>
+              </a:rPr>
+              <a:t>THANK YOU</a:t>
+            </a:r>
+            <a:endParaRPr lang="en-US" sz="2800" dirty="0">
+              <a:solidFill>
+                <a:schemeClr val="bg1"/>
+              </a:solidFill>
+              <a:latin typeface="Arial Rounded MT Bold" panose="020F0704030504030204" pitchFamily="34" charset="77"/>
+              <a:ea typeface="STHupo" panose="02010800040101010101" pitchFamily="2" charset="-122"/>
+              <a:cs typeface="Aharoni" panose="02010803020104030203" pitchFamily="2" charset="-79"/>
+            </a:endParaRPr>
+          </a:p>
+        </p:txBody>
+      </p:sp>
+    </p:spTree>
+    <p:extLst>
+      <p:ext uri="{BB962C8B-B14F-4D97-AF65-F5344CB8AC3E}">
+        <p14:creationId xmlns:p14="http://schemas.microsoft.com/office/powerpoint/2010/main" val="4189793258"/>
+      </p:ext>
+    </p:extLst>
+  </p:cSld>
+  <p:clrMapOvr>
+    <a:masterClrMapping/>
+  </p:clrMapOvr>
+  <p:transition spd="slow">
+    <p:cover dir="d"/>
+  </p:transition>
+</p:sld>
+</file>
+
 <file path=ppt/slides/slide2.xml><?xml version="1.0" encoding="utf-8"?>
 <p:sld xmlns:a="http://schemas.openxmlformats.org/drawingml/2006/main" xmlns:r="http://schemas.openxmlformats.org/officeDocument/2006/relationships" xmlns:p="http://schemas.openxmlformats.org/presentationml/2006/main">
   <p:cSld>
@@ -5366,38 +5825,100 @@
             <p:ph idx="1"/>
           </p:nvPr>
         </p:nvSpPr>
-        <p:spPr/>
+        <p:spPr>
+          <a:xfrm>
+            <a:off x="838200" y="1825625"/>
+            <a:ext cx="10515600" cy="4351338"/>
+          </a:xfrm>
+        </p:spPr>
         <p:txBody>
           <a:bodyPr/>
           <a:lstStyle/>
           <a:p>
-            <a:pPr marL="0" indent="0">
+            <a:pPr>
               <a:buClr>
                 <a:schemeClr val="bg1"/>
               </a:buClr>
-              <a:buNone/>
             </a:pPr>
             <a:r>
               <a:rPr lang="en-US" dirty="0">
                 <a:solidFill>
-                  <a:schemeClr val="bg1"/>
+                  <a:srgbClr val="5E2828"/>
                 </a:solidFill>
                 <a:latin typeface="Arial Rounded MT Bold" panose="020F0704030504030204" pitchFamily="34" charset="77"/>
                 <a:ea typeface="STHupo" panose="02010800040101010101" pitchFamily="2" charset="-122"/>
                 <a:cs typeface="Aharoni" panose="02010803020104030203" pitchFamily="2" charset="-79"/>
               </a:rPr>
-              <a:t>We assume that</a:t>
+              <a:t>Parents pay for their children’s daycare as a monthly fee - regardless if the child is sick and does not visit daycare</a:t>
             </a:r>
             <a:r>
               <a:rPr lang="en-US" dirty="0">
                 <a:solidFill>
-                  <a:srgbClr val="5E2828"/>
+                  <a:schemeClr val="bg1"/>
                 </a:solidFill>
                 <a:latin typeface="Arial Rounded MT Bold" panose="020F0704030504030204" pitchFamily="34" charset="77"/>
                 <a:ea typeface="STHupo" panose="02010800040101010101" pitchFamily="2" charset="-122"/>
                 <a:cs typeface="Aharoni" panose="02010803020104030203" pitchFamily="2" charset="-79"/>
               </a:rPr>
-              <a:t>:</a:t>
+              <a:t>. </a:t>
+            </a:r>
+          </a:p>
+          <a:p>
+            <a:pPr>
+              <a:buClr>
+                <a:schemeClr val="bg1"/>
+              </a:buClr>
+            </a:pPr>
+            <a:r>
+              <a:rPr lang="en-US" dirty="0">
+                <a:solidFill>
+                  <a:srgbClr val="5E2828"/>
+                </a:solidFill>
+                <a:latin typeface="Arial Rounded MT Bold" panose="020F0704030504030204" pitchFamily="34" charset="77"/>
+                <a:ea typeface="STHupo" panose="02010800040101010101" pitchFamily="2" charset="-122"/>
+                <a:cs typeface="Aharoni" panose="02010803020104030203" pitchFamily="2" charset="-79"/>
+              </a:rPr>
+              <a:t>As a result, the daycare has a vacancy</a:t>
+            </a:r>
+            <a:r>
+              <a:rPr lang="en-US" dirty="0">
+                <a:solidFill>
+                  <a:schemeClr val="bg1"/>
+                </a:solidFill>
+                <a:latin typeface="Arial Rounded MT Bold" panose="020F0704030504030204" pitchFamily="34" charset="77"/>
+                <a:ea typeface="STHupo" panose="02010800040101010101" pitchFamily="2" charset="-122"/>
+                <a:cs typeface="Aharoni" panose="02010803020104030203" pitchFamily="2" charset="-79"/>
+              </a:rPr>
+              <a:t>.</a:t>
+            </a:r>
+          </a:p>
+          <a:p>
+            <a:pPr>
+              <a:buClr>
+                <a:schemeClr val="bg1"/>
+              </a:buClr>
+            </a:pPr>
+            <a:r>
+              <a:rPr lang="en-US" dirty="0">
+                <a:solidFill>
+                  <a:srgbClr val="5E2828"/>
+                </a:solidFill>
+                <a:latin typeface="Arial Rounded MT Bold" panose="020F0704030504030204" pitchFamily="34" charset="77"/>
+                <a:ea typeface="STHupo" panose="02010800040101010101" pitchFamily="2" charset="-122"/>
+                <a:cs typeface="Aharoni" panose="02010803020104030203" pitchFamily="2" charset="-79"/>
+              </a:rPr>
+              <a:t>Other parents may be in need of a place for this day, when an unexpected event arises</a:t>
+            </a:r>
+            <a:r>
+              <a:rPr lang="en-US" dirty="0">
+                <a:solidFill>
+                  <a:schemeClr val="bg1"/>
+                </a:solidFill>
+                <a:latin typeface="Arial Rounded MT Bold" panose="020F0704030504030204" pitchFamily="34" charset="77"/>
+                <a:ea typeface="STHupo" panose="02010800040101010101" pitchFamily="2" charset="-122"/>
+                <a:cs typeface="Aharoni" panose="02010803020104030203" pitchFamily="2" charset="-79"/>
+              </a:rPr>
+              <a:t>. </a:t>
             </a:r>
           </a:p>
           <a:p>
@@ -5409,48 +5930,12 @@
             </a:pPr>
             <a:endParaRPr lang="en-US" dirty="0">
               <a:solidFill>
-                <a:srgbClr val="5E2828"/>
+                <a:schemeClr val="bg1"/>
               </a:solidFill>
               <a:latin typeface="Arial Rounded MT Bold" panose="020F0704030504030204" pitchFamily="34" charset="77"/>
               <a:ea typeface="STHupo" panose="02010800040101010101" pitchFamily="2" charset="-122"/>
               <a:cs typeface="Aharoni" panose="02010803020104030203" pitchFamily="2" charset="-79"/>
             </a:endParaRPr>
-          </a:p>
-          <a:p>
-            <a:pPr>
-              <a:buClr>
-                <a:schemeClr val="bg1"/>
-              </a:buClr>
-            </a:pPr>
-            <a:r>
-              <a:rPr lang="en-US" dirty="0">
-                <a:solidFill>
-                  <a:srgbClr val="5E2828"/>
-                </a:solidFill>
-                <a:latin typeface="Arial Rounded MT Bold" panose="020F0704030504030204" pitchFamily="34" charset="77"/>
-                <a:ea typeface="STHupo" panose="02010800040101010101" pitchFamily="2" charset="-122"/>
-                <a:cs typeface="Aharoni" panose="02010803020104030203" pitchFamily="2" charset="-79"/>
-              </a:rPr>
-              <a:t>Affordable Daycare</a:t>
-            </a:r>
-          </a:p>
-          <a:p>
-            <a:pPr>
-              <a:buClr>
-                <a:schemeClr val="bg1"/>
-              </a:buClr>
-            </a:pPr>
-            <a:r>
-              <a:rPr lang="en-US" dirty="0">
-                <a:solidFill>
-                  <a:srgbClr val="5E2828"/>
-                </a:solidFill>
-                <a:latin typeface="Arial Rounded MT Bold" panose="020F0704030504030204" pitchFamily="34" charset="77"/>
-                <a:ea typeface="STHupo" panose="02010800040101010101" pitchFamily="2" charset="-122"/>
-                <a:cs typeface="Aharoni" panose="02010803020104030203" pitchFamily="2" charset="-79"/>
-              </a:rPr>
-              <a:t>Flexible Daycare</a:t>
-            </a:r>
           </a:p>
           <a:p>
             <a:pPr marL="0" indent="0">
@@ -5459,34 +5944,18 @@
               </a:buClr>
               <a:buNone/>
             </a:pPr>
-            <a:endParaRPr lang="en-US" dirty="0">
-              <a:solidFill>
-                <a:srgbClr val="5E2828"/>
-              </a:solidFill>
-              <a:latin typeface="Arial Rounded MT Bold" panose="020F0704030504030204" pitchFamily="34" charset="77"/>
-              <a:ea typeface="STHupo" panose="02010800040101010101" pitchFamily="2" charset="-122"/>
-              <a:cs typeface="Aharoni" panose="02010803020104030203" pitchFamily="2" charset="-79"/>
-            </a:endParaRPr>
-          </a:p>
-          <a:p>
-            <a:pPr marL="0" indent="0">
-              <a:buClr>
-                <a:schemeClr val="bg1"/>
-              </a:buClr>
-              <a:buNone/>
-            </a:pPr>
             <a:r>
               <a:rPr lang="en-US" dirty="0">
                 <a:solidFill>
-                  <a:srgbClr val="5E2828"/>
+                  <a:schemeClr val="bg1"/>
                 </a:solidFill>
                 <a:latin typeface="Arial Rounded MT Bold" panose="020F0704030504030204" pitchFamily="34" charset="77"/>
                 <a:ea typeface="STHupo" panose="02010800040101010101" pitchFamily="2" charset="-122"/>
                 <a:cs typeface="Aharoni" panose="02010803020104030203" pitchFamily="2" charset="-79"/>
               </a:rPr>
-              <a:t>The rest </a:t>
-            </a:r>
-            <a:r>
+              <a:t>Today, there is no system that manages the capacity of </a:t>
+            </a:r>
+            <a:br>
               <a:rPr lang="en-US" dirty="0">
                 <a:solidFill>
                   <a:schemeClr val="bg1"/>
@@ -5495,29 +5964,17 @@
                 <a:ea typeface="STHupo" panose="02010800040101010101" pitchFamily="2" charset="-122"/>
                 <a:cs typeface="Aharoni" panose="02010803020104030203" pitchFamily="2" charset="-79"/>
               </a:rPr>
-              <a:t>we’ll have to figure out </a:t>
-            </a:r>
+            </a:br>
             <a:r>
               <a:rPr lang="en-US" dirty="0">
                 <a:solidFill>
-                  <a:srgbClr val="5E2828"/>
+                  <a:schemeClr val="bg1"/>
                 </a:solidFill>
                 <a:latin typeface="Arial Rounded MT Bold" panose="020F0704030504030204" pitchFamily="34" charset="77"/>
                 <a:ea typeface="STHupo" panose="02010800040101010101" pitchFamily="2" charset="-122"/>
                 <a:cs typeface="Aharoni" panose="02010803020104030203" pitchFamily="2" charset="-79"/>
               </a:rPr>
-              <a:t>later</a:t>
-            </a:r>
-            <a:r>
-              <a:rPr lang="en-US" dirty="0">
-                <a:solidFill>
-                  <a:schemeClr val="bg1"/>
-                </a:solidFill>
-                <a:latin typeface="Arial Rounded MT Bold" panose="020F0704030504030204" pitchFamily="34" charset="77"/>
-                <a:ea typeface="STHupo" panose="02010800040101010101" pitchFamily="2" charset="-122"/>
-                <a:cs typeface="Aharoni" panose="02010803020104030203" pitchFamily="2" charset="-79"/>
-              </a:rPr>
-              <a:t>!</a:t>
+              <a:t>children’s daycare.</a:t>
             </a:r>
           </a:p>
         </p:txBody>
@@ -5694,7 +6151,7 @@
                 <a:ea typeface="STHupo" panose="02010800040101010101" pitchFamily="2" charset="-122"/>
                 <a:cs typeface="Aharoni" panose="02010803020104030203" pitchFamily="2" charset="-79"/>
               </a:rPr>
-              <a:t>Requirements of a Modern Family</a:t>
+              <a:t>Problem</a:t>
             </a:r>
             <a:endParaRPr lang="en-US" dirty="0">
               <a:solidFill>
@@ -5707,7 +6164,7 @@
     </p:spTree>
     <p:extLst>
       <p:ext uri="{BB962C8B-B14F-4D97-AF65-F5344CB8AC3E}">
-        <p14:creationId xmlns:p14="http://schemas.microsoft.com/office/powerpoint/2010/main" val="1310144445"/>
+        <p14:creationId xmlns:p14="http://schemas.microsoft.com/office/powerpoint/2010/main" val="1905208246"/>
       </p:ext>
     </p:extLst>
   </p:cSld>
@@ -5786,53 +6243,12 @@
           </a:p>
         </p:txBody>
       </p:sp>
-      <p:cxnSp>
-        <p:nvCxnSpPr>
-          <p:cNvPr id="9" name="Straight Connector 8">
-            <a:extLst>
-              <a:ext uri="{FF2B5EF4-FFF2-40B4-BE49-F238E27FC236}">
-                <a16:creationId xmlns:a16="http://schemas.microsoft.com/office/drawing/2014/main" id="{D299F333-05D8-E14D-84FA-B416D488CEC9}"/>
-              </a:ext>
-            </a:extLst>
-          </p:cNvPr>
-          <p:cNvCxnSpPr/>
-          <p:nvPr/>
-        </p:nvCxnSpPr>
-        <p:spPr>
-          <a:xfrm>
-            <a:off x="829340" y="1254639"/>
-            <a:ext cx="10526232" cy="0"/>
-          </a:xfrm>
-          <a:prstGeom prst="line">
-            <a:avLst/>
-          </a:prstGeom>
-          <a:ln w="25400">
-            <a:solidFill>
-              <a:srgbClr val="5E2828"/>
-            </a:solidFill>
-          </a:ln>
-        </p:spPr>
-        <p:style>
-          <a:lnRef idx="1">
-            <a:schemeClr val="accent1"/>
-          </a:lnRef>
-          <a:fillRef idx="0">
-            <a:schemeClr val="accent1"/>
-          </a:fillRef>
-          <a:effectRef idx="0">
-            <a:schemeClr val="accent1"/>
-          </a:effectRef>
-          <a:fontRef idx="minor">
-            <a:schemeClr val="tx1"/>
-          </a:fontRef>
-        </p:style>
-      </p:cxnSp>
-      <p:sp>
-        <p:nvSpPr>
-          <p:cNvPr id="2" name="Title 1">
-            <a:extLst>
-              <a:ext uri="{FF2B5EF4-FFF2-40B4-BE49-F238E27FC236}">
-                <a16:creationId xmlns:a16="http://schemas.microsoft.com/office/drawing/2014/main" id="{ED95F1F0-9F8F-8C4B-A474-3896F352A498}"/>
+      <p:sp>
+        <p:nvSpPr>
+          <p:cNvPr id="3" name="Content Placeholder 2">
+            <a:extLst>
+              <a:ext uri="{FF2B5EF4-FFF2-40B4-BE49-F238E27FC236}">
+                <a16:creationId xmlns:a16="http://schemas.microsoft.com/office/drawing/2014/main" id="{9B76DAF4-1829-A544-BA03-FB6DB10C12C8}"/>
               </a:ext>
             </a:extLst>
           </p:cNvPr>
@@ -5840,16 +6256,20 @@
             <a:spLocks noGrp="1"/>
           </p:cNvSpPr>
           <p:nvPr>
-            <p:ph type="title"/>
+            <p:ph idx="1"/>
           </p:nvPr>
         </p:nvSpPr>
         <p:spPr/>
         <p:txBody>
-          <a:bodyPr>
-            <a:normAutofit/>
-          </a:bodyPr>
+          <a:bodyPr/>
           <a:lstStyle/>
           <a:p>
+            <a:pPr marL="0" indent="0">
+              <a:buClr>
+                <a:schemeClr val="bg1"/>
+              </a:buClr>
+              <a:buNone/>
+            </a:pPr>
             <a:r>
               <a:rPr lang="en-US" dirty="0">
                 <a:solidFill>
@@ -5859,22 +6279,166 @@
                 <a:ea typeface="STHupo" panose="02010800040101010101" pitchFamily="2" charset="-122"/>
                 <a:cs typeface="Aharoni" panose="02010803020104030203" pitchFamily="2" charset="-79"/>
               </a:rPr>
-              <a:t>Agile Kita Management</a:t>
-            </a:r>
+              <a:t>We assume that</a:t>
+            </a:r>
+            <a:r>
+              <a:rPr lang="en-US" dirty="0">
+                <a:solidFill>
+                  <a:srgbClr val="5E2828"/>
+                </a:solidFill>
+                <a:latin typeface="Arial Rounded MT Bold" panose="020F0704030504030204" pitchFamily="34" charset="77"/>
+                <a:ea typeface="STHupo" panose="02010800040101010101" pitchFamily="2" charset="-122"/>
+                <a:cs typeface="Aharoni" panose="02010803020104030203" pitchFamily="2" charset="-79"/>
+              </a:rPr>
+              <a:t>:</a:t>
+            </a:r>
+          </a:p>
+          <a:p>
+            <a:pPr marL="0" indent="0">
+              <a:buClr>
+                <a:schemeClr val="bg1"/>
+              </a:buClr>
+              <a:buNone/>
+            </a:pPr>
             <a:endParaRPr lang="en-US" dirty="0">
               <a:solidFill>
+                <a:srgbClr val="5E2828"/>
+              </a:solidFill>
+              <a:latin typeface="Arial Rounded MT Bold" panose="020F0704030504030204" pitchFamily="34" charset="77"/>
+              <a:ea typeface="STHupo" panose="02010800040101010101" pitchFamily="2" charset="-122"/>
+              <a:cs typeface="Aharoni" panose="02010803020104030203" pitchFamily="2" charset="-79"/>
+            </a:endParaRPr>
+          </a:p>
+          <a:p>
+            <a:pPr>
+              <a:buClr>
                 <a:schemeClr val="bg1"/>
+              </a:buClr>
+            </a:pPr>
+            <a:r>
+              <a:rPr lang="en-US" dirty="0">
+                <a:solidFill>
+                  <a:srgbClr val="5E2828"/>
+                </a:solidFill>
+                <a:latin typeface="Arial Rounded MT Bold" panose="020F0704030504030204" pitchFamily="34" charset="77"/>
+                <a:ea typeface="STHupo" panose="02010800040101010101" pitchFamily="2" charset="-122"/>
+                <a:cs typeface="Aharoni" panose="02010803020104030203" pitchFamily="2" charset="-79"/>
+              </a:rPr>
+              <a:t>Affordable Daycare</a:t>
+            </a:r>
+          </a:p>
+          <a:p>
+            <a:pPr>
+              <a:buClr>
+                <a:schemeClr val="bg1"/>
+              </a:buClr>
+            </a:pPr>
+            <a:r>
+              <a:rPr lang="en-US" dirty="0">
+                <a:solidFill>
+                  <a:srgbClr val="5E2828"/>
+                </a:solidFill>
+                <a:latin typeface="Arial Rounded MT Bold" panose="020F0704030504030204" pitchFamily="34" charset="77"/>
+                <a:ea typeface="STHupo" panose="02010800040101010101" pitchFamily="2" charset="-122"/>
+                <a:cs typeface="Aharoni" panose="02010803020104030203" pitchFamily="2" charset="-79"/>
+              </a:rPr>
+              <a:t>Flexible Daycare</a:t>
+            </a:r>
+          </a:p>
+          <a:p>
+            <a:pPr>
+              <a:buClr>
+                <a:schemeClr val="bg1"/>
+              </a:buClr>
+            </a:pPr>
+            <a:r>
+              <a:rPr lang="en-US" dirty="0">
+                <a:solidFill>
+                  <a:srgbClr val="5E2828"/>
+                </a:solidFill>
+                <a:latin typeface="Arial Rounded MT Bold" panose="020F0704030504030204" pitchFamily="34" charset="77"/>
+                <a:ea typeface="STHupo" panose="02010800040101010101" pitchFamily="2" charset="-122"/>
+                <a:cs typeface="Aharoni" panose="02010803020104030203" pitchFamily="2" charset="-79"/>
+              </a:rPr>
+              <a:t>Ethical Daycare</a:t>
+            </a:r>
+          </a:p>
+          <a:p>
+            <a:pPr marL="0" indent="0">
+              <a:buClr>
+                <a:schemeClr val="bg1"/>
+              </a:buClr>
+              <a:buNone/>
+            </a:pPr>
+            <a:endParaRPr lang="en-US" dirty="0">
+              <a:solidFill>
+                <a:srgbClr val="5E2828"/>
               </a:solidFill>
+              <a:latin typeface="Arial Rounded MT Bold" panose="020F0704030504030204" pitchFamily="34" charset="77"/>
+              <a:ea typeface="STHupo" panose="02010800040101010101" pitchFamily="2" charset="-122"/>
+              <a:cs typeface="Aharoni" panose="02010803020104030203" pitchFamily="2" charset="-79"/>
             </a:endParaRPr>
           </a:p>
-        </p:txBody>
-      </p:sp>
-      <p:sp>
-        <p:nvSpPr>
-          <p:cNvPr id="11" name="Pie 10">
-            <a:extLst>
-              <a:ext uri="{FF2B5EF4-FFF2-40B4-BE49-F238E27FC236}">
-                <a16:creationId xmlns:a16="http://schemas.microsoft.com/office/drawing/2014/main" id="{3E161D77-5B93-F74A-BDA5-5F4585115C9A}"/>
+          <a:p>
+            <a:pPr marL="0" indent="0">
+              <a:buClr>
+                <a:schemeClr val="bg1"/>
+              </a:buClr>
+              <a:buNone/>
+            </a:pPr>
+            <a:r>
+              <a:rPr lang="en-US" dirty="0">
+                <a:solidFill>
+                  <a:srgbClr val="5E2828"/>
+                </a:solidFill>
+                <a:latin typeface="Arial Rounded MT Bold" panose="020F0704030504030204" pitchFamily="34" charset="77"/>
+                <a:ea typeface="STHupo" panose="02010800040101010101" pitchFamily="2" charset="-122"/>
+                <a:cs typeface="Aharoni" panose="02010803020104030203" pitchFamily="2" charset="-79"/>
+              </a:rPr>
+              <a:t>The rest </a:t>
+            </a:r>
+            <a:r>
+              <a:rPr lang="en-US" dirty="0">
+                <a:solidFill>
+                  <a:schemeClr val="bg1"/>
+                </a:solidFill>
+                <a:latin typeface="Arial Rounded MT Bold" panose="020F0704030504030204" pitchFamily="34" charset="77"/>
+                <a:ea typeface="STHupo" panose="02010800040101010101" pitchFamily="2" charset="-122"/>
+                <a:cs typeface="Aharoni" panose="02010803020104030203" pitchFamily="2" charset="-79"/>
+              </a:rPr>
+              <a:t>we’ll have to figure out </a:t>
+            </a:r>
+            <a:r>
+              <a:rPr lang="en-US" dirty="0">
+                <a:solidFill>
+                  <a:srgbClr val="5E2828"/>
+                </a:solidFill>
+                <a:latin typeface="Arial Rounded MT Bold" panose="020F0704030504030204" pitchFamily="34" charset="77"/>
+                <a:ea typeface="STHupo" panose="02010800040101010101" pitchFamily="2" charset="-122"/>
+                <a:cs typeface="Aharoni" panose="02010803020104030203" pitchFamily="2" charset="-79"/>
+              </a:rPr>
+              <a:t>later</a:t>
+            </a:r>
+            <a:r>
+              <a:rPr lang="en-US" dirty="0">
+                <a:solidFill>
+                  <a:schemeClr val="bg1"/>
+                </a:solidFill>
+                <a:latin typeface="Arial Rounded MT Bold" panose="020F0704030504030204" pitchFamily="34" charset="77"/>
+                <a:ea typeface="STHupo" panose="02010800040101010101" pitchFamily="2" charset="-122"/>
+                <a:cs typeface="Aharoni" panose="02010803020104030203" pitchFamily="2" charset="-79"/>
+              </a:rPr>
+              <a:t>!</a:t>
+            </a:r>
+          </a:p>
+        </p:txBody>
+      </p:sp>
+      <p:sp>
+        <p:nvSpPr>
+          <p:cNvPr id="6" name="Pie 5">
+            <a:extLst>
+              <a:ext uri="{FF2B5EF4-FFF2-40B4-BE49-F238E27FC236}">
+                <a16:creationId xmlns:a16="http://schemas.microsoft.com/office/drawing/2014/main" id="{4DE4BC92-D240-704C-A90C-AAEB4EF0AB9B}"/>
               </a:ext>
             </a:extLst>
           </p:cNvPr>
@@ -5930,10 +6494,10 @@
       </p:sp>
       <p:sp>
         <p:nvSpPr>
-          <p:cNvPr id="12" name="Slide Number Placeholder 6">
-            <a:extLst>
-              <a:ext uri="{FF2B5EF4-FFF2-40B4-BE49-F238E27FC236}">
-                <a16:creationId xmlns:a16="http://schemas.microsoft.com/office/drawing/2014/main" id="{097EA611-622B-6744-B3D1-6172162CEB02}"/>
+          <p:cNvPr id="7" name="Slide Number Placeholder 6">
+            <a:extLst>
+              <a:ext uri="{FF2B5EF4-FFF2-40B4-BE49-F238E27FC236}">
+                <a16:creationId xmlns:a16="http://schemas.microsoft.com/office/drawing/2014/main" id="{ACFDEBC2-BC20-1D49-B8A7-9C94F48BE1E4}"/>
               </a:ext>
             </a:extLst>
           </p:cNvPr>
@@ -5968,6 +6532,353 @@
           </a:p>
         </p:txBody>
       </p:sp>
+      <p:cxnSp>
+        <p:nvCxnSpPr>
+          <p:cNvPr id="9" name="Straight Connector 8">
+            <a:extLst>
+              <a:ext uri="{FF2B5EF4-FFF2-40B4-BE49-F238E27FC236}">
+                <a16:creationId xmlns:a16="http://schemas.microsoft.com/office/drawing/2014/main" id="{24235FEA-2336-8C40-A5E6-3A6B920160EF}"/>
+              </a:ext>
+            </a:extLst>
+          </p:cNvPr>
+          <p:cNvCxnSpPr/>
+          <p:nvPr/>
+        </p:nvCxnSpPr>
+        <p:spPr>
+          <a:xfrm>
+            <a:off x="829340" y="1254639"/>
+            <a:ext cx="10526232" cy="0"/>
+          </a:xfrm>
+          <a:prstGeom prst="line">
+            <a:avLst/>
+          </a:prstGeom>
+          <a:ln w="25400">
+            <a:solidFill>
+              <a:srgbClr val="5E2828"/>
+            </a:solidFill>
+          </a:ln>
+        </p:spPr>
+        <p:style>
+          <a:lnRef idx="1">
+            <a:schemeClr val="accent1"/>
+          </a:lnRef>
+          <a:fillRef idx="0">
+            <a:schemeClr val="accent1"/>
+          </a:fillRef>
+          <a:effectRef idx="0">
+            <a:schemeClr val="accent1"/>
+          </a:effectRef>
+          <a:fontRef idx="minor">
+            <a:schemeClr val="tx1"/>
+          </a:fontRef>
+        </p:style>
+      </p:cxnSp>
+      <p:sp>
+        <p:nvSpPr>
+          <p:cNvPr id="2" name="Title 1">
+            <a:extLst>
+              <a:ext uri="{FF2B5EF4-FFF2-40B4-BE49-F238E27FC236}">
+                <a16:creationId xmlns:a16="http://schemas.microsoft.com/office/drawing/2014/main" id="{ED95F1F0-9F8F-8C4B-A474-3896F352A498}"/>
+              </a:ext>
+            </a:extLst>
+          </p:cNvPr>
+          <p:cNvSpPr>
+            <a:spLocks noGrp="1"/>
+          </p:cNvSpPr>
+          <p:nvPr>
+            <p:ph type="title"/>
+          </p:nvPr>
+        </p:nvSpPr>
+        <p:spPr/>
+        <p:txBody>
+          <a:bodyPr>
+            <a:normAutofit/>
+          </a:bodyPr>
+          <a:lstStyle/>
+          <a:p>
+            <a:r>
+              <a:rPr lang="en-US" dirty="0">
+                <a:solidFill>
+                  <a:schemeClr val="bg1"/>
+                </a:solidFill>
+                <a:latin typeface="Arial Rounded MT Bold" panose="020F0704030504030204" pitchFamily="34" charset="77"/>
+                <a:ea typeface="STHupo" panose="02010800040101010101" pitchFamily="2" charset="-122"/>
+                <a:cs typeface="Aharoni" panose="02010803020104030203" pitchFamily="2" charset="-79"/>
+              </a:rPr>
+              <a:t>Requirements of a Modern Family</a:t>
+            </a:r>
+            <a:endParaRPr lang="en-US" dirty="0">
+              <a:solidFill>
+                <a:schemeClr val="bg1"/>
+              </a:solidFill>
+            </a:endParaRPr>
+          </a:p>
+        </p:txBody>
+      </p:sp>
+    </p:spTree>
+    <p:extLst>
+      <p:ext uri="{BB962C8B-B14F-4D97-AF65-F5344CB8AC3E}">
+        <p14:creationId xmlns:p14="http://schemas.microsoft.com/office/powerpoint/2010/main" val="1310144445"/>
+      </p:ext>
+    </p:extLst>
+  </p:cSld>
+  <p:clrMapOvr>
+    <a:masterClrMapping/>
+  </p:clrMapOvr>
+  <p:transition spd="slow">
+    <p:push dir="d"/>
+  </p:transition>
+</p:sld>
+</file>
+
+<file path=ppt/slides/slide6.xml><?xml version="1.0" encoding="utf-8"?>
+<p:sld xmlns:a="http://schemas.openxmlformats.org/drawingml/2006/main" xmlns:r="http://schemas.openxmlformats.org/officeDocument/2006/relationships" xmlns:p="http://schemas.openxmlformats.org/presentationml/2006/main">
+  <p:cSld>
+    <p:spTree>
+      <p:nvGrpSpPr>
+        <p:cNvPr id="1" name=""/>
+        <p:cNvGrpSpPr/>
+        <p:nvPr/>
+      </p:nvGrpSpPr>
+      <p:grpSpPr>
+        <a:xfrm>
+          <a:off x="0" y="0"/>
+          <a:ext cx="0" cy="0"/>
+          <a:chOff x="0" y="0"/>
+          <a:chExt cx="0" cy="0"/>
+        </a:xfrm>
+      </p:grpSpPr>
+      <p:sp>
+        <p:nvSpPr>
+          <p:cNvPr id="4" name="Rectangle 3">
+            <a:extLst>
+              <a:ext uri="{FF2B5EF4-FFF2-40B4-BE49-F238E27FC236}">
+                <a16:creationId xmlns:a16="http://schemas.microsoft.com/office/drawing/2014/main" id="{2F81B1B0-61EE-654F-A9DA-36E186FA968C}"/>
+              </a:ext>
+            </a:extLst>
+          </p:cNvPr>
+          <p:cNvSpPr/>
+          <p:nvPr/>
+        </p:nvSpPr>
+        <p:spPr>
+          <a:xfrm>
+            <a:off x="0" y="0"/>
+            <a:ext cx="12192000" cy="6858000"/>
+          </a:xfrm>
+          <a:prstGeom prst="rect">
+            <a:avLst/>
+          </a:prstGeom>
+          <a:solidFill>
+            <a:srgbClr val="FF6B6B"/>
+          </a:solidFill>
+        </p:spPr>
+        <p:style>
+          <a:lnRef idx="2">
+            <a:schemeClr val="accent1">
+              <a:shade val="50000"/>
+            </a:schemeClr>
+          </a:lnRef>
+          <a:fillRef idx="1">
+            <a:schemeClr val="accent1"/>
+          </a:fillRef>
+          <a:effectRef idx="0">
+            <a:schemeClr val="accent1"/>
+          </a:effectRef>
+          <a:fontRef idx="minor">
+            <a:schemeClr val="lt1"/>
+          </a:fontRef>
+        </p:style>
+        <p:txBody>
+          <a:bodyPr rtlCol="0" anchor="ctr"/>
+          <a:lstStyle/>
+          <a:p>
+            <a:pPr algn="ctr"/>
+            <a:endParaRPr lang="en-US"/>
+          </a:p>
+        </p:txBody>
+      </p:sp>
+      <p:cxnSp>
+        <p:nvCxnSpPr>
+          <p:cNvPr id="9" name="Straight Connector 8">
+            <a:extLst>
+              <a:ext uri="{FF2B5EF4-FFF2-40B4-BE49-F238E27FC236}">
+                <a16:creationId xmlns:a16="http://schemas.microsoft.com/office/drawing/2014/main" id="{D299F333-05D8-E14D-84FA-B416D488CEC9}"/>
+              </a:ext>
+            </a:extLst>
+          </p:cNvPr>
+          <p:cNvCxnSpPr/>
+          <p:nvPr/>
+        </p:nvCxnSpPr>
+        <p:spPr>
+          <a:xfrm>
+            <a:off x="829340" y="1254639"/>
+            <a:ext cx="10526232" cy="0"/>
+          </a:xfrm>
+          <a:prstGeom prst="line">
+            <a:avLst/>
+          </a:prstGeom>
+          <a:ln w="25400">
+            <a:solidFill>
+              <a:srgbClr val="5E2828"/>
+            </a:solidFill>
+          </a:ln>
+        </p:spPr>
+        <p:style>
+          <a:lnRef idx="1">
+            <a:schemeClr val="accent1"/>
+          </a:lnRef>
+          <a:fillRef idx="0">
+            <a:schemeClr val="accent1"/>
+          </a:fillRef>
+          <a:effectRef idx="0">
+            <a:schemeClr val="accent1"/>
+          </a:effectRef>
+          <a:fontRef idx="minor">
+            <a:schemeClr val="tx1"/>
+          </a:fontRef>
+        </p:style>
+      </p:cxnSp>
+      <p:sp>
+        <p:nvSpPr>
+          <p:cNvPr id="2" name="Title 1">
+            <a:extLst>
+              <a:ext uri="{FF2B5EF4-FFF2-40B4-BE49-F238E27FC236}">
+                <a16:creationId xmlns:a16="http://schemas.microsoft.com/office/drawing/2014/main" id="{ED95F1F0-9F8F-8C4B-A474-3896F352A498}"/>
+              </a:ext>
+            </a:extLst>
+          </p:cNvPr>
+          <p:cNvSpPr>
+            <a:spLocks noGrp="1"/>
+          </p:cNvSpPr>
+          <p:nvPr>
+            <p:ph type="title"/>
+          </p:nvPr>
+        </p:nvSpPr>
+        <p:spPr/>
+        <p:txBody>
+          <a:bodyPr>
+            <a:normAutofit/>
+          </a:bodyPr>
+          <a:lstStyle/>
+          <a:p>
+            <a:r>
+              <a:rPr lang="en-US" dirty="0">
+                <a:solidFill>
+                  <a:schemeClr val="bg1"/>
+                </a:solidFill>
+                <a:latin typeface="Arial Rounded MT Bold" panose="020F0704030504030204" pitchFamily="34" charset="77"/>
+                <a:ea typeface="STHupo" panose="02010800040101010101" pitchFamily="2" charset="-122"/>
+                <a:cs typeface="Aharoni" panose="02010803020104030203" pitchFamily="2" charset="-79"/>
+              </a:rPr>
+              <a:t>Agile Kita Management</a:t>
+            </a:r>
+            <a:endParaRPr lang="en-US" dirty="0">
+              <a:solidFill>
+                <a:schemeClr val="bg1"/>
+              </a:solidFill>
+            </a:endParaRPr>
+          </a:p>
+        </p:txBody>
+      </p:sp>
+      <p:sp>
+        <p:nvSpPr>
+          <p:cNvPr id="11" name="Pie 10">
+            <a:extLst>
+              <a:ext uri="{FF2B5EF4-FFF2-40B4-BE49-F238E27FC236}">
+                <a16:creationId xmlns:a16="http://schemas.microsoft.com/office/drawing/2014/main" id="{3E161D77-5B93-F74A-BDA5-5F4585115C9A}"/>
+              </a:ext>
+            </a:extLst>
+          </p:cNvPr>
+          <p:cNvSpPr/>
+          <p:nvPr/>
+        </p:nvSpPr>
+        <p:spPr>
+          <a:xfrm>
+            <a:off x="9570697" y="4226064"/>
+            <a:ext cx="5263871" cy="5263871"/>
+          </a:xfrm>
+          <a:prstGeom prst="pie">
+            <a:avLst>
+              <a:gd name="adj1" fmla="val 10781590"/>
+              <a:gd name="adj2" fmla="val 16200000"/>
+            </a:avLst>
+          </a:prstGeom>
+          <a:solidFill>
+            <a:schemeClr val="bg1"/>
+          </a:solidFill>
+          <a:ln>
+            <a:noFill/>
+          </a:ln>
+        </p:spPr>
+        <p:style>
+          <a:lnRef idx="2">
+            <a:schemeClr val="accent1">
+              <a:shade val="50000"/>
+            </a:schemeClr>
+          </a:lnRef>
+          <a:fillRef idx="1">
+            <a:schemeClr val="accent1"/>
+          </a:fillRef>
+          <a:effectRef idx="0">
+            <a:schemeClr val="accent1"/>
+          </a:effectRef>
+          <a:fontRef idx="minor">
+            <a:schemeClr val="lt1"/>
+          </a:fontRef>
+        </p:style>
+        <p:txBody>
+          <a:bodyPr rtlCol="0" anchor="ctr"/>
+          <a:lstStyle/>
+          <a:p>
+            <a:pPr algn="ctr"/>
+            <a:endParaRPr lang="en-US" dirty="0">
+              <a:solidFill>
+                <a:schemeClr val="tx1"/>
+              </a:solidFill>
+            </a:endParaRPr>
+          </a:p>
+        </p:txBody>
+      </p:sp>
+      <p:sp>
+        <p:nvSpPr>
+          <p:cNvPr id="12" name="Slide Number Placeholder 6">
+            <a:extLst>
+              <a:ext uri="{FF2B5EF4-FFF2-40B4-BE49-F238E27FC236}">
+                <a16:creationId xmlns:a16="http://schemas.microsoft.com/office/drawing/2014/main" id="{097EA611-622B-6744-B3D1-6172162CEB02}"/>
+              </a:ext>
+            </a:extLst>
+          </p:cNvPr>
+          <p:cNvSpPr>
+            <a:spLocks noGrp="1"/>
+          </p:cNvSpPr>
+          <p:nvPr>
+            <p:ph type="sldNum" sz="quarter" idx="12"/>
+          </p:nvPr>
+        </p:nvSpPr>
+        <p:spPr>
+          <a:xfrm>
+            <a:off x="9001478" y="3667478"/>
+            <a:ext cx="2949517" cy="3190522"/>
+          </a:xfrm>
+        </p:spPr>
+        <p:txBody>
+          <a:bodyPr anchor="b"/>
+          <a:lstStyle/>
+          <a:p>
+            <a:r>
+              <a:rPr lang="en-US" sz="9600" dirty="0">
+                <a:solidFill>
+                  <a:srgbClr val="5E2828"/>
+                </a:solidFill>
+                <a:latin typeface="Arial Rounded MT Bold" panose="020F0704030504030204" pitchFamily="34" charset="77"/>
+                <a:ea typeface="STHupo" panose="02010800040101010101" pitchFamily="2" charset="-122"/>
+                <a:cs typeface="Aharoni" panose="02010803020104030203" pitchFamily="2" charset="-79"/>
+              </a:rPr>
+              <a:t>2</a:t>
+            </a:r>
+          </a:p>
+        </p:txBody>
+      </p:sp>
       <p:graphicFrame>
         <p:nvGraphicFramePr>
           <p:cNvPr id="13" name="Table 12">
@@ -5983,7 +6894,7 @@
           <p:nvPr>
             <p:extLst>
               <p:ext uri="{D42A27DB-BD31-4B8C-83A1-F6EECF244321}">
-                <p14:modId xmlns:p14="http://schemas.microsoft.com/office/powerpoint/2010/main" val="369159540"/>
+                <p14:modId xmlns:p14="http://schemas.microsoft.com/office/powerpoint/2010/main" val="2707484563"/>
               </p:ext>
             </p:extLst>
           </p:nvPr>
@@ -6142,18 +7053,7 @@
                           <a:ea typeface="STHupo" panose="02010800040101010101" pitchFamily="2" charset="-122"/>
                           <a:cs typeface="Aharoni" panose="02010803020104030203" pitchFamily="2" charset="-79"/>
                         </a:rPr>
-                        <a:t>in the Swiss </a:t>
-                      </a:r>
-                      <a:r>
-                        <a:rPr lang="en-US" sz="2800" dirty="0" err="1">
-                          <a:solidFill>
-                            <a:srgbClr val="5E2828"/>
-                          </a:solidFill>
-                          <a:latin typeface="Arial Rounded MT Bold" panose="020F0704030504030204" pitchFamily="34" charset="77"/>
-                          <a:ea typeface="STHupo" panose="02010800040101010101" pitchFamily="2" charset="-122"/>
-                          <a:cs typeface="Aharoni" panose="02010803020104030203" pitchFamily="2" charset="-79"/>
-                        </a:rPr>
-                        <a:t>Kitamarket</a:t>
+                        <a:t>in the Swiss Kita market</a:t>
                       </a:r>
                       <a:r>
                         <a:rPr lang="en-US" sz="2800" dirty="0">
@@ -6350,7 +7250,7 @@
 </p:sld>
 </file>
 
-<file path=ppt/slides/slide6.xml><?xml version="1.0" encoding="utf-8"?>
+<file path=ppt/slides/slide7.xml><?xml version="1.0" encoding="utf-8"?>
 <p:sld xmlns:a="http://schemas.openxmlformats.org/drawingml/2006/main" xmlns:r="http://schemas.openxmlformats.org/officeDocument/2006/relationships" xmlns:p="http://schemas.openxmlformats.org/presentationml/2006/main">
   <p:cSld>
     <p:spTree>
@@ -6381,7 +7281,7 @@
         </p:nvSpPr>
         <p:spPr>
           <a:xfrm>
-            <a:off x="0" y="0"/>
+            <a:off x="0" y="14748"/>
             <a:ext cx="12192000" cy="6858000"/>
           </a:xfrm>
           <a:prstGeom prst="rect">
@@ -6621,7 +7521,7 @@
                 </a:solidFill>
                 <a:latin typeface="Arial Rounded MT Bold" panose="020F0704030504030204" pitchFamily="34" charset="77"/>
               </a:rPr>
-              <a:t> We work in accordance to the principles we embrace, thus validating and verifying our approach throughout our own actions, everyday</a:t>
+              <a:t> We work in accordance to the principles we embrace, thus validating and verifying our approach throughout our own actions</a:t>
             </a:r>
             <a:r>
               <a:rPr lang="en-US" dirty="0">
@@ -6797,7 +7697,7 @@
 </p:sld>
 </file>
 
-<file path=ppt/slides/slide7.xml><?xml version="1.0" encoding="utf-8"?>
+<file path=ppt/slides/slide8.xml><?xml version="1.0" encoding="utf-8"?>
 <p:sld xmlns:a="http://schemas.openxmlformats.org/drawingml/2006/main" xmlns:r="http://schemas.openxmlformats.org/officeDocument/2006/relationships" xmlns:p="http://schemas.openxmlformats.org/presentationml/2006/main">
   <p:cSld>
     <p:spTree>
@@ -6828,7 +7728,7 @@
         </p:nvSpPr>
         <p:spPr>
           <a:xfrm>
-            <a:off x="-3544" y="-1"/>
+            <a:off x="-3544" y="7373"/>
             <a:ext cx="12192000" cy="6858000"/>
           </a:xfrm>
           <a:prstGeom prst="rect">
@@ -6859,7 +7759,7 @@
           <a:lstStyle/>
           <a:p>
             <a:pPr algn="ctr"/>
-            <a:endParaRPr lang="en-US"/>
+            <a:endParaRPr lang="en-US" dirty="0"/>
           </a:p>
         </p:txBody>
       </p:sp>
@@ -7433,6 +8333,134 @@
               <a:t>Team Members</a:t>
             </a:r>
           </a:p>
+          <a:p>
+            <a:pPr>
+              <a:buClr>
+                <a:schemeClr val="bg1"/>
+              </a:buClr>
+            </a:pPr>
+            <a:r>
+              <a:rPr lang="en-US" dirty="0">
+                <a:solidFill>
+                  <a:srgbClr val="5E2828"/>
+                </a:solidFill>
+                <a:latin typeface="Arial Rounded MT Bold" panose="020F0704030504030204" pitchFamily="34" charset="77"/>
+              </a:rPr>
+              <a:t>…</a:t>
+            </a:r>
+          </a:p>
+        </p:txBody>
+      </p:sp>
+      <p:sp>
+        <p:nvSpPr>
+          <p:cNvPr id="5" name="TextBox 4">
+            <a:extLst>
+              <a:ext uri="{FF2B5EF4-FFF2-40B4-BE49-F238E27FC236}">
+                <a16:creationId xmlns:a16="http://schemas.microsoft.com/office/drawing/2014/main" id="{BE311484-493E-E34B-A1FD-A121F0668938}"/>
+              </a:ext>
+            </a:extLst>
+          </p:cNvPr>
+          <p:cNvSpPr txBox="1"/>
+          <p:nvPr/>
+        </p:nvSpPr>
+        <p:spPr>
+          <a:xfrm>
+            <a:off x="935421" y="4771697"/>
+            <a:ext cx="8635276" cy="1815882"/>
+          </a:xfrm>
+          <a:prstGeom prst="rect">
+            <a:avLst/>
+          </a:prstGeom>
+          <a:noFill/>
+        </p:spPr>
+        <p:txBody>
+          <a:bodyPr wrap="square" rtlCol="0">
+            <a:spAutoFit/>
+          </a:bodyPr>
+          <a:lstStyle/>
+          <a:p>
+            <a:pPr>
+              <a:buClr>
+                <a:schemeClr val="bg1"/>
+              </a:buClr>
+            </a:pPr>
+            <a:r>
+              <a:rPr lang="en-US" sz="2800" dirty="0">
+                <a:solidFill>
+                  <a:schemeClr val="bg1"/>
+                </a:solidFill>
+                <a:latin typeface="Arial Rounded MT Bold" panose="020F0704030504030204" pitchFamily="34" charset="77"/>
+              </a:rPr>
+              <a:t>Focus</a:t>
+            </a:r>
+            <a:endParaRPr lang="en-US" dirty="0">
+              <a:solidFill>
+                <a:schemeClr val="bg1"/>
+              </a:solidFill>
+              <a:latin typeface="Arial Rounded MT Bold" panose="020F0704030504030204" pitchFamily="34" charset="77"/>
+            </a:endParaRPr>
+          </a:p>
+          <a:p>
+            <a:pPr>
+              <a:buClr>
+                <a:schemeClr val="bg1"/>
+              </a:buClr>
+            </a:pPr>
+            <a:r>
+              <a:rPr lang="en-US" sz="2800" dirty="0">
+                <a:solidFill>
+                  <a:srgbClr val="5E2828"/>
+                </a:solidFill>
+                <a:latin typeface="Arial Rounded MT Bold" panose="020F0704030504030204" pitchFamily="34" charset="77"/>
+              </a:rPr>
+              <a:t>We introduce </a:t>
+            </a:r>
+            <a:r>
+              <a:rPr lang="en-US" sz="2800" dirty="0">
+                <a:solidFill>
+                  <a:schemeClr val="bg1"/>
+                </a:solidFill>
+                <a:latin typeface="Arial Rounded MT Bold" panose="020F0704030504030204" pitchFamily="34" charset="77"/>
+              </a:rPr>
+              <a:t>a strategic initiative </a:t>
+            </a:r>
+            <a:r>
+              <a:rPr lang="en-US" sz="2800" dirty="0">
+                <a:solidFill>
+                  <a:srgbClr val="5E2828"/>
+                </a:solidFill>
+                <a:latin typeface="Arial Rounded MT Bold" panose="020F0704030504030204" pitchFamily="34" charset="77"/>
+              </a:rPr>
+              <a:t>but in our analysis we focus on </a:t>
+            </a:r>
+            <a:r>
+              <a:rPr lang="en-US" sz="2800" dirty="0">
+                <a:solidFill>
+                  <a:schemeClr val="bg1"/>
+                </a:solidFill>
+                <a:latin typeface="Arial Rounded MT Bold" panose="020F0704030504030204" pitchFamily="34" charset="77"/>
+              </a:rPr>
+              <a:t>business process management </a:t>
+            </a:r>
+            <a:r>
+              <a:rPr lang="en-US" sz="2800" dirty="0">
+                <a:solidFill>
+                  <a:srgbClr val="5E2828"/>
+                </a:solidFill>
+                <a:latin typeface="Arial Rounded MT Bold" panose="020F0704030504030204" pitchFamily="34" charset="77"/>
+              </a:rPr>
+              <a:t>and </a:t>
+            </a:r>
+            <a:r>
+              <a:rPr lang="en-US" sz="2800" dirty="0">
+                <a:solidFill>
+                  <a:schemeClr val="bg1"/>
+                </a:solidFill>
+                <a:latin typeface="Arial Rounded MT Bold" panose="020F0704030504030204" pitchFamily="34" charset="77"/>
+              </a:rPr>
+              <a:t>operational decision making.</a:t>
+            </a:r>
+          </a:p>
         </p:txBody>
       </p:sp>
     </p:spTree>
@@ -7451,7 +8479,7 @@
 </p:sld>
 </file>
 
-<file path=ppt/slides/slide8.xml><?xml version="1.0" encoding="utf-8"?>
+<file path=ppt/slides/slide9.xml><?xml version="1.0" encoding="utf-8"?>
 <p:sld xmlns:a="http://schemas.openxmlformats.org/drawingml/2006/main" xmlns:r="http://schemas.openxmlformats.org/officeDocument/2006/relationships" xmlns:p="http://schemas.openxmlformats.org/presentationml/2006/main">
   <p:cSld>
     <p:spTree>
@@ -7536,7 +8564,7 @@
         <p:spPr/>
         <p:txBody>
           <a:bodyPr>
-            <a:normAutofit fontScale="92500" lnSpcReduction="10000"/>
+            <a:normAutofit fontScale="77500" lnSpcReduction="20000"/>
           </a:bodyPr>
           <a:lstStyle/>
           <a:p>
@@ -7639,7 +8667,7 @@
                 <a:ea typeface="STHupo" panose="02010800040101010101" pitchFamily="2" charset="-122"/>
                 <a:cs typeface="Aharoni" panose="02010803020104030203" pitchFamily="2" charset="-79"/>
               </a:rPr>
-              <a:t>			</a:t>
+              <a:t>    24</a:t>
             </a:r>
             <a:r>
               <a:rPr lang="en-US" sz="2400" dirty="0">
@@ -7650,7 +8678,7 @@
                 <a:ea typeface="STHupo" panose="02010800040101010101" pitchFamily="2" charset="-122"/>
                 <a:cs typeface="Aharoni" panose="02010803020104030203" pitchFamily="2" charset="-79"/>
               </a:rPr>
-              <a:t>Meetings (</a:t>
+              <a:t>.</a:t>
             </a:r>
             <a:r>
               <a:rPr lang="en-US" sz="2400" dirty="0">
@@ -7661,7 +8689,29 @@
                 <a:ea typeface="STHupo" panose="02010800040101010101" pitchFamily="2" charset="-122"/>
                 <a:cs typeface="Aharoni" panose="02010803020104030203" pitchFamily="2" charset="-79"/>
               </a:rPr>
-              <a:t>Initial Organization</a:t>
+              <a:t>10			</a:t>
+            </a:r>
+            <a:r>
+              <a:rPr lang="en-US" sz="2400" dirty="0">
+                <a:solidFill>
+                  <a:schemeClr val="bg1"/>
+                </a:solidFill>
+                <a:latin typeface="Arial Rounded MT Bold" panose="020F0704030504030204" pitchFamily="34" charset="77"/>
+                <a:ea typeface="STHupo" panose="02010800040101010101" pitchFamily="2" charset="-122"/>
+                <a:cs typeface="Aharoni" panose="02010803020104030203" pitchFamily="2" charset="-79"/>
+              </a:rPr>
+              <a:t>Stakeholder Meetings (</a:t>
+            </a:r>
+            <a:r>
+              <a:rPr lang="en-US" sz="2400" dirty="0">
+                <a:solidFill>
+                  <a:srgbClr val="5E2828"/>
+                </a:solidFill>
+                <a:latin typeface="Arial Rounded MT Bold" panose="020F0704030504030204" pitchFamily="34" charset="77"/>
+                <a:ea typeface="STHupo" panose="02010800040101010101" pitchFamily="2" charset="-122"/>
+                <a:cs typeface="Aharoni" panose="02010803020104030203" pitchFamily="2" charset="-79"/>
+              </a:rPr>
+              <a:t>Organization</a:t>
             </a:r>
             <a:r>
               <a:rPr lang="en-US" sz="2400" dirty="0">
@@ -7691,7 +8741,7 @@
                 <a:ea typeface="STHupo" panose="02010800040101010101" pitchFamily="2" charset="-122"/>
                 <a:cs typeface="Aharoni" panose="02010803020104030203" pitchFamily="2" charset="-79"/>
               </a:rPr>
-              <a:t> 			➜ </a:t>
+              <a:t>			</a:t>
             </a:r>
             <a:r>
               <a:rPr lang="en-US" sz="2400" dirty="0">
@@ -7702,7 +8752,7 @@
                 <a:ea typeface="STHupo" panose="02010800040101010101" pitchFamily="2" charset="-122"/>
                 <a:cs typeface="Aharoni" panose="02010803020104030203" pitchFamily="2" charset="-79"/>
               </a:rPr>
-              <a:t>Approach</a:t>
+              <a:t>Analysis (</a:t>
             </a:r>
             <a:r>
               <a:rPr lang="en-US" sz="2400" dirty="0">
@@ -7713,7 +8763,7 @@
                 <a:ea typeface="STHupo" panose="02010800040101010101" pitchFamily="2" charset="-122"/>
                 <a:cs typeface="Aharoni" panose="02010803020104030203" pitchFamily="2" charset="-79"/>
               </a:rPr>
-              <a:t> +</a:t>
+              <a:t>Requirements Gathering</a:t>
             </a:r>
             <a:r>
               <a:rPr lang="en-US" sz="2400" dirty="0">
@@ -7724,7 +8774,81 @@
                 <a:ea typeface="STHupo" panose="02010800040101010101" pitchFamily="2" charset="-122"/>
                 <a:cs typeface="Aharoni" panose="02010803020104030203" pitchFamily="2" charset="-79"/>
               </a:rPr>
+              <a:t>)</a:t>
+            </a:r>
+          </a:p>
+          <a:p>
+            <a:pPr marL="0" indent="0">
+              <a:buClr>
+                <a:srgbClr val="5E2828"/>
+              </a:buClr>
+              <a:buNone/>
+            </a:pPr>
+            <a:r>
+              <a:rPr lang="en-US" sz="2400" dirty="0">
+                <a:solidFill>
+                  <a:srgbClr val="5E2828"/>
+                </a:solidFill>
+                <a:latin typeface="Arial Rounded MT Bold" panose="020F0704030504030204" pitchFamily="34" charset="77"/>
+                <a:ea typeface="STHupo" panose="02010800040101010101" pitchFamily="2" charset="-122"/>
+                <a:cs typeface="Aharoni" panose="02010803020104030203" pitchFamily="2" charset="-79"/>
+              </a:rPr>
+              <a:t> 			➜ </a:t>
+            </a:r>
+            <a:r>
+              <a:rPr lang="en-US" sz="2400" dirty="0">
+                <a:solidFill>
+                  <a:schemeClr val="bg1"/>
+                </a:solidFill>
+                <a:latin typeface="Arial Rounded MT Bold" panose="020F0704030504030204" pitchFamily="34" charset="77"/>
+                <a:ea typeface="STHupo" panose="02010800040101010101" pitchFamily="2" charset="-122"/>
+                <a:cs typeface="Aharoni" panose="02010803020104030203" pitchFamily="2" charset="-79"/>
+              </a:rPr>
+              <a:t>Approach</a:t>
+            </a:r>
+            <a:r>
+              <a:rPr lang="en-US" sz="2400" dirty="0">
+                <a:solidFill>
+                  <a:srgbClr val="5E2828"/>
+                </a:solidFill>
+                <a:latin typeface="Arial Rounded MT Bold" panose="020F0704030504030204" pitchFamily="34" charset="77"/>
+                <a:ea typeface="STHupo" panose="02010800040101010101" pitchFamily="2" charset="-122"/>
+                <a:cs typeface="Aharoni" panose="02010803020104030203" pitchFamily="2" charset="-79"/>
+              </a:rPr>
+              <a:t> +</a:t>
+            </a:r>
+            <a:r>
+              <a:rPr lang="en-US" sz="2400" dirty="0">
+                <a:solidFill>
+                  <a:schemeClr val="bg1"/>
+                </a:solidFill>
+                <a:latin typeface="Arial Rounded MT Bold" panose="020F0704030504030204" pitchFamily="34" charset="77"/>
+                <a:ea typeface="STHupo" panose="02010800040101010101" pitchFamily="2" charset="-122"/>
+                <a:cs typeface="Aharoni" panose="02010803020104030203" pitchFamily="2" charset="-79"/>
+              </a:rPr>
               <a:t> Timetable</a:t>
+            </a:r>
+            <a:r>
+              <a:rPr lang="en-US" sz="2400" dirty="0">
+                <a:solidFill>
+                  <a:srgbClr val="5E2828"/>
+                </a:solidFill>
+                <a:latin typeface="Arial Rounded MT Bold" panose="020F0704030504030204" pitchFamily="34" charset="77"/>
+                <a:ea typeface="STHupo" panose="02010800040101010101" pitchFamily="2" charset="-122"/>
+                <a:cs typeface="Aharoni" panose="02010803020104030203" pitchFamily="2" charset="-79"/>
+              </a:rPr>
+              <a:t> + </a:t>
+            </a:r>
+            <a:r>
+              <a:rPr lang="en-US" sz="2400" dirty="0">
+                <a:solidFill>
+                  <a:schemeClr val="bg1"/>
+                </a:solidFill>
+                <a:latin typeface="Arial Rounded MT Bold" panose="020F0704030504030204" pitchFamily="34" charset="77"/>
+                <a:ea typeface="STHupo" panose="02010800040101010101" pitchFamily="2" charset="-122"/>
+                <a:cs typeface="Aharoni" panose="02010803020104030203" pitchFamily="2" charset="-79"/>
+              </a:rPr>
+              <a:t>Requirements</a:t>
             </a:r>
           </a:p>
           <a:p>
@@ -7813,7 +8937,7 @@
                 <a:ea typeface="STHupo" panose="02010800040101010101" pitchFamily="2" charset="-122"/>
                 <a:cs typeface="Aharoni" panose="02010803020104030203" pitchFamily="2" charset="-79"/>
               </a:rPr>
-              <a:t>Requirements Gathering</a:t>
+              <a:t>Process Definition</a:t>
             </a:r>
             <a:r>
               <a:rPr lang="en-US" sz="2400" dirty="0">
@@ -7843,7 +8967,29 @@
                 <a:ea typeface="STHupo" panose="02010800040101010101" pitchFamily="2" charset="-122"/>
                 <a:cs typeface="Aharoni" panose="02010803020104030203" pitchFamily="2" charset="-79"/>
               </a:rPr>
-              <a:t>			</a:t>
+              <a:t>    20</a:t>
+            </a:r>
+            <a:r>
+              <a:rPr lang="en-US" sz="2400" dirty="0">
+                <a:solidFill>
+                  <a:schemeClr val="bg1"/>
+                </a:solidFill>
+                <a:latin typeface="Arial Rounded MT Bold" panose="020F0704030504030204" pitchFamily="34" charset="77"/>
+                <a:ea typeface="STHupo" panose="02010800040101010101" pitchFamily="2" charset="-122"/>
+                <a:cs typeface="Aharoni" panose="02010803020104030203" pitchFamily="2" charset="-79"/>
+              </a:rPr>
+              <a:t>.</a:t>
+            </a:r>
+            <a:r>
+              <a:rPr lang="en-US" sz="2400" dirty="0">
+                <a:solidFill>
+                  <a:srgbClr val="5E2828"/>
+                </a:solidFill>
+                <a:latin typeface="Arial Rounded MT Bold" panose="020F0704030504030204" pitchFamily="34" charset="77"/>
+                <a:ea typeface="STHupo" panose="02010800040101010101" pitchFamily="2" charset="-122"/>
+                <a:cs typeface="Aharoni" panose="02010803020104030203" pitchFamily="2" charset="-79"/>
+              </a:rPr>
+              <a:t>11			</a:t>
             </a:r>
             <a:r>
               <a:rPr lang="en-US" sz="2400" dirty="0">
@@ -7939,7 +9085,29 @@
                 <a:ea typeface="STHupo" panose="02010800040101010101" pitchFamily="2" charset="-122"/>
                 <a:cs typeface="Aharoni" panose="02010803020104030203" pitchFamily="2" charset="-79"/>
               </a:rPr>
-              <a:t> Sprint Planning</a:t>
+              <a:t> </a:t>
+            </a:r>
+            <a:r>
+              <a:rPr lang="en-US" sz="2400" dirty="0">
+                <a:solidFill>
+                  <a:srgbClr val="5E2828"/>
+                </a:solidFill>
+                <a:latin typeface="Arial Rounded MT Bold" panose="020F0704030504030204" pitchFamily="34" charset="77"/>
+                <a:ea typeface="STHupo" panose="02010800040101010101" pitchFamily="2" charset="-122"/>
+                <a:cs typeface="Aharoni" panose="02010803020104030203" pitchFamily="2" charset="-79"/>
+              </a:rPr>
+              <a:t>#</a:t>
+            </a:r>
+            <a:r>
+              <a:rPr lang="en-US" sz="2400" dirty="0">
+                <a:solidFill>
+                  <a:schemeClr val="bg1"/>
+                </a:solidFill>
+                <a:latin typeface="Arial Rounded MT Bold" panose="020F0704030504030204" pitchFamily="34" charset="77"/>
+                <a:ea typeface="STHupo" panose="02010800040101010101" pitchFamily="2" charset="-122"/>
+                <a:cs typeface="Aharoni" panose="02010803020104030203" pitchFamily="2" charset="-79"/>
+              </a:rPr>
+              <a:t>3 Sprint Planning</a:t>
             </a:r>
           </a:p>
           <a:p>
@@ -8043,6 +9211,138 @@
             </a:r>
           </a:p>
           <a:p>
+            <a:pPr marL="230188" indent="0">
+              <a:buClr>
+                <a:srgbClr val="5E2828"/>
+              </a:buClr>
+              <a:buNone/>
+              <a:tabLst>
+                <a:tab pos="263525" algn="l"/>
+              </a:tabLst>
+            </a:pPr>
+            <a:r>
+              <a:rPr lang="en-US" sz="2400" dirty="0">
+                <a:solidFill>
+                  <a:schemeClr val="bg1"/>
+                </a:solidFill>
+                <a:latin typeface="Arial Rounded MT Bold" panose="020F0704030504030204" pitchFamily="34" charset="77"/>
+                <a:ea typeface="STHupo" panose="02010800040101010101" pitchFamily="2" charset="-122"/>
+                <a:cs typeface="Aharoni" panose="02010803020104030203" pitchFamily="2" charset="-79"/>
+              </a:rPr>
+              <a:t>	</a:t>
+            </a:r>
+            <a:r>
+              <a:rPr lang="en-US" sz="2500" dirty="0">
+                <a:solidFill>
+                  <a:srgbClr val="5E2828"/>
+                </a:solidFill>
+                <a:latin typeface="Arial Rounded MT Bold" panose="020F0704030504030204" pitchFamily="34" charset="77"/>
+                <a:ea typeface="STHupo" panose="02010800040101010101" pitchFamily="2" charset="-122"/>
+                <a:cs typeface="Aharoni" panose="02010803020104030203" pitchFamily="2" charset="-79"/>
+              </a:rPr>
+              <a:t>19</a:t>
+            </a:r>
+            <a:r>
+              <a:rPr lang="en-US" sz="2500" dirty="0">
+                <a:solidFill>
+                  <a:schemeClr val="bg1"/>
+                </a:solidFill>
+                <a:latin typeface="Arial Rounded MT Bold" panose="020F0704030504030204" pitchFamily="34" charset="77"/>
+                <a:ea typeface="STHupo" panose="02010800040101010101" pitchFamily="2" charset="-122"/>
+                <a:cs typeface="Aharoni" panose="02010803020104030203" pitchFamily="2" charset="-79"/>
+              </a:rPr>
+              <a:t>.</a:t>
+            </a:r>
+            <a:r>
+              <a:rPr lang="en-US" sz="2500" dirty="0">
+                <a:solidFill>
+                  <a:srgbClr val="5E2828"/>
+                </a:solidFill>
+                <a:latin typeface="Arial Rounded MT Bold" panose="020F0704030504030204" pitchFamily="34" charset="77"/>
+                <a:ea typeface="STHupo" panose="02010800040101010101" pitchFamily="2" charset="-122"/>
+                <a:cs typeface="Aharoni" panose="02010803020104030203" pitchFamily="2" charset="-79"/>
+              </a:rPr>
+              <a:t>12	</a:t>
+            </a:r>
+            <a:r>
+              <a:rPr lang="en-US" sz="2400" dirty="0">
+                <a:solidFill>
+                  <a:schemeClr val="bg1"/>
+                </a:solidFill>
+                <a:latin typeface="Arial Rounded MT Bold" panose="020F0704030504030204" pitchFamily="34" charset="77"/>
+                <a:ea typeface="STHupo" panose="02010800040101010101" pitchFamily="2" charset="-122"/>
+                <a:cs typeface="Aharoni" panose="02010803020104030203" pitchFamily="2" charset="-79"/>
+              </a:rPr>
+              <a:t>		Stakeholder Meetings (</a:t>
+            </a:r>
+            <a:r>
+              <a:rPr lang="en-US" sz="2400" dirty="0">
+                <a:solidFill>
+                  <a:srgbClr val="5E2828"/>
+                </a:solidFill>
+                <a:latin typeface="Arial Rounded MT Bold" panose="020F0704030504030204" pitchFamily="34" charset="77"/>
+                <a:ea typeface="STHupo" panose="02010800040101010101" pitchFamily="2" charset="-122"/>
+                <a:cs typeface="Aharoni" panose="02010803020104030203" pitchFamily="2" charset="-79"/>
+              </a:rPr>
+              <a:t>Organization</a:t>
+            </a:r>
+            <a:r>
+              <a:rPr lang="en-US" sz="2400" dirty="0">
+                <a:solidFill>
+                  <a:schemeClr val="bg1"/>
+                </a:solidFill>
+                <a:latin typeface="Arial Rounded MT Bold" panose="020F0704030504030204" pitchFamily="34" charset="77"/>
+                <a:ea typeface="STHupo" panose="02010800040101010101" pitchFamily="2" charset="-122"/>
+                <a:cs typeface="Aharoni" panose="02010803020104030203" pitchFamily="2" charset="-79"/>
+              </a:rPr>
+              <a:t>)</a:t>
+            </a:r>
+          </a:p>
+          <a:p>
+            <a:pPr marL="230188" indent="0">
+              <a:buClr>
+                <a:srgbClr val="5E2828"/>
+              </a:buClr>
+              <a:buNone/>
+              <a:tabLst>
+                <a:tab pos="263525" algn="l"/>
+              </a:tabLst>
+            </a:pPr>
+            <a:r>
+              <a:rPr lang="en-US" sz="2400" dirty="0">
+                <a:solidFill>
+                  <a:schemeClr val="bg1"/>
+                </a:solidFill>
+                <a:latin typeface="Arial Rounded MT Bold" panose="020F0704030504030204" pitchFamily="34" charset="77"/>
+                <a:ea typeface="STHupo" panose="02010800040101010101" pitchFamily="2" charset="-122"/>
+                <a:cs typeface="Aharoni" panose="02010803020104030203" pitchFamily="2" charset="-79"/>
+              </a:rPr>
+              <a:t>				MVP (</a:t>
+            </a:r>
+            <a:r>
+              <a:rPr lang="en-US" sz="2400" dirty="0">
+                <a:solidFill>
+                  <a:srgbClr val="5E2828"/>
+                </a:solidFill>
+                <a:latin typeface="Arial Rounded MT Bold" panose="020F0704030504030204" pitchFamily="34" charset="77"/>
+                <a:ea typeface="STHupo" panose="02010800040101010101" pitchFamily="2" charset="-122"/>
+                <a:cs typeface="Aharoni" panose="02010803020104030203" pitchFamily="2" charset="-79"/>
+              </a:rPr>
+              <a:t>Evaluation</a:t>
+            </a:r>
+            <a:r>
+              <a:rPr lang="en-US" sz="2400" dirty="0">
+                <a:solidFill>
+                  <a:schemeClr val="bg1"/>
+                </a:solidFill>
+                <a:latin typeface="Arial Rounded MT Bold" panose="020F0704030504030204" pitchFamily="34" charset="77"/>
+                <a:ea typeface="STHupo" panose="02010800040101010101" pitchFamily="2" charset="-122"/>
+                <a:cs typeface="Aharoni" panose="02010803020104030203" pitchFamily="2" charset="-79"/>
+              </a:rPr>
+              <a:t>)</a:t>
+            </a:r>
+          </a:p>
+          <a:p>
             <a:pPr marL="0" indent="0">
               <a:buClr>
                 <a:srgbClr val="5E2828"/>
@@ -8058,7 +9358,7 @@
                 <a:ea typeface="STHupo" panose="02010800040101010101" pitchFamily="2" charset="-122"/>
                 <a:cs typeface="Aharoni" panose="02010803020104030203" pitchFamily="2" charset="-79"/>
               </a:rPr>
-              <a:t>			</a:t>
+              <a:t>			 ➜ </a:t>
             </a:r>
             <a:r>
               <a:rPr lang="en-US" sz="2400" dirty="0">
@@ -8069,58 +9369,6 @@
                 <a:ea typeface="STHupo" panose="02010800040101010101" pitchFamily="2" charset="-122"/>
                 <a:cs typeface="Aharoni" panose="02010803020104030203" pitchFamily="2" charset="-79"/>
               </a:rPr>
-              <a:t>MVP (</a:t>
-            </a:r>
-            <a:r>
-              <a:rPr lang="en-US" sz="2400" dirty="0">
-                <a:solidFill>
-                  <a:srgbClr val="5E2828"/>
-                </a:solidFill>
-                <a:latin typeface="Arial Rounded MT Bold" panose="020F0704030504030204" pitchFamily="34" charset="77"/>
-                <a:ea typeface="STHupo" panose="02010800040101010101" pitchFamily="2" charset="-122"/>
-                <a:cs typeface="Aharoni" panose="02010803020104030203" pitchFamily="2" charset="-79"/>
-              </a:rPr>
-              <a:t>Evaluation</a:t>
-            </a:r>
-            <a:r>
-              <a:rPr lang="en-US" sz="2400" dirty="0">
-                <a:solidFill>
-                  <a:schemeClr val="bg1"/>
-                </a:solidFill>
-                <a:latin typeface="Arial Rounded MT Bold" panose="020F0704030504030204" pitchFamily="34" charset="77"/>
-                <a:ea typeface="STHupo" panose="02010800040101010101" pitchFamily="2" charset="-122"/>
-                <a:cs typeface="Aharoni" panose="02010803020104030203" pitchFamily="2" charset="-79"/>
-              </a:rPr>
-              <a:t>)</a:t>
-            </a:r>
-          </a:p>
-          <a:p>
-            <a:pPr marL="0" indent="0">
-              <a:buClr>
-                <a:srgbClr val="5E2828"/>
-              </a:buClr>
-              <a:buNone/>
-            </a:pPr>
-            <a:r>
-              <a:rPr lang="en-US" sz="2400" dirty="0">
-                <a:solidFill>
-                  <a:srgbClr val="5E2828"/>
-                </a:solidFill>
-                <a:latin typeface="Arial Rounded MT Bold" panose="020F0704030504030204" pitchFamily="34" charset="77"/>
-                <a:ea typeface="STHupo" panose="02010800040101010101" pitchFamily="2" charset="-122"/>
-                <a:cs typeface="Aharoni" panose="02010803020104030203" pitchFamily="2" charset="-79"/>
-              </a:rPr>
-              <a:t>			 ➜ </a:t>
-            </a:r>
-            <a:r>
-              <a:rPr lang="en-US" sz="2400" dirty="0">
-                <a:solidFill>
-                  <a:schemeClr val="bg1"/>
-                </a:solidFill>
-                <a:latin typeface="Arial Rounded MT Bold" panose="020F0704030504030204" pitchFamily="34" charset="77"/>
-                <a:ea typeface="STHupo" panose="02010800040101010101" pitchFamily="2" charset="-122"/>
-                <a:cs typeface="Aharoni" panose="02010803020104030203" pitchFamily="2" charset="-79"/>
-              </a:rPr>
               <a:t>Pitch</a:t>
             </a:r>
           </a:p>
@@ -8149,7 +9397,7 @@
           <a:p>
             <a:fld id="{E869FCD6-9CD9-BC4A-B46E-5D0910D7B1A4}" type="slidenum">
               <a:rPr lang="en-US" smtClean="0"/>
-              <a:t>8</a:t>
+              <a:t>9</a:t>
             </a:fld>
             <a:endParaRPr lang="en-US"/>
           </a:p>
@@ -8460,200 +9708,6 @@
     <p:extLst>
       <p:ext uri="{BB962C8B-B14F-4D97-AF65-F5344CB8AC3E}">
         <p14:creationId xmlns:p14="http://schemas.microsoft.com/office/powerpoint/2010/main" val="2776289329"/>
-      </p:ext>
-    </p:extLst>
-  </p:cSld>
-  <p:clrMapOvr>
-    <a:masterClrMapping/>
-  </p:clrMapOvr>
-  <p:transition spd="slow">
-    <p:cover dir="d"/>
-  </p:transition>
-</p:sld>
-</file>
-
-<file path=ppt/slides/slide9.xml><?xml version="1.0" encoding="utf-8"?>
-<p:sld xmlns:a="http://schemas.openxmlformats.org/drawingml/2006/main" xmlns:r="http://schemas.openxmlformats.org/officeDocument/2006/relationships" xmlns:p="http://schemas.openxmlformats.org/presentationml/2006/main">
-  <p:cSld>
-    <p:spTree>
-      <p:nvGrpSpPr>
-        <p:cNvPr id="1" name=""/>
-        <p:cNvGrpSpPr/>
-        <p:nvPr/>
-      </p:nvGrpSpPr>
-      <p:grpSpPr>
-        <a:xfrm>
-          <a:off x="0" y="0"/>
-          <a:ext cx="0" cy="0"/>
-          <a:chOff x="0" y="0"/>
-          <a:chExt cx="0" cy="0"/>
-        </a:xfrm>
-      </p:grpSpPr>
-      <p:sp>
-        <p:nvSpPr>
-          <p:cNvPr id="7" name="Rectangle 6">
-            <a:extLst>
-              <a:ext uri="{FF2B5EF4-FFF2-40B4-BE49-F238E27FC236}">
-                <a16:creationId xmlns:a16="http://schemas.microsoft.com/office/drawing/2014/main" id="{B32872A6-286D-C644-8DBC-D6F3A98FE1B5}"/>
-              </a:ext>
-            </a:extLst>
-          </p:cNvPr>
-          <p:cNvSpPr/>
-          <p:nvPr/>
-        </p:nvSpPr>
-        <p:spPr>
-          <a:xfrm>
-            <a:off x="0" y="0"/>
-            <a:ext cx="12192000" cy="6858000"/>
-          </a:xfrm>
-          <a:prstGeom prst="rect">
-            <a:avLst/>
-          </a:prstGeom>
-          <a:solidFill>
-            <a:srgbClr val="FF6B6B"/>
-          </a:solidFill>
-        </p:spPr>
-        <p:style>
-          <a:lnRef idx="2">
-            <a:schemeClr val="accent1">
-              <a:shade val="50000"/>
-            </a:schemeClr>
-          </a:lnRef>
-          <a:fillRef idx="1">
-            <a:schemeClr val="accent1"/>
-          </a:fillRef>
-          <a:effectRef idx="0">
-            <a:schemeClr val="accent1"/>
-          </a:effectRef>
-          <a:fontRef idx="minor">
-            <a:schemeClr val="lt1"/>
-          </a:fontRef>
-        </p:style>
-        <p:txBody>
-          <a:bodyPr rtlCol="0" anchor="ctr"/>
-          <a:lstStyle/>
-          <a:p>
-            <a:pPr algn="ctr"/>
-            <a:endParaRPr lang="en-US"/>
-          </a:p>
-        </p:txBody>
-      </p:sp>
-      <p:sp>
-        <p:nvSpPr>
-          <p:cNvPr id="8" name="Oval 7">
-            <a:extLst>
-              <a:ext uri="{FF2B5EF4-FFF2-40B4-BE49-F238E27FC236}">
-                <a16:creationId xmlns:a16="http://schemas.microsoft.com/office/drawing/2014/main" id="{8D790786-99E4-B24C-848A-435B11B96EBE}"/>
-              </a:ext>
-            </a:extLst>
-          </p:cNvPr>
-          <p:cNvSpPr/>
-          <p:nvPr/>
-        </p:nvSpPr>
-        <p:spPr>
-          <a:xfrm>
-            <a:off x="1907822" y="1546578"/>
-            <a:ext cx="8534400" cy="3849511"/>
-          </a:xfrm>
-          <a:prstGeom prst="ellipse">
-            <a:avLst/>
-          </a:prstGeom>
-          <a:solidFill>
-            <a:schemeClr val="bg1">
-              <a:alpha val="0"/>
-            </a:schemeClr>
-          </a:solidFill>
-          <a:ln>
-            <a:noFill/>
-          </a:ln>
-          <a:effectLst>
-            <a:glow rad="1905000">
-              <a:schemeClr val="bg1">
-                <a:alpha val="16000"/>
-              </a:schemeClr>
-            </a:glow>
-          </a:effectLst>
-        </p:spPr>
-        <p:style>
-          <a:lnRef idx="2">
-            <a:schemeClr val="accent1">
-              <a:shade val="50000"/>
-            </a:schemeClr>
-          </a:lnRef>
-          <a:fillRef idx="1">
-            <a:schemeClr val="accent1"/>
-          </a:fillRef>
-          <a:effectRef idx="0">
-            <a:schemeClr val="accent1"/>
-          </a:effectRef>
-          <a:fontRef idx="minor">
-            <a:schemeClr val="lt1"/>
-          </a:fontRef>
-        </p:style>
-        <p:txBody>
-          <a:bodyPr rtlCol="0" anchor="ctr"/>
-          <a:lstStyle/>
-          <a:p>
-            <a:pPr algn="ctr"/>
-            <a:endParaRPr lang="en-US"/>
-          </a:p>
-        </p:txBody>
-      </p:sp>
-      <p:sp>
-        <p:nvSpPr>
-          <p:cNvPr id="5" name="Rectangle 4">
-            <a:extLst>
-              <a:ext uri="{FF2B5EF4-FFF2-40B4-BE49-F238E27FC236}">
-                <a16:creationId xmlns:a16="http://schemas.microsoft.com/office/drawing/2014/main" id="{3BEB164D-1A47-9247-8C0A-E4915C296D76}"/>
-              </a:ext>
-            </a:extLst>
-          </p:cNvPr>
-          <p:cNvSpPr/>
-          <p:nvPr/>
-        </p:nvSpPr>
-        <p:spPr>
-          <a:xfrm>
-            <a:off x="4924012" y="3209723"/>
-            <a:ext cx="2343976" cy="523220"/>
-          </a:xfrm>
-          <a:prstGeom prst="rect">
-            <a:avLst/>
-          </a:prstGeom>
-        </p:spPr>
-        <p:txBody>
-          <a:bodyPr wrap="none" anchor="b">
-            <a:spAutoFit/>
-          </a:bodyPr>
-          <a:lstStyle/>
-          <a:p>
-            <a:pPr algn="r"/>
-            <a:r>
-              <a:rPr lang="en-US" sz="2800" i="0" dirty="0">
-                <a:solidFill>
-                  <a:schemeClr val="bg1"/>
-                </a:solidFill>
-                <a:effectLst/>
-                <a:latin typeface="Arial Rounded MT Bold" panose="020F0704030504030204" pitchFamily="34" charset="77"/>
-                <a:ea typeface="STHupo" panose="02010800040101010101" pitchFamily="2" charset="-122"/>
-                <a:cs typeface="Aharoni" panose="02010803020104030203" pitchFamily="2" charset="-79"/>
-              </a:rPr>
-              <a:t>THANK YOU</a:t>
-            </a:r>
-            <a:endParaRPr lang="en-US" sz="2800" dirty="0">
-              <a:solidFill>
-                <a:schemeClr val="bg1"/>
-              </a:solidFill>
-              <a:latin typeface="Arial Rounded MT Bold" panose="020F0704030504030204" pitchFamily="34" charset="77"/>
-              <a:ea typeface="STHupo" panose="02010800040101010101" pitchFamily="2" charset="-122"/>
-              <a:cs typeface="Aharoni" panose="02010803020104030203" pitchFamily="2" charset="-79"/>
-            </a:endParaRPr>
-          </a:p>
-        </p:txBody>
-      </p:sp>
-    </p:spTree>
-    <p:extLst>
-      <p:ext uri="{BB962C8B-B14F-4D97-AF65-F5344CB8AC3E}">
-        <p14:creationId xmlns:p14="http://schemas.microsoft.com/office/powerpoint/2010/main" val="4189793258"/>
       </p:ext>
     </p:extLst>
   </p:cSld>

</xml_diff>